<commit_message>
Added Dan's updated presentation.
</commit_message>
<xml_diff>
--- a/JAVA Group Project Presentation.pptx
+++ b/JAVA Group Project Presentation.pptx
@@ -6,15 +6,14 @@
   </p:sldMasterIdLst>
   <p:sldIdLst>
     <p:sldId id="259" r:id="rId2"/>
-    <p:sldId id="264" r:id="rId3"/>
-    <p:sldId id="256" r:id="rId4"/>
-    <p:sldId id="257" r:id="rId5"/>
-    <p:sldId id="260" r:id="rId6"/>
-    <p:sldId id="261" r:id="rId7"/>
-    <p:sldId id="262" r:id="rId8"/>
-    <p:sldId id="263" r:id="rId9"/>
-    <p:sldId id="265" r:id="rId10"/>
-    <p:sldId id="266" r:id="rId11"/>
+    <p:sldId id="270" r:id="rId3"/>
+    <p:sldId id="268" r:id="rId4"/>
+    <p:sldId id="264" r:id="rId5"/>
+    <p:sldId id="256" r:id="rId6"/>
+    <p:sldId id="267" r:id="rId7"/>
+    <p:sldId id="269" r:id="rId8"/>
+    <p:sldId id="257" r:id="rId9"/>
+    <p:sldId id="266" r:id="rId10"/>
   </p:sldIdLst>
   <p:sldSz cx="9144000" cy="6858000" type="screen4x3"/>
   <p:notesSz cx="6858000" cy="9144000"/>
@@ -297,7 +296,7 @@
           <a:p>
             <a:fld id="{28BC0DC7-8EA0-4CB7-893B-35824988B42E}" type="datetimeFigureOut">
               <a:rPr lang="en-US" smtClean="0"/>
-              <a:t>11/28/2012</a:t>
+              <a:t>12/8/2012</a:t>
             </a:fld>
             <a:endParaRPr lang="en-US" dirty="0"/>
           </a:p>
@@ -467,7 +466,7 @@
           <a:p>
             <a:fld id="{28BC0DC7-8EA0-4CB7-893B-35824988B42E}" type="datetimeFigureOut">
               <a:rPr lang="en-US" smtClean="0"/>
-              <a:t>11/28/2012</a:t>
+              <a:t>12/8/2012</a:t>
             </a:fld>
             <a:endParaRPr lang="en-US" dirty="0"/>
           </a:p>
@@ -647,7 +646,7 @@
           <a:p>
             <a:fld id="{28BC0DC7-8EA0-4CB7-893B-35824988B42E}" type="datetimeFigureOut">
               <a:rPr lang="en-US" smtClean="0"/>
-              <a:t>11/28/2012</a:t>
+              <a:t>12/8/2012</a:t>
             </a:fld>
             <a:endParaRPr lang="en-US" dirty="0"/>
           </a:p>
@@ -817,7 +816,7 @@
           <a:p>
             <a:fld id="{28BC0DC7-8EA0-4CB7-893B-35824988B42E}" type="datetimeFigureOut">
               <a:rPr lang="en-US" smtClean="0"/>
-              <a:t>11/28/2012</a:t>
+              <a:t>12/8/2012</a:t>
             </a:fld>
             <a:endParaRPr lang="en-US" dirty="0"/>
           </a:p>
@@ -1063,7 +1062,7 @@
           <a:p>
             <a:fld id="{28BC0DC7-8EA0-4CB7-893B-35824988B42E}" type="datetimeFigureOut">
               <a:rPr lang="en-US" smtClean="0"/>
-              <a:t>11/28/2012</a:t>
+              <a:t>12/8/2012</a:t>
             </a:fld>
             <a:endParaRPr lang="en-US" dirty="0"/>
           </a:p>
@@ -1351,7 +1350,7 @@
           <a:p>
             <a:fld id="{28BC0DC7-8EA0-4CB7-893B-35824988B42E}" type="datetimeFigureOut">
               <a:rPr lang="en-US" smtClean="0"/>
-              <a:t>11/28/2012</a:t>
+              <a:t>12/8/2012</a:t>
             </a:fld>
             <a:endParaRPr lang="en-US" dirty="0"/>
           </a:p>
@@ -1773,7 +1772,7 @@
           <a:p>
             <a:fld id="{28BC0DC7-8EA0-4CB7-893B-35824988B42E}" type="datetimeFigureOut">
               <a:rPr lang="en-US" smtClean="0"/>
-              <a:t>11/28/2012</a:t>
+              <a:t>12/8/2012</a:t>
             </a:fld>
             <a:endParaRPr lang="en-US" dirty="0"/>
           </a:p>
@@ -1891,7 +1890,7 @@
           <a:p>
             <a:fld id="{28BC0DC7-8EA0-4CB7-893B-35824988B42E}" type="datetimeFigureOut">
               <a:rPr lang="en-US" smtClean="0"/>
-              <a:t>11/28/2012</a:t>
+              <a:t>12/8/2012</a:t>
             </a:fld>
             <a:endParaRPr lang="en-US" dirty="0"/>
           </a:p>
@@ -1986,7 +1985,7 @@
           <a:p>
             <a:fld id="{28BC0DC7-8EA0-4CB7-893B-35824988B42E}" type="datetimeFigureOut">
               <a:rPr lang="en-US" smtClean="0"/>
-              <a:t>11/28/2012</a:t>
+              <a:t>12/8/2012</a:t>
             </a:fld>
             <a:endParaRPr lang="en-US" dirty="0"/>
           </a:p>
@@ -2263,7 +2262,7 @@
           <a:p>
             <a:fld id="{28BC0DC7-8EA0-4CB7-893B-35824988B42E}" type="datetimeFigureOut">
               <a:rPr lang="en-US" smtClean="0"/>
-              <a:t>11/28/2012</a:t>
+              <a:t>12/8/2012</a:t>
             </a:fld>
             <a:endParaRPr lang="en-US" dirty="0"/>
           </a:p>
@@ -2516,7 +2515,7 @@
           <a:p>
             <a:fld id="{28BC0DC7-8EA0-4CB7-893B-35824988B42E}" type="datetimeFigureOut">
               <a:rPr lang="en-US" smtClean="0"/>
-              <a:t>11/28/2012</a:t>
+              <a:t>12/8/2012</a:t>
             </a:fld>
             <a:endParaRPr lang="en-US" dirty="0"/>
           </a:p>
@@ -2729,7 +2728,7 @@
           <a:p>
             <a:fld id="{28BC0DC7-8EA0-4CB7-893B-35824988B42E}" type="datetimeFigureOut">
               <a:rPr lang="en-US" smtClean="0"/>
-              <a:t>11/28/2012</a:t>
+              <a:t>12/8/2012</a:t>
             </a:fld>
             <a:endParaRPr lang="en-US" dirty="0"/>
           </a:p>
@@ -3127,10 +3126,10 @@
           <a:lstStyle/>
           <a:p>
             <a:r>
-              <a:rPr lang="en-US" sz="4000" dirty="0" smtClean="0"/>
+              <a:rPr lang="en-US" dirty="0" smtClean="0"/>
               <a:t>TCC CS 142B Fall 2012</a:t>
             </a:r>
-            <a:endParaRPr lang="en-US" sz="4000" dirty="0"/>
+            <a:endParaRPr lang="en-US" dirty="0"/>
           </a:p>
         </p:txBody>
       </p:sp>
@@ -3156,24 +3155,34 @@
           </a:bodyPr>
           <a:lstStyle/>
           <a:p>
-            <a:endParaRPr lang="en-US" dirty="0" smtClean="0">
+            <a:r>
+              <a:rPr lang="en-US" dirty="0" smtClean="0">
+                <a:solidFill>
+                  <a:schemeClr val="tx1"/>
+                </a:solidFill>
+              </a:rPr>
+              <a:t>Final Project </a:t>
+            </a:r>
+            <a:r>
+              <a:rPr lang="en-US" dirty="0" smtClean="0">
+                <a:solidFill>
+                  <a:schemeClr val="tx1"/>
+                </a:solidFill>
+              </a:rPr>
+              <a:t>- Group 4</a:t>
+            </a:r>
+          </a:p>
+          <a:p>
+            <a:pPr algn="l"/>
+            <a:endParaRPr lang="en-US" sz="2800" dirty="0" smtClean="0">
               <a:solidFill>
                 <a:schemeClr val="tx1"/>
               </a:solidFill>
             </a:endParaRPr>
           </a:p>
           <a:p>
-            <a:r>
-              <a:rPr lang="en-US" dirty="0" smtClean="0">
-                <a:solidFill>
-                  <a:schemeClr val="tx1"/>
-                </a:solidFill>
-              </a:rPr>
-              <a:t>Team Project - Group 4</a:t>
-            </a:r>
-          </a:p>
-          <a:p>
-            <a:endParaRPr lang="en-US" dirty="0" smtClean="0">
+            <a:pPr algn="l"/>
+            <a:endParaRPr lang="en-US" sz="2800" dirty="0">
               <a:solidFill>
                 <a:schemeClr val="tx1"/>
               </a:solidFill>
@@ -3187,33 +3196,8 @@
                   <a:schemeClr val="tx1"/>
                 </a:solidFill>
               </a:rPr>
-              <a:t>		Jacob Casperson</a:t>
-            </a:r>
-          </a:p>
-          <a:p>
-            <a:pPr algn="l"/>
-            <a:r>
-              <a:rPr lang="en-US" sz="2800" dirty="0" smtClean="0">
-                <a:solidFill>
-                  <a:schemeClr val="tx1"/>
-                </a:solidFill>
-              </a:rPr>
-              <a:t>		Samuel Hug</a:t>
-            </a:r>
-          </a:p>
-          <a:p>
-            <a:pPr algn="l"/>
-            <a:r>
-              <a:rPr lang="en-US" sz="2800" dirty="0" smtClean="0">
-                <a:solidFill>
-                  <a:schemeClr val="tx1"/>
-                </a:solidFill>
-              </a:rPr>
-              <a:t>		Dan Massie</a:t>
-            </a:r>
-          </a:p>
-          <a:p>
-            <a:pPr algn="l"/>
+              <a:t>		</a:t>
+            </a:r>
             <a:endParaRPr lang="en-US" sz="2800" dirty="0">
               <a:solidFill>
                 <a:schemeClr val="tx1"/>
@@ -3253,7 +3237,7 @@
         </p:blipFill>
         <p:spPr>
           <a:xfrm>
-            <a:off x="678008" y="533400"/>
+            <a:off x="381000" y="389771"/>
             <a:ext cx="1143000" cy="1439029"/>
           </a:xfrm>
           <a:prstGeom prst="rect">
@@ -3261,267 +3245,198 @@
           </a:prstGeom>
         </p:spPr>
       </p:pic>
-    </p:spTree>
-    <p:extLst>
-      <p:ext uri="{BB962C8B-B14F-4D97-AF65-F5344CB8AC3E}">
-        <p14:creationId xmlns:p14="http://schemas.microsoft.com/office/powerpoint/2010/main" val="516004460"/>
-      </p:ext>
-    </p:extLst>
-  </p:cSld>
-  <p:clrMapOvr>
-    <a:masterClrMapping/>
-  </p:clrMapOvr>
-  <p:timing>
-    <p:tnLst>
-      <p:par>
-        <p:cTn id="1" dur="indefinite" restart="never" nodeType="tmRoot"/>
-      </p:par>
-    </p:tnLst>
-  </p:timing>
-</p:sld>
-</file>
-
-<file path=ppt/slides/slide10.xml><?xml version="1.0" encoding="utf-8"?>
-<p:sld xmlns:a="http://schemas.openxmlformats.org/drawingml/2006/main" xmlns:r="http://schemas.openxmlformats.org/officeDocument/2006/relationships" xmlns:p="http://schemas.openxmlformats.org/presentationml/2006/main">
-  <p:cSld>
-    <p:spTree>
-      <p:nvGrpSpPr>
-        <p:cNvPr id="1" name=""/>
-        <p:cNvGrpSpPr/>
-        <p:nvPr/>
-      </p:nvGrpSpPr>
-      <p:grpSpPr>
-        <a:xfrm>
-          <a:off x="0" y="0"/>
-          <a:ext cx="0" cy="0"/>
-          <a:chOff x="0" y="0"/>
-          <a:chExt cx="0" cy="0"/>
-        </a:xfrm>
-      </p:grpSpPr>
-      <p:sp>
-        <p:nvSpPr>
-          <p:cNvPr id="2" name="Title 1"/>
-          <p:cNvSpPr>
-            <a:spLocks noGrp="1"/>
-          </p:cNvSpPr>
-          <p:nvPr>
-            <p:ph type="ctrTitle"/>
-          </p:nvPr>
-        </p:nvSpPr>
-        <p:spPr>
-          <a:xfrm>
-            <a:off x="762000" y="152400"/>
-            <a:ext cx="7772400" cy="1470025"/>
-          </a:xfrm>
-        </p:spPr>
-        <p:txBody>
-          <a:bodyPr>
-            <a:normAutofit/>
-          </a:bodyPr>
-          <a:lstStyle/>
-          <a:p>
-            <a:r>
-              <a:rPr lang="en-US" sz="4000" dirty="0" smtClean="0"/>
-              <a:t>TCC CS 142B Fall 2012</a:t>
-            </a:r>
-            <a:endParaRPr lang="en-US" sz="4000" dirty="0"/>
-          </a:p>
-        </p:txBody>
-      </p:sp>
-      <p:sp>
-        <p:nvSpPr>
-          <p:cNvPr id="3" name="Subtitle 2"/>
-          <p:cNvSpPr>
-            <a:spLocks noGrp="1"/>
-          </p:cNvSpPr>
-          <p:nvPr>
-            <p:ph type="subTitle" idx="1"/>
-          </p:nvPr>
-        </p:nvSpPr>
-        <p:spPr>
-          <a:xfrm>
-            <a:off x="1447800" y="1600200"/>
-            <a:ext cx="6400800" cy="4876800"/>
-          </a:xfrm>
-        </p:spPr>
-        <p:txBody>
-          <a:bodyPr>
-            <a:normAutofit/>
-          </a:bodyPr>
-          <a:lstStyle/>
-          <a:p>
-            <a:r>
-              <a:rPr lang="en-US" dirty="0" smtClean="0">
-                <a:solidFill>
-                  <a:schemeClr val="tx1"/>
-                </a:solidFill>
-              </a:rPr>
-              <a:t>Team Project - Group 4</a:t>
-            </a:r>
-          </a:p>
-          <a:p>
-            <a:endParaRPr lang="en-US" dirty="0" smtClean="0">
-              <a:solidFill>
-                <a:schemeClr val="tx1"/>
-              </a:solidFill>
-            </a:endParaRPr>
-          </a:p>
-          <a:p>
-            <a:r>
-              <a:rPr lang="en-US" dirty="0" smtClean="0">
-                <a:solidFill>
-                  <a:schemeClr val="tx1"/>
-                </a:solidFill>
-              </a:rPr>
-              <a:t>Special thanks to:</a:t>
-            </a:r>
-          </a:p>
-          <a:p>
-            <a:pPr algn="l"/>
-            <a:r>
-              <a:rPr lang="en-US" sz="2800" dirty="0" smtClean="0">
-                <a:solidFill>
-                  <a:schemeClr val="tx1"/>
-                </a:solidFill>
-              </a:rPr>
-              <a:t>	</a:t>
-            </a:r>
-            <a:r>
-              <a:rPr lang="en-US" sz="2800" dirty="0">
-                <a:solidFill>
-                  <a:schemeClr val="tx1"/>
-                </a:solidFill>
-              </a:rPr>
-              <a:t>	</a:t>
-            </a:r>
-          </a:p>
-          <a:p>
-            <a:pPr algn="l"/>
-            <a:endParaRPr lang="en-US" sz="2800" dirty="0" smtClean="0">
-              <a:solidFill>
-                <a:schemeClr val="tx1"/>
-              </a:solidFill>
-            </a:endParaRPr>
-          </a:p>
-          <a:p>
-            <a:pPr algn="l"/>
-            <a:endParaRPr lang="en-US" sz="2800" dirty="0" smtClean="0">
-              <a:solidFill>
-                <a:schemeClr val="tx1"/>
-              </a:solidFill>
-            </a:endParaRPr>
-          </a:p>
-          <a:p>
-            <a:pPr algn="l"/>
-            <a:r>
-              <a:rPr lang="en-US" sz="2800" dirty="0">
-                <a:solidFill>
-                  <a:schemeClr val="tx1"/>
-                </a:solidFill>
-              </a:rPr>
-              <a:t>	</a:t>
-            </a:r>
-            <a:r>
-              <a:rPr lang="en-US" sz="2800" dirty="0" smtClean="0">
-                <a:solidFill>
-                  <a:schemeClr val="tx1"/>
-                </a:solidFill>
-              </a:rPr>
-              <a:t>	</a:t>
-            </a:r>
-          </a:p>
-          <a:p>
-            <a:r>
-              <a:rPr lang="en-US" sz="2800" dirty="0" smtClean="0">
-                <a:solidFill>
-                  <a:schemeClr val="tx1"/>
-                </a:solidFill>
-              </a:rPr>
-              <a:t>Professor Meerdink</a:t>
-            </a:r>
-          </a:p>
-          <a:p>
-            <a:endParaRPr lang="en-US" sz="2800" dirty="0">
-              <a:solidFill>
-                <a:schemeClr val="tx1"/>
-              </a:solidFill>
-            </a:endParaRPr>
-          </a:p>
-          <a:p>
-            <a:endParaRPr lang="en-US" dirty="0"/>
-          </a:p>
-          <a:p>
-            <a:endParaRPr lang="en-US" dirty="0" smtClean="0"/>
-          </a:p>
-          <a:p>
-            <a:endParaRPr lang="en-US" dirty="0"/>
-          </a:p>
-        </p:txBody>
-      </p:sp>
       <p:pic>
         <p:nvPicPr>
-          <p:cNvPr id="4" name="Picture 3"/>
+          <p:cNvPr id="2050" name="Picture 2" descr="http://www.faerymysterium.com/uploads/9/1/7/6/9176783/oak-tree-light_6587529_orig.jpg"/>
           <p:cNvPicPr>
-            <a:picLocks noChangeAspect="1"/>
+            <a:picLocks noChangeAspect="1" noChangeArrowheads="1"/>
           </p:cNvPicPr>
           <p:nvPr/>
         </p:nvPicPr>
         <p:blipFill>
-          <a:blip r:embed="rId2" cstate="print">
+          <a:blip r:embed="rId3" cstate="print">
             <a:extLst>
               <a:ext uri="{28A0092B-C50C-407E-A947-70E740481C1C}">
                 <a14:useLocalDpi xmlns:a14="http://schemas.microsoft.com/office/drawing/2010/main" val="0"/>
               </a:ext>
             </a:extLst>
           </a:blip>
+          <a:srcRect/>
           <a:stretch>
             <a:fillRect/>
           </a:stretch>
         </p:blipFill>
-        <p:spPr>
-          <a:xfrm>
-            <a:off x="678008" y="533400"/>
-            <a:ext cx="1143000" cy="1439029"/>
+        <p:spPr bwMode="auto">
+          <a:xfrm>
+            <a:off x="7620000" y="331940"/>
+            <a:ext cx="1143000" cy="1420660"/>
           </a:xfrm>
           <a:prstGeom prst="rect">
             <a:avLst/>
           </a:prstGeom>
+          <a:noFill/>
+          <a:extLst>
+            <a:ext uri="{909E8E84-426E-40DD-AFC4-6F175D3DCCD1}">
+              <a14:hiddenFill xmlns:a14="http://schemas.microsoft.com/office/drawing/2010/main">
+                <a:solidFill>
+                  <a:srgbClr val="FFFFFF"/>
+                </a:solidFill>
+              </a14:hiddenFill>
+            </a:ext>
+          </a:extLst>
         </p:spPr>
       </p:pic>
       <p:pic>
         <p:nvPicPr>
-          <p:cNvPr id="5" name="Picture 4"/>
+          <p:cNvPr id="7" name="Picture 4" descr="http://yukna.free.fr/anglais/gruffalo/acorn.jpg"/>
           <p:cNvPicPr>
-            <a:picLocks noChangeAspect="1"/>
+            <a:picLocks noChangeAspect="1" noChangeArrowheads="1"/>
           </p:cNvPicPr>
           <p:nvPr/>
         </p:nvPicPr>
         <p:blipFill>
-          <a:blip r:embed="rId3">
+          <a:blip r:embed="rId4">
             <a:extLst>
               <a:ext uri="{28A0092B-C50C-407E-A947-70E740481C1C}">
                 <a14:useLocalDpi xmlns:a14="http://schemas.microsoft.com/office/drawing/2010/main" val="0"/>
               </a:ext>
             </a:extLst>
           </a:blip>
+          <a:srcRect/>
           <a:stretch>
             <a:fillRect/>
           </a:stretch>
         </p:blipFill>
-        <p:spPr>
-          <a:xfrm>
-            <a:off x="3657600" y="3429000"/>
-            <a:ext cx="1857375" cy="1857375"/>
+        <p:spPr bwMode="auto">
+          <a:xfrm>
+            <a:off x="3886200" y="2959664"/>
+            <a:ext cx="1668201" cy="1536136"/>
           </a:xfrm>
           <a:prstGeom prst="rect">
             <a:avLst/>
           </a:prstGeom>
+          <a:noFill/>
+          <a:extLst>
+            <a:ext uri="{909E8E84-426E-40DD-AFC4-6F175D3DCCD1}">
+              <a14:hiddenFill xmlns:a14="http://schemas.microsoft.com/office/drawing/2010/main">
+                <a:solidFill>
+                  <a:srgbClr val="FFFFFF"/>
+                </a:solidFill>
+              </a14:hiddenFill>
+            </a:ext>
+          </a:extLst>
         </p:spPr>
       </p:pic>
+      <p:sp>
+        <p:nvSpPr>
+          <p:cNvPr id="5" name="TextBox 4"/>
+          <p:cNvSpPr txBox="1"/>
+          <p:nvPr/>
+        </p:nvSpPr>
+        <p:spPr>
+          <a:xfrm>
+            <a:off x="3733800" y="2395089"/>
+            <a:ext cx="2514600" cy="523220"/>
+          </a:xfrm>
+          <a:prstGeom prst="rect">
+            <a:avLst/>
+          </a:prstGeom>
+          <a:noFill/>
+        </p:spPr>
+        <p:txBody>
+          <a:bodyPr wrap="square" rtlCol="0">
+            <a:spAutoFit/>
+          </a:bodyPr>
+          <a:lstStyle/>
+          <a:p>
+            <a:r>
+              <a:rPr lang="en-US" sz="2800" dirty="0" smtClean="0"/>
+              <a:t>Team Acorn</a:t>
+            </a:r>
+            <a:endParaRPr lang="en-US" sz="2800" dirty="0"/>
+          </a:p>
+        </p:txBody>
+      </p:sp>
+      <p:sp>
+        <p:nvSpPr>
+          <p:cNvPr id="6" name="TextBox 5"/>
+          <p:cNvSpPr txBox="1"/>
+          <p:nvPr/>
+        </p:nvSpPr>
+        <p:spPr>
+          <a:xfrm>
+            <a:off x="828778" y="4736068"/>
+            <a:ext cx="8008539" cy="1569660"/>
+          </a:xfrm>
+          <a:prstGeom prst="rect">
+            <a:avLst/>
+          </a:prstGeom>
+          <a:noFill/>
+        </p:spPr>
+        <p:txBody>
+          <a:bodyPr wrap="none" rtlCol="0">
+            <a:spAutoFit/>
+          </a:bodyPr>
+          <a:lstStyle/>
+          <a:p>
+            <a:r>
+              <a:rPr lang="en-US" sz="2000" dirty="0" smtClean="0"/>
+              <a:t>Master Programmer: Samuel </a:t>
+            </a:r>
+            <a:r>
+              <a:rPr lang="en-US" sz="2000" dirty="0" err="1" smtClean="0"/>
+              <a:t>Hubb</a:t>
+            </a:r>
+            <a:endParaRPr lang="en-US" sz="2000" dirty="0" smtClean="0"/>
+          </a:p>
+          <a:p>
+            <a:r>
+              <a:rPr lang="en-US" dirty="0"/>
+              <a:t>	</a:t>
+            </a:r>
+            <a:endParaRPr lang="en-US" dirty="0" smtClean="0"/>
+          </a:p>
+          <a:p>
+            <a:r>
+              <a:rPr lang="en-US" dirty="0"/>
+              <a:t>	</a:t>
+            </a:r>
+            <a:r>
+              <a:rPr lang="en-US" sz="2000" dirty="0" smtClean="0"/>
+              <a:t>GUI Developer and Programmer: Jacob Casperson</a:t>
+            </a:r>
+          </a:p>
+          <a:p>
+            <a:r>
+              <a:rPr lang="en-US" dirty="0"/>
+              <a:t>	</a:t>
+            </a:r>
+            <a:r>
+              <a:rPr lang="en-US" dirty="0" smtClean="0"/>
+              <a:t>	</a:t>
+            </a:r>
+          </a:p>
+          <a:p>
+            <a:r>
+              <a:rPr lang="en-US" dirty="0"/>
+              <a:t>	</a:t>
+            </a:r>
+            <a:r>
+              <a:rPr lang="en-US" dirty="0" smtClean="0"/>
+              <a:t>	</a:t>
+            </a:r>
+            <a:r>
+              <a:rPr lang="en-US" sz="2000" dirty="0" smtClean="0"/>
+              <a:t>Assistant to the Assistant and Report Writer: Dan Massie</a:t>
+            </a:r>
+            <a:endParaRPr lang="en-US" sz="2000" dirty="0"/>
+          </a:p>
+        </p:txBody>
+      </p:sp>
     </p:spTree>
     <p:extLst>
       <p:ext uri="{BB962C8B-B14F-4D97-AF65-F5344CB8AC3E}">
-        <p14:creationId xmlns:p14="http://schemas.microsoft.com/office/powerpoint/2010/main" val="3086271375"/>
+        <p14:creationId xmlns:p14="http://schemas.microsoft.com/office/powerpoint/2010/main" val="516004460"/>
       </p:ext>
     </p:extLst>
   </p:cSld>
@@ -3578,10 +3493,10 @@
           <a:lstStyle/>
           <a:p>
             <a:r>
-              <a:rPr lang="en-US" sz="4000" dirty="0" smtClean="0"/>
+              <a:rPr lang="en-US" dirty="0" smtClean="0"/>
               <a:t>TCC CS 142B Fall 2012</a:t>
             </a:r>
-            <a:endParaRPr lang="en-US" sz="4000" dirty="0"/>
+            <a:endParaRPr lang="en-US" dirty="0"/>
           </a:p>
         </p:txBody>
       </p:sp>
@@ -3613,27 +3528,27 @@
                   <a:schemeClr val="tx1"/>
                 </a:solidFill>
               </a:rPr>
-              <a:t>Team Project - Group 4</a:t>
-            </a:r>
-          </a:p>
-          <a:p>
-            <a:endParaRPr lang="en-US" dirty="0" smtClean="0">
+              <a:t>Final Project </a:t>
+            </a:r>
+            <a:r>
+              <a:rPr lang="en-US" dirty="0" smtClean="0">
+                <a:solidFill>
+                  <a:schemeClr val="tx1"/>
+                </a:solidFill>
+              </a:rPr>
+              <a:t>- Group 4</a:t>
+            </a:r>
+          </a:p>
+          <a:p>
+            <a:pPr algn="l"/>
+            <a:endParaRPr lang="en-US" sz="2800" dirty="0" smtClean="0">
               <a:solidFill>
                 <a:schemeClr val="tx1"/>
               </a:solidFill>
             </a:endParaRPr>
           </a:p>
           <a:p>
-            <a:r>
-              <a:rPr lang="en-US" sz="2800" dirty="0" smtClean="0">
-                <a:solidFill>
-                  <a:schemeClr val="tx1"/>
-                </a:solidFill>
-              </a:rPr>
-              <a:t>Proposal: Create a game of pong</a:t>
-            </a:r>
-          </a:p>
-          <a:p>
+            <a:pPr algn="l"/>
             <a:endParaRPr lang="en-US" sz="2800" dirty="0">
               <a:solidFill>
                 <a:schemeClr val="tx1"/>
@@ -3641,17 +3556,16 @@
             </a:endParaRPr>
           </a:p>
           <a:p>
+            <a:pPr algn="l"/>
             <a:r>
               <a:rPr lang="en-US" sz="2800" dirty="0" smtClean="0">
                 <a:solidFill>
                   <a:schemeClr val="tx1"/>
                 </a:solidFill>
               </a:rPr>
-              <a:t>Make it larger than life with multiple players with all the bells and whistles!</a:t>
-            </a:r>
-          </a:p>
-          <a:p>
-            <a:endParaRPr lang="en-US" sz="2800" dirty="0" smtClean="0">
+              <a:t>		</a:t>
+            </a:r>
+            <a:endParaRPr lang="en-US" sz="2800" dirty="0">
               <a:solidFill>
                 <a:schemeClr val="tx1"/>
               </a:solidFill>
@@ -3690,7 +3604,7 @@
         </p:blipFill>
         <p:spPr>
           <a:xfrm>
-            <a:off x="678008" y="533400"/>
+            <a:off x="381000" y="389771"/>
             <a:ext cx="1143000" cy="1439029"/>
           </a:xfrm>
           <a:prstGeom prst="rect">
@@ -3698,10 +3612,152 @@
           </a:prstGeom>
         </p:spPr>
       </p:pic>
+      <p:pic>
+        <p:nvPicPr>
+          <p:cNvPr id="2050" name="Picture 2" descr="http://www.faerymysterium.com/uploads/9/1/7/6/9176783/oak-tree-light_6587529_orig.jpg"/>
+          <p:cNvPicPr>
+            <a:picLocks noChangeAspect="1" noChangeArrowheads="1"/>
+          </p:cNvPicPr>
+          <p:nvPr/>
+        </p:nvPicPr>
+        <p:blipFill>
+          <a:blip r:embed="rId3" cstate="print">
+            <a:extLst>
+              <a:ext uri="{28A0092B-C50C-407E-A947-70E740481C1C}">
+                <a14:useLocalDpi xmlns:a14="http://schemas.microsoft.com/office/drawing/2010/main" val="0"/>
+              </a:ext>
+            </a:extLst>
+          </a:blip>
+          <a:srcRect/>
+          <a:stretch>
+            <a:fillRect/>
+          </a:stretch>
+        </p:blipFill>
+        <p:spPr bwMode="auto">
+          <a:xfrm>
+            <a:off x="7620000" y="331940"/>
+            <a:ext cx="1143000" cy="1420660"/>
+          </a:xfrm>
+          <a:prstGeom prst="rect">
+            <a:avLst/>
+          </a:prstGeom>
+          <a:noFill/>
+          <a:extLst>
+            <a:ext uri="{909E8E84-426E-40DD-AFC4-6F175D3DCCD1}">
+              <a14:hiddenFill xmlns:a14="http://schemas.microsoft.com/office/drawing/2010/main">
+                <a:solidFill>
+                  <a:srgbClr val="FFFFFF"/>
+                </a:solidFill>
+              </a14:hiddenFill>
+            </a:ext>
+          </a:extLst>
+        </p:spPr>
+      </p:pic>
+      <p:pic>
+        <p:nvPicPr>
+          <p:cNvPr id="7" name="Picture 4" descr="http://yukna.free.fr/anglais/gruffalo/acorn.jpg"/>
+          <p:cNvPicPr>
+            <a:picLocks noChangeAspect="1" noChangeArrowheads="1"/>
+          </p:cNvPicPr>
+          <p:nvPr/>
+        </p:nvPicPr>
+        <p:blipFill>
+          <a:blip r:embed="rId4">
+            <a:extLst>
+              <a:ext uri="{28A0092B-C50C-407E-A947-70E740481C1C}">
+                <a14:useLocalDpi xmlns:a14="http://schemas.microsoft.com/office/drawing/2010/main" val="0"/>
+              </a:ext>
+            </a:extLst>
+          </a:blip>
+          <a:srcRect/>
+          <a:stretch>
+            <a:fillRect/>
+          </a:stretch>
+        </p:blipFill>
+        <p:spPr bwMode="auto">
+          <a:xfrm>
+            <a:off x="3886200" y="2959664"/>
+            <a:ext cx="1668201" cy="1536136"/>
+          </a:xfrm>
+          <a:prstGeom prst="rect">
+            <a:avLst/>
+          </a:prstGeom>
+          <a:noFill/>
+          <a:extLst>
+            <a:ext uri="{909E8E84-426E-40DD-AFC4-6F175D3DCCD1}">
+              <a14:hiddenFill xmlns:a14="http://schemas.microsoft.com/office/drawing/2010/main">
+                <a:solidFill>
+                  <a:srgbClr val="FFFFFF"/>
+                </a:solidFill>
+              </a14:hiddenFill>
+            </a:ext>
+          </a:extLst>
+        </p:spPr>
+      </p:pic>
+      <p:sp>
+        <p:nvSpPr>
+          <p:cNvPr id="5" name="TextBox 4"/>
+          <p:cNvSpPr txBox="1"/>
+          <p:nvPr/>
+        </p:nvSpPr>
+        <p:spPr>
+          <a:xfrm>
+            <a:off x="3733800" y="2395089"/>
+            <a:ext cx="2514600" cy="523220"/>
+          </a:xfrm>
+          <a:prstGeom prst="rect">
+            <a:avLst/>
+          </a:prstGeom>
+          <a:noFill/>
+        </p:spPr>
+        <p:txBody>
+          <a:bodyPr wrap="square" rtlCol="0">
+            <a:spAutoFit/>
+          </a:bodyPr>
+          <a:lstStyle/>
+          <a:p>
+            <a:r>
+              <a:rPr lang="en-US" sz="2800" dirty="0" smtClean="0"/>
+              <a:t>Team Acorn</a:t>
+            </a:r>
+            <a:endParaRPr lang="en-US" sz="2800" dirty="0"/>
+          </a:p>
+        </p:txBody>
+      </p:sp>
+      <p:sp>
+        <p:nvSpPr>
+          <p:cNvPr id="6" name="TextBox 5"/>
+          <p:cNvSpPr txBox="1"/>
+          <p:nvPr/>
+        </p:nvSpPr>
+        <p:spPr>
+          <a:xfrm>
+            <a:off x="3051114" y="4724400"/>
+            <a:ext cx="3197286" cy="584775"/>
+          </a:xfrm>
+          <a:prstGeom prst="rect">
+            <a:avLst/>
+          </a:prstGeom>
+          <a:noFill/>
+        </p:spPr>
+        <p:txBody>
+          <a:bodyPr wrap="none" rtlCol="0">
+            <a:spAutoFit/>
+          </a:bodyPr>
+          <a:lstStyle/>
+          <a:p>
+            <a:r>
+              <a:rPr lang="en-US" sz="3200" dirty="0" smtClean="0"/>
+              <a:t>Why Team Acorn?</a:t>
+            </a:r>
+            <a:endParaRPr lang="en-US" sz="3200" dirty="0"/>
+          </a:p>
+        </p:txBody>
+      </p:sp>
     </p:spTree>
     <p:extLst>
       <p:ext uri="{BB962C8B-B14F-4D97-AF65-F5344CB8AC3E}">
-        <p14:creationId xmlns:p14="http://schemas.microsoft.com/office/powerpoint/2010/main" val="2174738425"/>
+        <p14:creationId xmlns:p14="http://schemas.microsoft.com/office/powerpoint/2010/main" val="2601152070"/>
       </p:ext>
     </p:extLst>
   </p:cSld>
@@ -3758,10 +3814,10 @@
           <a:lstStyle/>
           <a:p>
             <a:r>
-              <a:rPr lang="en-US" sz="4000" dirty="0" smtClean="0"/>
+              <a:rPr lang="en-US" dirty="0" smtClean="0"/>
               <a:t>TCC CS 142B Fall 2012</a:t>
             </a:r>
-            <a:endParaRPr lang="en-US" sz="4000" dirty="0"/>
+            <a:endParaRPr lang="en-US" dirty="0"/>
           </a:p>
         </p:txBody>
       </p:sp>
@@ -3777,26 +3833,27 @@
         </p:nvSpPr>
         <p:spPr>
           <a:xfrm>
-            <a:off x="1447800" y="1600200"/>
+            <a:off x="1378711" y="1524000"/>
             <a:ext cx="6400800" cy="4648200"/>
           </a:xfrm>
         </p:spPr>
         <p:txBody>
           <a:bodyPr>
-            <a:normAutofit lnSpcReduction="10000"/>
+            <a:normAutofit/>
           </a:bodyPr>
           <a:lstStyle/>
           <a:p>
             <a:r>
-              <a:rPr lang="en-US" dirty="0" smtClean="0">
+              <a:rPr lang="en-US" sz="2800" dirty="0">
                 <a:solidFill>
                   <a:schemeClr val="tx1"/>
                 </a:solidFill>
               </a:rPr>
-              <a:t>Team Project - Group 4</a:t>
-            </a:r>
-          </a:p>
-          <a:p>
+              <a:t>Final Project - Group 4</a:t>
+            </a:r>
+          </a:p>
+          <a:p>
+            <a:pPr algn="l"/>
             <a:endParaRPr lang="en-US" sz="2800" dirty="0" smtClean="0">
               <a:solidFill>
                 <a:schemeClr val="tx1"/>
@@ -3804,131 +3861,24 @@
             </a:endParaRPr>
           </a:p>
           <a:p>
-            <a:r>
-              <a:rPr lang="en-US" sz="2800" dirty="0" smtClean="0">
-                <a:solidFill>
-                  <a:schemeClr val="tx1"/>
-                </a:solidFill>
-              </a:rPr>
-              <a:t>Considerations:</a:t>
-            </a:r>
-          </a:p>
-          <a:p>
             <a:pPr algn="l"/>
-            <a:r>
-              <a:rPr lang="en-US" sz="2800" dirty="0" smtClean="0">
-                <a:solidFill>
-                  <a:schemeClr val="tx1"/>
-                </a:solidFill>
-              </a:rPr>
-              <a:t>	</a:t>
-            </a:r>
-          </a:p>
-          <a:p>
-            <a:pPr marL="457200" indent="-457200" algn="l">
-              <a:buFont typeface="Arial" pitchFamily="34" charset="0"/>
-              <a:buChar char="•"/>
-            </a:pPr>
-            <a:r>
-              <a:rPr lang="en-US" sz="2800" dirty="0" smtClean="0">
-                <a:solidFill>
-                  <a:schemeClr val="tx1"/>
-                </a:solidFill>
-              </a:rPr>
-              <a:t>Number of classes?</a:t>
-            </a:r>
-          </a:p>
-          <a:p>
-            <a:pPr marL="457200" indent="-457200" algn="l">
-              <a:buFont typeface="Arial" pitchFamily="34" charset="0"/>
-              <a:buChar char="•"/>
-            </a:pPr>
-            <a:r>
-              <a:rPr lang="en-US" sz="2800" dirty="0" err="1" smtClean="0">
-                <a:solidFill>
-                  <a:schemeClr val="tx1"/>
-                </a:solidFill>
-              </a:rPr>
-              <a:t>JAVA.awt</a:t>
-            </a:r>
-            <a:r>
-              <a:rPr lang="en-US" sz="2800" dirty="0" smtClean="0">
-                <a:solidFill>
-                  <a:schemeClr val="tx1"/>
-                </a:solidFill>
-              </a:rPr>
-              <a:t> shape method?</a:t>
-            </a:r>
-            <a:endParaRPr lang="en-US" sz="2800" dirty="0" smtClean="0">
+            <a:endParaRPr lang="en-US" sz="2800" dirty="0">
               <a:solidFill>
                 <a:schemeClr val="tx1"/>
               </a:solidFill>
             </a:endParaRPr>
           </a:p>
           <a:p>
-            <a:pPr marL="457200" indent="-457200" algn="l">
-              <a:buFont typeface="Arial" pitchFamily="34" charset="0"/>
-              <a:buChar char="•"/>
-            </a:pPr>
+            <a:pPr algn="l"/>
             <a:r>
               <a:rPr lang="en-US" sz="2800" dirty="0" smtClean="0">
                 <a:solidFill>
                   <a:schemeClr val="tx1"/>
                 </a:solidFill>
               </a:rPr>
-              <a:t>Who does what?</a:t>
-            </a:r>
-          </a:p>
-          <a:p>
-            <a:pPr marL="457200" indent="-457200" algn="l">
-              <a:buFont typeface="Arial" pitchFamily="34" charset="0"/>
-              <a:buChar char="•"/>
-            </a:pPr>
-            <a:r>
-              <a:rPr lang="en-US" sz="2800" dirty="0" smtClean="0">
-                <a:solidFill>
-                  <a:schemeClr val="tx1"/>
-                </a:solidFill>
-              </a:rPr>
-              <a:t>Where do we find the time</a:t>
-            </a:r>
-            <a:r>
-              <a:rPr lang="en-US" sz="2800" dirty="0" smtClean="0">
-                <a:solidFill>
-                  <a:schemeClr val="tx1"/>
-                </a:solidFill>
-              </a:rPr>
-              <a:t>?</a:t>
-            </a:r>
-          </a:p>
-          <a:p>
-            <a:pPr marL="457200" indent="-457200" algn="l">
-              <a:buFont typeface="Arial" pitchFamily="34" charset="0"/>
-              <a:buChar char="•"/>
-            </a:pPr>
-            <a:r>
-              <a:rPr lang="en-US" sz="2800" dirty="0" smtClean="0">
-                <a:solidFill>
-                  <a:schemeClr val="tx1"/>
-                </a:solidFill>
-              </a:rPr>
-              <a:t>Third-party libraries?</a:t>
-            </a:r>
-            <a:endParaRPr lang="en-US" sz="2800" dirty="0" smtClean="0">
-              <a:solidFill>
-                <a:schemeClr val="tx1"/>
-              </a:solidFill>
-            </a:endParaRPr>
-          </a:p>
-          <a:p>
-            <a:endParaRPr lang="en-US" sz="2800" dirty="0" smtClean="0">
-              <a:solidFill>
-                <a:schemeClr val="tx1"/>
-              </a:solidFill>
-            </a:endParaRPr>
-          </a:p>
-          <a:p>
-            <a:endParaRPr lang="en-US" sz="2800" dirty="0" smtClean="0">
+              <a:t>		</a:t>
+            </a:r>
+            <a:endParaRPr lang="en-US" sz="2800" dirty="0">
               <a:solidFill>
                 <a:schemeClr val="tx1"/>
               </a:solidFill>
@@ -3967,24 +3917,215 @@
         </p:blipFill>
         <p:spPr>
           <a:xfrm>
-            <a:off x="678008" y="533400"/>
+            <a:off x="381000" y="389771"/>
             <a:ext cx="1143000" cy="1439029"/>
           </a:xfrm>
           <a:prstGeom prst="rect">
             <a:avLst/>
           </a:prstGeom>
+        </p:spPr>
+      </p:pic>
+      <p:pic>
+        <p:nvPicPr>
+          <p:cNvPr id="2050" name="Picture 2" descr="http://www.faerymysterium.com/uploads/9/1/7/6/9176783/oak-tree-light_6587529_orig.jpg"/>
+          <p:cNvPicPr>
+            <a:picLocks noChangeAspect="1" noChangeArrowheads="1"/>
+          </p:cNvPicPr>
+          <p:nvPr/>
+        </p:nvPicPr>
+        <p:blipFill>
+          <a:blip r:embed="rId3" cstate="print">
+            <a:extLst>
+              <a:ext uri="{28A0092B-C50C-407E-A947-70E740481C1C}">
+                <a14:useLocalDpi xmlns:a14="http://schemas.microsoft.com/office/drawing/2010/main" val="0"/>
+              </a:ext>
+            </a:extLst>
+          </a:blip>
+          <a:srcRect/>
+          <a:stretch>
+            <a:fillRect/>
+          </a:stretch>
+        </p:blipFill>
+        <p:spPr bwMode="auto">
+          <a:xfrm>
+            <a:off x="2743200" y="1981200"/>
+            <a:ext cx="3498089" cy="2651899"/>
+          </a:xfrm>
+          <a:prstGeom prst="rect">
+            <a:avLst/>
+          </a:prstGeom>
+          <a:noFill/>
+          <a:extLst>
+            <a:ext uri="{909E8E84-426E-40DD-AFC4-6F175D3DCCD1}">
+              <a14:hiddenFill xmlns:a14="http://schemas.microsoft.com/office/drawing/2010/main">
+                <a:solidFill>
+                  <a:srgbClr val="FFFFFF"/>
+                </a:solidFill>
+              </a14:hiddenFill>
+            </a:ext>
+          </a:extLst>
+        </p:spPr>
+      </p:pic>
+      <p:sp>
+        <p:nvSpPr>
+          <p:cNvPr id="6" name="TextBox 5"/>
+          <p:cNvSpPr txBox="1"/>
+          <p:nvPr/>
+        </p:nvSpPr>
+        <p:spPr>
+          <a:xfrm>
+            <a:off x="762000" y="4736068"/>
+            <a:ext cx="7844840" cy="1477328"/>
+          </a:xfrm>
+          <a:prstGeom prst="rect">
+            <a:avLst/>
+          </a:prstGeom>
+          <a:noFill/>
+        </p:spPr>
+        <p:txBody>
+          <a:bodyPr wrap="none" rtlCol="0">
+            <a:spAutoFit/>
+          </a:bodyPr>
+          <a:lstStyle/>
+          <a:p>
+            <a:r>
+              <a:rPr lang="en-US" dirty="0"/>
+              <a:t>In 1991, a group of Sun Microsystems engineers led by James Gosling decided to </a:t>
+            </a:r>
+          </a:p>
+          <a:p>
+            <a:r>
+              <a:rPr lang="en-US" dirty="0"/>
+              <a:t>develop a language for consumer devices (cable boxes, etc.). </a:t>
+            </a:r>
+            <a:r>
+              <a:rPr lang="en-US" dirty="0" smtClean="0"/>
+              <a:t>The </a:t>
+            </a:r>
+            <a:r>
+              <a:rPr lang="en-US" dirty="0"/>
+              <a:t>project was </a:t>
+            </a:r>
+            <a:endParaRPr lang="en-US" dirty="0" smtClean="0"/>
+          </a:p>
+          <a:p>
+            <a:r>
+              <a:rPr lang="en-US" dirty="0" smtClean="0"/>
+              <a:t>code-named Green.  They first called their program “Oak”.  Yes – This is now JAVA.</a:t>
+            </a:r>
+          </a:p>
+          <a:p>
+            <a:endParaRPr lang="en-US" dirty="0"/>
+          </a:p>
+          <a:p>
+            <a:r>
+              <a:rPr lang="en-US" dirty="0" smtClean="0"/>
+              <a:t>					-That’s why you nut!</a:t>
+            </a:r>
+            <a:endParaRPr lang="en-US" dirty="0"/>
+          </a:p>
+        </p:txBody>
+      </p:sp>
+      <p:pic>
+        <p:nvPicPr>
+          <p:cNvPr id="9" name="Picture 4" descr="http://yukna.free.fr/anglais/gruffalo/acorn.jpg"/>
+          <p:cNvPicPr>
+            <a:picLocks noChangeAspect="1" noChangeArrowheads="1"/>
+          </p:cNvPicPr>
+          <p:nvPr/>
+        </p:nvPicPr>
+        <p:blipFill>
+          <a:blip r:embed="rId4" cstate="print">
+            <a:extLst>
+              <a:ext uri="{28A0092B-C50C-407E-A947-70E740481C1C}">
+                <a14:useLocalDpi xmlns:a14="http://schemas.microsoft.com/office/drawing/2010/main" val="0"/>
+              </a:ext>
+            </a:extLst>
+          </a:blip>
+          <a:srcRect/>
+          <a:stretch>
+            <a:fillRect/>
+          </a:stretch>
+        </p:blipFill>
+        <p:spPr bwMode="auto">
+          <a:xfrm>
+            <a:off x="4901852" y="5785129"/>
+            <a:ext cx="545042" cy="501893"/>
+          </a:xfrm>
+          <a:prstGeom prst="rect">
+            <a:avLst/>
+          </a:prstGeom>
+          <a:noFill/>
+          <a:extLst>
+            <a:ext uri="{909E8E84-426E-40DD-AFC4-6F175D3DCCD1}">
+              <a14:hiddenFill xmlns:a14="http://schemas.microsoft.com/office/drawing/2010/main">
+                <a:solidFill>
+                  <a:srgbClr val="FFFFFF"/>
+                </a:solidFill>
+              </a14:hiddenFill>
+            </a:ext>
+          </a:extLst>
+        </p:spPr>
+      </p:pic>
+      <p:pic>
+        <p:nvPicPr>
+          <p:cNvPr id="10" name="Picture 2" descr="http://www.faerymysterium.com/uploads/9/1/7/6/9176783/oak-tree-light_6587529_orig.jpg"/>
+          <p:cNvPicPr>
+            <a:picLocks noChangeAspect="1" noChangeArrowheads="1"/>
+          </p:cNvPicPr>
+          <p:nvPr/>
+        </p:nvPicPr>
+        <p:blipFill>
+          <a:blip r:embed="rId5" cstate="print">
+            <a:extLst>
+              <a:ext uri="{28A0092B-C50C-407E-A947-70E740481C1C}">
+                <a14:useLocalDpi xmlns:a14="http://schemas.microsoft.com/office/drawing/2010/main" val="0"/>
+              </a:ext>
+            </a:extLst>
+          </a:blip>
+          <a:srcRect/>
+          <a:stretch>
+            <a:fillRect/>
+          </a:stretch>
+        </p:blipFill>
+        <p:spPr bwMode="auto">
+          <a:xfrm>
+            <a:off x="7620000" y="331940"/>
+            <a:ext cx="1143000" cy="1420660"/>
+          </a:xfrm>
+          <a:prstGeom prst="rect">
+            <a:avLst/>
+          </a:prstGeom>
+          <a:noFill/>
+          <a:extLst>
+            <a:ext uri="{909E8E84-426E-40DD-AFC4-6F175D3DCCD1}">
+              <a14:hiddenFill xmlns:a14="http://schemas.microsoft.com/office/drawing/2010/main">
+                <a:solidFill>
+                  <a:srgbClr val="FFFFFF"/>
+                </a:solidFill>
+              </a14:hiddenFill>
+            </a:ext>
+          </a:extLst>
         </p:spPr>
       </p:pic>
     </p:spTree>
     <p:extLst>
       <p:ext uri="{BB962C8B-B14F-4D97-AF65-F5344CB8AC3E}">
-        <p14:creationId xmlns:p14="http://schemas.microsoft.com/office/powerpoint/2010/main" val="527548725"/>
+        <p14:creationId xmlns:p14="http://schemas.microsoft.com/office/powerpoint/2010/main" val="1003791003"/>
       </p:ext>
     </p:extLst>
   </p:cSld>
   <p:clrMapOvr>
     <a:masterClrMapping/>
   </p:clrMapOvr>
+  <mc:AlternateContent xmlns:mc="http://schemas.openxmlformats.org/markup-compatibility/2006">
+    <mc:Choice xmlns:p14="http://schemas.microsoft.com/office/powerpoint/2010/main" Requires="p14">
+      <p:transition p14:dur="0"/>
+    </mc:Choice>
+    <mc:Fallback>
+      <p:transition/>
+    </mc:Fallback>
+  </mc:AlternateContent>
   <p:timing>
     <p:tnLst>
       <p:par>
@@ -4014,41 +4155,25 @@
       </p:grpSpPr>
       <p:sp>
         <p:nvSpPr>
-          <p:cNvPr id="4" name="Title 1"/>
-          <p:cNvSpPr txBox="1">
-            <a:spLocks/>
-          </p:cNvSpPr>
-          <p:nvPr/>
+          <p:cNvPr id="2" name="Title 1"/>
+          <p:cNvSpPr>
+            <a:spLocks noGrp="1"/>
+          </p:cNvSpPr>
+          <p:nvPr>
+            <p:ph type="ctrTitle"/>
+          </p:nvPr>
         </p:nvSpPr>
         <p:spPr>
           <a:xfrm>
             <a:off x="762000" y="152400"/>
             <a:ext cx="7772400" cy="1470025"/>
           </a:xfrm>
-          <a:prstGeom prst="rect">
-            <a:avLst/>
-          </a:prstGeom>
-        </p:spPr>
-        <p:txBody>
-          <a:bodyPr vert="horz" lIns="91440" tIns="45720" rIns="91440" bIns="45720" rtlCol="0" anchor="ctr">
+        </p:spPr>
+        <p:txBody>
+          <a:bodyPr>
             <a:normAutofit/>
           </a:bodyPr>
-          <a:lstStyle>
-            <a:lvl1pPr algn="ctr" defTabSz="914400" rtl="0" eaLnBrk="1" latinLnBrk="0" hangingPunct="1">
-              <a:spcBef>
-                <a:spcPct val="0"/>
-              </a:spcBef>
-              <a:buNone/>
-              <a:defRPr sz="4400" kern="1200">
-                <a:solidFill>
-                  <a:schemeClr val="tx1"/>
-                </a:solidFill>
-                <a:latin typeface="+mj-lt"/>
-                <a:ea typeface="+mj-ea"/>
-                <a:cs typeface="+mj-cs"/>
-              </a:defRPr>
-            </a:lvl1pPr>
-          </a:lstStyle>
+          <a:lstStyle/>
           <a:p>
             <a:r>
               <a:rPr lang="en-US" sz="4000" dirty="0" smtClean="0"/>
@@ -4058,9 +4183,142 @@
           </a:p>
         </p:txBody>
       </p:sp>
+      <p:sp>
+        <p:nvSpPr>
+          <p:cNvPr id="3" name="Subtitle 2"/>
+          <p:cNvSpPr>
+            <a:spLocks noGrp="1"/>
+          </p:cNvSpPr>
+          <p:nvPr>
+            <p:ph type="subTitle" idx="1"/>
+          </p:nvPr>
+        </p:nvSpPr>
+        <p:spPr>
+          <a:xfrm>
+            <a:off x="1295400" y="2133600"/>
+            <a:ext cx="6400800" cy="4648200"/>
+          </a:xfrm>
+        </p:spPr>
+        <p:txBody>
+          <a:bodyPr>
+            <a:normAutofit/>
+          </a:bodyPr>
+          <a:lstStyle/>
+          <a:p>
+            <a:r>
+              <a:rPr lang="en-US" sz="2800" dirty="0">
+                <a:solidFill>
+                  <a:schemeClr val="tx1"/>
+                </a:solidFill>
+              </a:rPr>
+              <a:t>Final Project - Group 4</a:t>
+            </a:r>
+          </a:p>
+          <a:p>
+            <a:endParaRPr lang="en-US" sz="2800" dirty="0" smtClean="0">
+              <a:solidFill>
+                <a:schemeClr val="tx1"/>
+              </a:solidFill>
+            </a:endParaRPr>
+          </a:p>
+          <a:p>
+            <a:r>
+              <a:rPr lang="en-US" sz="2800" dirty="0" smtClean="0">
+                <a:solidFill>
+                  <a:schemeClr val="tx1"/>
+                </a:solidFill>
+              </a:rPr>
+              <a:t>Proposal</a:t>
+            </a:r>
+            <a:r>
+              <a:rPr lang="en-US" sz="2800" dirty="0" smtClean="0">
+                <a:solidFill>
+                  <a:schemeClr val="tx1"/>
+                </a:solidFill>
+              </a:rPr>
+              <a:t>: Create a game of pong</a:t>
+            </a:r>
+          </a:p>
+          <a:p>
+            <a:endParaRPr lang="en-US" sz="2800" dirty="0">
+              <a:solidFill>
+                <a:schemeClr val="tx1"/>
+              </a:solidFill>
+            </a:endParaRPr>
+          </a:p>
+          <a:p>
+            <a:r>
+              <a:rPr lang="en-US" sz="2800" dirty="0" smtClean="0">
+                <a:solidFill>
+                  <a:schemeClr val="tx1"/>
+                </a:solidFill>
+              </a:rPr>
+              <a:t>Make </a:t>
+            </a:r>
+            <a:r>
+              <a:rPr lang="en-US" sz="2800" dirty="0" smtClean="0">
+                <a:solidFill>
+                  <a:schemeClr val="tx1"/>
+                </a:solidFill>
+              </a:rPr>
+              <a:t>it larger than life with multiple </a:t>
+            </a:r>
+            <a:r>
+              <a:rPr lang="en-US" sz="2800" dirty="0" smtClean="0">
+                <a:solidFill>
+                  <a:schemeClr val="tx1"/>
+                </a:solidFill>
+              </a:rPr>
+              <a:t> </a:t>
+            </a:r>
+          </a:p>
+          <a:p>
+            <a:r>
+              <a:rPr lang="en-US" sz="2800" dirty="0">
+                <a:solidFill>
+                  <a:schemeClr val="tx1"/>
+                </a:solidFill>
+              </a:rPr>
+              <a:t> </a:t>
+            </a:r>
+            <a:r>
+              <a:rPr lang="en-US" sz="2800" dirty="0" smtClean="0">
+                <a:solidFill>
+                  <a:schemeClr val="tx1"/>
+                </a:solidFill>
+              </a:rPr>
+              <a:t>players and all </a:t>
+            </a:r>
+            <a:r>
+              <a:rPr lang="en-US" sz="2800" dirty="0" smtClean="0">
+                <a:solidFill>
+                  <a:schemeClr val="tx1"/>
+                </a:solidFill>
+              </a:rPr>
+              <a:t>the bells and whistles!</a:t>
+            </a:r>
+          </a:p>
+          <a:p>
+            <a:endParaRPr lang="en-US" sz="2800" dirty="0" smtClean="0">
+              <a:solidFill>
+                <a:schemeClr val="tx1"/>
+              </a:solidFill>
+            </a:endParaRPr>
+          </a:p>
+          <a:p>
+            <a:endParaRPr lang="en-US" dirty="0"/>
+          </a:p>
+          <a:p>
+            <a:endParaRPr lang="en-US" dirty="0" smtClean="0"/>
+          </a:p>
+          <a:p>
+            <a:endParaRPr lang="en-US" dirty="0"/>
+          </a:p>
+        </p:txBody>
+      </p:sp>
       <p:pic>
         <p:nvPicPr>
-          <p:cNvPr id="5" name="Picture 4"/>
+          <p:cNvPr id="4" name="Picture 3"/>
           <p:cNvPicPr>
             <a:picLocks noChangeAspect="1"/>
           </p:cNvPicPr>
@@ -4080,7 +4338,7 @@
         </p:blipFill>
         <p:spPr>
           <a:xfrm>
-            <a:off x="678008" y="533400"/>
+            <a:off x="381000" y="389771"/>
             <a:ext cx="1143000" cy="1439029"/>
           </a:xfrm>
           <a:prstGeom prst="rect">
@@ -4088,388 +4346,51 @@
           </a:prstGeom>
         </p:spPr>
       </p:pic>
-      <p:sp>
-        <p:nvSpPr>
-          <p:cNvPr id="6" name="Subtitle 2"/>
-          <p:cNvSpPr txBox="1">
-            <a:spLocks/>
-          </p:cNvSpPr>
+      <p:pic>
+        <p:nvPicPr>
+          <p:cNvPr id="5" name="Picture 2" descr="http://www.faerymysterium.com/uploads/9/1/7/6/9176783/oak-tree-light_6587529_orig.jpg"/>
+          <p:cNvPicPr>
+            <a:picLocks noChangeAspect="1" noChangeArrowheads="1"/>
+          </p:cNvPicPr>
           <p:nvPr/>
-        </p:nvSpPr>
-        <p:spPr>
-          <a:xfrm>
-            <a:off x="1447800" y="1600200"/>
-            <a:ext cx="6400800" cy="4648200"/>
-          </a:xfrm>
-          <a:prstGeom prst="rect">
-            <a:avLst/>
-          </a:prstGeom>
-        </p:spPr>
-        <p:txBody>
-          <a:bodyPr vert="horz" lIns="91440" tIns="45720" rIns="91440" bIns="45720" rtlCol="0">
-            <a:normAutofit/>
-          </a:bodyPr>
-          <a:lstStyle>
-            <a:lvl1pPr marL="342900" indent="-342900" algn="l" defTabSz="914400" rtl="0" eaLnBrk="1" latinLnBrk="0" hangingPunct="1">
-              <a:spcBef>
-                <a:spcPct val="20000"/>
-              </a:spcBef>
-              <a:buFont typeface="Arial" pitchFamily="34" charset="0"/>
-              <a:buChar char="•"/>
-              <a:defRPr sz="3200" kern="1200">
-                <a:solidFill>
-                  <a:schemeClr val="tx1"/>
-                </a:solidFill>
-                <a:latin typeface="+mn-lt"/>
-                <a:ea typeface="+mn-ea"/>
-                <a:cs typeface="+mn-cs"/>
-              </a:defRPr>
-            </a:lvl1pPr>
-            <a:lvl2pPr marL="742950" indent="-285750" algn="l" defTabSz="914400" rtl="0" eaLnBrk="1" latinLnBrk="0" hangingPunct="1">
-              <a:spcBef>
-                <a:spcPct val="20000"/>
-              </a:spcBef>
-              <a:buFont typeface="Arial" pitchFamily="34" charset="0"/>
-              <a:buChar char="–"/>
-              <a:defRPr sz="2800" kern="1200">
-                <a:solidFill>
-                  <a:schemeClr val="tx1"/>
-                </a:solidFill>
-                <a:latin typeface="+mn-lt"/>
-                <a:ea typeface="+mn-ea"/>
-                <a:cs typeface="+mn-cs"/>
-              </a:defRPr>
-            </a:lvl2pPr>
-            <a:lvl3pPr marL="1143000" indent="-228600" algn="l" defTabSz="914400" rtl="0" eaLnBrk="1" latinLnBrk="0" hangingPunct="1">
-              <a:spcBef>
-                <a:spcPct val="20000"/>
-              </a:spcBef>
-              <a:buFont typeface="Arial" pitchFamily="34" charset="0"/>
-              <a:buChar char="•"/>
-              <a:defRPr sz="2400" kern="1200">
-                <a:solidFill>
-                  <a:schemeClr val="tx1"/>
-                </a:solidFill>
-                <a:latin typeface="+mn-lt"/>
-                <a:ea typeface="+mn-ea"/>
-                <a:cs typeface="+mn-cs"/>
-              </a:defRPr>
-            </a:lvl3pPr>
-            <a:lvl4pPr marL="1600200" indent="-228600" algn="l" defTabSz="914400" rtl="0" eaLnBrk="1" latinLnBrk="0" hangingPunct="1">
-              <a:spcBef>
-                <a:spcPct val="20000"/>
-              </a:spcBef>
-              <a:buFont typeface="Arial" pitchFamily="34" charset="0"/>
-              <a:buChar char="–"/>
-              <a:defRPr sz="2000" kern="1200">
-                <a:solidFill>
-                  <a:schemeClr val="tx1"/>
-                </a:solidFill>
-                <a:latin typeface="+mn-lt"/>
-                <a:ea typeface="+mn-ea"/>
-                <a:cs typeface="+mn-cs"/>
-              </a:defRPr>
-            </a:lvl4pPr>
-            <a:lvl5pPr marL="2057400" indent="-228600" algn="l" defTabSz="914400" rtl="0" eaLnBrk="1" latinLnBrk="0" hangingPunct="1">
-              <a:spcBef>
-                <a:spcPct val="20000"/>
-              </a:spcBef>
-              <a:buFont typeface="Arial" pitchFamily="34" charset="0"/>
-              <a:buChar char="»"/>
-              <a:defRPr sz="2000" kern="1200">
-                <a:solidFill>
-                  <a:schemeClr val="tx1"/>
-                </a:solidFill>
-                <a:latin typeface="+mn-lt"/>
-                <a:ea typeface="+mn-ea"/>
-                <a:cs typeface="+mn-cs"/>
-              </a:defRPr>
-            </a:lvl5pPr>
-            <a:lvl6pPr marL="2514600" indent="-228600" algn="l" defTabSz="914400" rtl="0" eaLnBrk="1" latinLnBrk="0" hangingPunct="1">
-              <a:spcBef>
-                <a:spcPct val="20000"/>
-              </a:spcBef>
-              <a:buFont typeface="Arial" pitchFamily="34" charset="0"/>
-              <a:buChar char="•"/>
-              <a:defRPr sz="2000" kern="1200">
-                <a:solidFill>
-                  <a:schemeClr val="tx1"/>
-                </a:solidFill>
-                <a:latin typeface="+mn-lt"/>
-                <a:ea typeface="+mn-ea"/>
-                <a:cs typeface="+mn-cs"/>
-              </a:defRPr>
-            </a:lvl6pPr>
-            <a:lvl7pPr marL="2971800" indent="-228600" algn="l" defTabSz="914400" rtl="0" eaLnBrk="1" latinLnBrk="0" hangingPunct="1">
-              <a:spcBef>
-                <a:spcPct val="20000"/>
-              </a:spcBef>
-              <a:buFont typeface="Arial" pitchFamily="34" charset="0"/>
-              <a:buChar char="•"/>
-              <a:defRPr sz="2000" kern="1200">
-                <a:solidFill>
-                  <a:schemeClr val="tx1"/>
-                </a:solidFill>
-                <a:latin typeface="+mn-lt"/>
-                <a:ea typeface="+mn-ea"/>
-                <a:cs typeface="+mn-cs"/>
-              </a:defRPr>
-            </a:lvl7pPr>
-            <a:lvl8pPr marL="3429000" indent="-228600" algn="l" defTabSz="914400" rtl="0" eaLnBrk="1" latinLnBrk="0" hangingPunct="1">
-              <a:spcBef>
-                <a:spcPct val="20000"/>
-              </a:spcBef>
-              <a:buFont typeface="Arial" pitchFamily="34" charset="0"/>
-              <a:buChar char="•"/>
-              <a:defRPr sz="2000" kern="1200">
-                <a:solidFill>
-                  <a:schemeClr val="tx1"/>
-                </a:solidFill>
-                <a:latin typeface="+mn-lt"/>
-                <a:ea typeface="+mn-ea"/>
-                <a:cs typeface="+mn-cs"/>
-              </a:defRPr>
-            </a:lvl8pPr>
-            <a:lvl9pPr marL="3886200" indent="-228600" algn="l" defTabSz="914400" rtl="0" eaLnBrk="1" latinLnBrk="0" hangingPunct="1">
-              <a:spcBef>
-                <a:spcPct val="20000"/>
-              </a:spcBef>
-              <a:buFont typeface="Arial" pitchFamily="34" charset="0"/>
-              <a:buChar char="•"/>
-              <a:defRPr sz="2000" kern="1200">
-                <a:solidFill>
-                  <a:schemeClr val="tx1"/>
-                </a:solidFill>
-                <a:latin typeface="+mn-lt"/>
-                <a:ea typeface="+mn-ea"/>
-                <a:cs typeface="+mn-cs"/>
-              </a:defRPr>
-            </a:lvl9pPr>
-          </a:lstStyle>
-          <a:p>
-            <a:endParaRPr lang="en-US" dirty="0" smtClean="0"/>
-          </a:p>
-          <a:p>
-            <a:pPr marL="0" indent="0">
-              <a:buNone/>
-            </a:pPr>
-            <a:endParaRPr lang="en-US" dirty="0" smtClean="0"/>
-          </a:p>
-          <a:p>
-            <a:endParaRPr lang="en-US" dirty="0" smtClean="0"/>
-          </a:p>
-          <a:p>
-            <a:endParaRPr lang="en-US" dirty="0"/>
-          </a:p>
-        </p:txBody>
-      </p:sp>
-      <p:graphicFrame>
-        <p:nvGraphicFramePr>
-          <p:cNvPr id="9" name="Table 8"/>
-          <p:cNvGraphicFramePr>
-            <a:graphicFrameLocks noGrp="1"/>
-          </p:cNvGraphicFramePr>
-          <p:nvPr>
-            <p:extLst>
-              <p:ext uri="{D42A27DB-BD31-4B8C-83A1-F6EECF244321}">
-                <p14:modId xmlns:p14="http://schemas.microsoft.com/office/powerpoint/2010/main" val="3915800834"/>
-              </p:ext>
-            </p:extLst>
-          </p:nvPr>
-        </p:nvGraphicFramePr>
-        <p:xfrm>
-          <a:off x="2667000" y="2932546"/>
-          <a:ext cx="3962400" cy="2325254"/>
-        </p:xfrm>
-        <a:graphic>
-          <a:graphicData uri="http://schemas.openxmlformats.org/drawingml/2006/table">
-            <a:tbl>
-              <a:tblPr/>
-              <a:tblGrid>
-                <a:gridCol w="3962400"/>
-              </a:tblGrid>
-              <a:tr h="533400">
-                <a:tc>
-                  <a:txBody>
-                    <a:bodyPr/>
-                    <a:lstStyle/>
-                    <a:p>
-                      <a:pPr algn="ctr"/>
-                      <a:r>
-                        <a:rPr lang="en-US" dirty="0" smtClean="0"/>
-                        <a:t>ENGINE</a:t>
-                      </a:r>
-                      <a:r>
-                        <a:rPr lang="en-US" baseline="0" dirty="0" smtClean="0"/>
-                        <a:t> JAVA</a:t>
-                      </a:r>
-                      <a:endParaRPr lang="en-US" dirty="0"/>
-                    </a:p>
-                  </a:txBody>
-                  <a:tcPr>
-                    <a:lnL w="12700" cmpd="sng">
-                      <a:solidFill>
-                        <a:schemeClr val="tx1"/>
-                      </a:solidFill>
-                      <a:prstDash val="solid"/>
-                    </a:lnL>
-                    <a:lnR w="12700" cmpd="sng">
-                      <a:solidFill>
-                        <a:schemeClr val="tx1"/>
-                      </a:solidFill>
-                      <a:prstDash val="solid"/>
-                    </a:lnR>
-                    <a:lnT w="12700" cmpd="sng">
-                      <a:solidFill>
-                        <a:schemeClr val="tx1"/>
-                      </a:solidFill>
-                      <a:prstDash val="solid"/>
-                    </a:lnT>
-                    <a:lnB w="12700" cap="flat" cmpd="sng" algn="ctr">
-                      <a:solidFill>
-                        <a:schemeClr val="tx1"/>
-                      </a:solidFill>
-                      <a:prstDash val="solid"/>
-                      <a:round/>
-                      <a:headEnd type="none" w="med" len="med"/>
-                      <a:tailEnd type="none" w="med" len="med"/>
-                    </a:lnB>
-                  </a:tcPr>
-                </a:tc>
-              </a:tr>
-              <a:tr h="895927">
-                <a:tc>
-                  <a:txBody>
-                    <a:bodyPr/>
-                    <a:lstStyle/>
-                    <a:p>
-                      <a:r>
-                        <a:rPr lang="en-US" dirty="0" smtClean="0"/>
-                        <a:t>Default</a:t>
-                      </a:r>
-                      <a:r>
-                        <a:rPr lang="en-US" baseline="0" dirty="0" smtClean="0"/>
-                        <a:t> window height</a:t>
-                      </a:r>
-                    </a:p>
-                    <a:p>
-                      <a:r>
-                        <a:rPr lang="en-US" baseline="0" dirty="0" smtClean="0"/>
-                        <a:t>Default window width</a:t>
-                      </a:r>
-                      <a:endParaRPr lang="en-US" dirty="0"/>
-                    </a:p>
-                  </a:txBody>
-                  <a:tcPr>
-                    <a:lnL w="12700" cmpd="sng">
-                      <a:solidFill>
-                        <a:schemeClr val="tx1"/>
-                      </a:solidFill>
-                      <a:prstDash val="solid"/>
-                    </a:lnL>
-                    <a:lnR w="12700" cmpd="sng">
-                      <a:solidFill>
-                        <a:schemeClr val="tx1"/>
-                      </a:solidFill>
-                      <a:prstDash val="solid"/>
-                    </a:lnR>
-                    <a:lnT w="12700" cmpd="sng">
-                      <a:solidFill>
-                        <a:schemeClr val="tx1"/>
-                      </a:solidFill>
-                      <a:prstDash val="solid"/>
-                    </a:lnT>
-                    <a:lnB w="12700" cap="flat" cmpd="sng" algn="ctr">
-                      <a:solidFill>
-                        <a:schemeClr val="tx1"/>
-                      </a:solidFill>
-                      <a:prstDash val="solid"/>
-                      <a:round/>
-                      <a:headEnd type="none" w="med" len="med"/>
-                      <a:tailEnd type="none" w="med" len="med"/>
-                    </a:lnB>
-                  </a:tcPr>
-                </a:tc>
-              </a:tr>
-              <a:tr h="895927">
-                <a:tc>
-                  <a:txBody>
-                    <a:bodyPr/>
-                    <a:lstStyle/>
-                    <a:p>
-                      <a:r>
-                        <a:rPr lang="en-US" dirty="0" smtClean="0"/>
-                        <a:t>Engine</a:t>
-                      </a:r>
-                      <a:endParaRPr lang="en-US" dirty="0"/>
-                    </a:p>
-                  </a:txBody>
-                  <a:tcPr>
-                    <a:lnL w="12700" cmpd="sng">
-                      <a:solidFill>
-                        <a:schemeClr val="tx1"/>
-                      </a:solidFill>
-                      <a:prstDash val="solid"/>
-                    </a:lnL>
-                    <a:lnR w="12700" cmpd="sng">
-                      <a:solidFill>
-                        <a:schemeClr val="tx1"/>
-                      </a:solidFill>
-                      <a:prstDash val="solid"/>
-                    </a:lnR>
-                    <a:lnT w="12700" cmpd="sng">
-                      <a:solidFill>
-                        <a:schemeClr val="tx1"/>
-                      </a:solidFill>
-                      <a:prstDash val="solid"/>
-                    </a:lnT>
-                    <a:lnB w="12700" cmpd="sng">
-                      <a:solidFill>
-                        <a:schemeClr val="tx1"/>
-                      </a:solidFill>
-                      <a:prstDash val="solid"/>
-                    </a:lnB>
-                  </a:tcPr>
-                </a:tc>
-              </a:tr>
-            </a:tbl>
-          </a:graphicData>
-        </a:graphic>
-      </p:graphicFrame>
-      <p:sp>
-        <p:nvSpPr>
-          <p:cNvPr id="10" name="TextBox 9"/>
-          <p:cNvSpPr txBox="1"/>
-          <p:nvPr/>
-        </p:nvSpPr>
-        <p:spPr>
-          <a:xfrm>
-            <a:off x="3733800" y="1871807"/>
-            <a:ext cx="1465529" cy="369332"/>
+        </p:nvPicPr>
+        <p:blipFill>
+          <a:blip r:embed="rId3" cstate="print">
+            <a:extLst>
+              <a:ext uri="{28A0092B-C50C-407E-A947-70E740481C1C}">
+                <a14:useLocalDpi xmlns:a14="http://schemas.microsoft.com/office/drawing/2010/main" val="0"/>
+              </a:ext>
+            </a:extLst>
+          </a:blip>
+          <a:srcRect/>
+          <a:stretch>
+            <a:fillRect/>
+          </a:stretch>
+        </p:blipFill>
+        <p:spPr bwMode="auto">
+          <a:xfrm>
+            <a:off x="7620000" y="331940"/>
+            <a:ext cx="1143000" cy="1420660"/>
           </a:xfrm>
           <a:prstGeom prst="rect">
             <a:avLst/>
           </a:prstGeom>
           <a:noFill/>
-        </p:spPr>
-        <p:txBody>
-          <a:bodyPr wrap="none" rtlCol="0">
-            <a:spAutoFit/>
-          </a:bodyPr>
-          <a:lstStyle/>
-          <a:p>
-            <a:r>
-              <a:rPr lang="en-US" dirty="0" smtClean="0"/>
-              <a:t>UML Diagram</a:t>
-            </a:r>
-            <a:endParaRPr lang="en-US" dirty="0"/>
-          </a:p>
-        </p:txBody>
-      </p:sp>
+          <a:extLst>
+            <a:ext uri="{909E8E84-426E-40DD-AFC4-6F175D3DCCD1}">
+              <a14:hiddenFill xmlns:a14="http://schemas.microsoft.com/office/drawing/2010/main">
+                <a:solidFill>
+                  <a:srgbClr val="FFFFFF"/>
+                </a:solidFill>
+              </a14:hiddenFill>
+            </a:ext>
+          </a:extLst>
+        </p:spPr>
+      </p:pic>
     </p:spTree>
     <p:extLst>
       <p:ext uri="{BB962C8B-B14F-4D97-AF65-F5344CB8AC3E}">
-        <p14:creationId xmlns:p14="http://schemas.microsoft.com/office/powerpoint/2010/main" val="823839205"/>
+        <p14:creationId xmlns:p14="http://schemas.microsoft.com/office/powerpoint/2010/main" val="2174738425"/>
       </p:ext>
     </p:extLst>
   </p:cSld>
@@ -4505,41 +4426,25 @@
       </p:grpSpPr>
       <p:sp>
         <p:nvSpPr>
-          <p:cNvPr id="4" name="Title 1"/>
-          <p:cNvSpPr txBox="1">
-            <a:spLocks/>
-          </p:cNvSpPr>
-          <p:nvPr/>
+          <p:cNvPr id="2" name="Title 1"/>
+          <p:cNvSpPr>
+            <a:spLocks noGrp="1"/>
+          </p:cNvSpPr>
+          <p:nvPr>
+            <p:ph type="ctrTitle"/>
+          </p:nvPr>
         </p:nvSpPr>
         <p:spPr>
           <a:xfrm>
             <a:off x="762000" y="152400"/>
             <a:ext cx="7772400" cy="1470025"/>
           </a:xfrm>
-          <a:prstGeom prst="rect">
-            <a:avLst/>
-          </a:prstGeom>
-        </p:spPr>
-        <p:txBody>
-          <a:bodyPr vert="horz" lIns="91440" tIns="45720" rIns="91440" bIns="45720" rtlCol="0" anchor="ctr">
+        </p:spPr>
+        <p:txBody>
+          <a:bodyPr>
             <a:normAutofit/>
           </a:bodyPr>
-          <a:lstStyle>
-            <a:lvl1pPr algn="ctr" defTabSz="914400" rtl="0" eaLnBrk="1" latinLnBrk="0" hangingPunct="1">
-              <a:spcBef>
-                <a:spcPct val="0"/>
-              </a:spcBef>
-              <a:buNone/>
-              <a:defRPr sz="4400" kern="1200">
-                <a:solidFill>
-                  <a:schemeClr val="tx1"/>
-                </a:solidFill>
-                <a:latin typeface="+mj-lt"/>
-                <a:ea typeface="+mj-ea"/>
-                <a:cs typeface="+mj-cs"/>
-              </a:defRPr>
-            </a:lvl1pPr>
-          </a:lstStyle>
+          <a:lstStyle/>
           <a:p>
             <a:r>
               <a:rPr lang="en-US" sz="4000" dirty="0" smtClean="0"/>
@@ -4549,9 +4454,201 @@
           </a:p>
         </p:txBody>
       </p:sp>
+      <p:sp>
+        <p:nvSpPr>
+          <p:cNvPr id="3" name="Subtitle 2"/>
+          <p:cNvSpPr>
+            <a:spLocks noGrp="1"/>
+          </p:cNvSpPr>
+          <p:nvPr>
+            <p:ph type="subTitle" idx="1"/>
+          </p:nvPr>
+        </p:nvSpPr>
+        <p:spPr>
+          <a:xfrm>
+            <a:off x="1447800" y="1600200"/>
+            <a:ext cx="6400800" cy="4648200"/>
+          </a:xfrm>
+        </p:spPr>
+        <p:txBody>
+          <a:bodyPr>
+            <a:normAutofit lnSpcReduction="10000"/>
+          </a:bodyPr>
+          <a:lstStyle/>
+          <a:p>
+            <a:r>
+              <a:rPr lang="en-US" dirty="0" smtClean="0">
+                <a:solidFill>
+                  <a:schemeClr val="tx1"/>
+                </a:solidFill>
+              </a:rPr>
+              <a:t>Team Project - Group 4</a:t>
+            </a:r>
+          </a:p>
+          <a:p>
+            <a:endParaRPr lang="en-US" sz="2800" dirty="0" smtClean="0">
+              <a:solidFill>
+                <a:schemeClr val="tx1"/>
+              </a:solidFill>
+            </a:endParaRPr>
+          </a:p>
+          <a:p>
+            <a:r>
+              <a:rPr lang="en-US" sz="2800" dirty="0" smtClean="0">
+                <a:solidFill>
+                  <a:schemeClr val="tx1"/>
+                </a:solidFill>
+              </a:rPr>
+              <a:t>Considerations/Difficulties:</a:t>
+            </a:r>
+            <a:endParaRPr lang="en-US" sz="2800" dirty="0" smtClean="0">
+              <a:solidFill>
+                <a:schemeClr val="tx1"/>
+              </a:solidFill>
+            </a:endParaRPr>
+          </a:p>
+          <a:p>
+            <a:pPr algn="l"/>
+            <a:r>
+              <a:rPr lang="en-US" sz="2800" dirty="0" smtClean="0">
+                <a:solidFill>
+                  <a:schemeClr val="tx1"/>
+                </a:solidFill>
+              </a:rPr>
+              <a:t>	</a:t>
+            </a:r>
+          </a:p>
+          <a:p>
+            <a:pPr marL="457200" indent="-457200" algn="l">
+              <a:buFont typeface="Arial" pitchFamily="34" charset="0"/>
+              <a:buChar char="•"/>
+            </a:pPr>
+            <a:r>
+              <a:rPr lang="en-US" sz="2800" dirty="0" smtClean="0">
+                <a:solidFill>
+                  <a:schemeClr val="tx1"/>
+                </a:solidFill>
+              </a:rPr>
+              <a:t>Number of </a:t>
+            </a:r>
+            <a:r>
+              <a:rPr lang="en-US" sz="2800" dirty="0" smtClean="0">
+                <a:solidFill>
+                  <a:schemeClr val="tx1"/>
+                </a:solidFill>
+              </a:rPr>
+              <a:t>players </a:t>
+            </a:r>
+            <a:endParaRPr lang="en-US" sz="2800" dirty="0" smtClean="0">
+              <a:solidFill>
+                <a:schemeClr val="tx1"/>
+              </a:solidFill>
+            </a:endParaRPr>
+          </a:p>
+          <a:p>
+            <a:pPr marL="457200" indent="-457200" algn="l">
+              <a:buFont typeface="Arial" pitchFamily="34" charset="0"/>
+              <a:buChar char="•"/>
+            </a:pPr>
+            <a:r>
+              <a:rPr lang="en-US" sz="2800" dirty="0" smtClean="0">
+                <a:solidFill>
+                  <a:schemeClr val="tx1"/>
+                </a:solidFill>
+              </a:rPr>
+              <a:t>Collision detection</a:t>
+            </a:r>
+            <a:endParaRPr lang="en-US" sz="2800" dirty="0" smtClean="0">
+              <a:solidFill>
+                <a:schemeClr val="tx1"/>
+              </a:solidFill>
+            </a:endParaRPr>
+          </a:p>
+          <a:p>
+            <a:pPr marL="457200" indent="-457200" algn="l">
+              <a:buFont typeface="Arial" pitchFamily="34" charset="0"/>
+              <a:buChar char="•"/>
+            </a:pPr>
+            <a:r>
+              <a:rPr lang="en-US" sz="2800" dirty="0" smtClean="0">
+                <a:solidFill>
+                  <a:schemeClr val="tx1"/>
+                </a:solidFill>
+              </a:rPr>
+              <a:t>Third party libraries</a:t>
+            </a:r>
+            <a:endParaRPr lang="en-US" sz="2800" dirty="0" smtClean="0">
+              <a:solidFill>
+                <a:schemeClr val="tx1"/>
+              </a:solidFill>
+            </a:endParaRPr>
+          </a:p>
+          <a:p>
+            <a:pPr marL="457200" indent="-457200" algn="l">
+              <a:buFont typeface="Arial" pitchFamily="34" charset="0"/>
+              <a:buChar char="•"/>
+            </a:pPr>
+            <a:r>
+              <a:rPr lang="en-US" sz="2800" dirty="0" smtClean="0">
+                <a:solidFill>
+                  <a:schemeClr val="tx1"/>
+                </a:solidFill>
+              </a:rPr>
+              <a:t>Finding time to collaborate</a:t>
+            </a:r>
+            <a:endParaRPr lang="en-US" sz="2800" dirty="0" smtClean="0">
+              <a:solidFill>
+                <a:schemeClr val="tx1"/>
+              </a:solidFill>
+            </a:endParaRPr>
+          </a:p>
+          <a:p>
+            <a:pPr marL="457200" indent="-457200" algn="l">
+              <a:buFont typeface="Arial" pitchFamily="34" charset="0"/>
+              <a:buChar char="•"/>
+            </a:pPr>
+            <a:r>
+              <a:rPr lang="en-US" sz="2800" dirty="0" smtClean="0">
+                <a:solidFill>
+                  <a:schemeClr val="tx1"/>
+                </a:solidFill>
+              </a:rPr>
+              <a:t>Different levels of competence</a:t>
+            </a:r>
+            <a:endParaRPr lang="en-US" sz="2800" dirty="0" smtClean="0">
+              <a:solidFill>
+                <a:schemeClr val="tx1"/>
+              </a:solidFill>
+            </a:endParaRPr>
+          </a:p>
+          <a:p>
+            <a:endParaRPr lang="en-US" sz="2800" dirty="0" smtClean="0">
+              <a:solidFill>
+                <a:schemeClr val="tx1"/>
+              </a:solidFill>
+            </a:endParaRPr>
+          </a:p>
+          <a:p>
+            <a:endParaRPr lang="en-US" sz="2800" dirty="0" smtClean="0">
+              <a:solidFill>
+                <a:schemeClr val="tx1"/>
+              </a:solidFill>
+            </a:endParaRPr>
+          </a:p>
+          <a:p>
+            <a:endParaRPr lang="en-US" dirty="0"/>
+          </a:p>
+          <a:p>
+            <a:endParaRPr lang="en-US" dirty="0" smtClean="0"/>
+          </a:p>
+          <a:p>
+            <a:endParaRPr lang="en-US" dirty="0"/>
+          </a:p>
+        </p:txBody>
+      </p:sp>
       <p:pic>
         <p:nvPicPr>
-          <p:cNvPr id="5" name="Picture 4"/>
+          <p:cNvPr id="4" name="Picture 3"/>
           <p:cNvPicPr>
             <a:picLocks noChangeAspect="1"/>
           </p:cNvPicPr>
@@ -4571,7 +4668,7 @@
         </p:blipFill>
         <p:spPr>
           <a:xfrm>
-            <a:off x="678008" y="533400"/>
+            <a:off x="381000" y="389771"/>
             <a:ext cx="1143000" cy="1439029"/>
           </a:xfrm>
           <a:prstGeom prst="rect">
@@ -4579,410 +4676,51 @@
           </a:prstGeom>
         </p:spPr>
       </p:pic>
-      <p:sp>
-        <p:nvSpPr>
-          <p:cNvPr id="6" name="Subtitle 2"/>
-          <p:cNvSpPr txBox="1">
-            <a:spLocks/>
-          </p:cNvSpPr>
+      <p:pic>
+        <p:nvPicPr>
+          <p:cNvPr id="5" name="Picture 2" descr="http://www.faerymysterium.com/uploads/9/1/7/6/9176783/oak-tree-light_6587529_orig.jpg"/>
+          <p:cNvPicPr>
+            <a:picLocks noChangeAspect="1" noChangeArrowheads="1"/>
+          </p:cNvPicPr>
           <p:nvPr/>
-        </p:nvSpPr>
-        <p:spPr>
-          <a:xfrm>
-            <a:off x="1447800" y="1600200"/>
-            <a:ext cx="6400800" cy="4648200"/>
-          </a:xfrm>
-          <a:prstGeom prst="rect">
-            <a:avLst/>
-          </a:prstGeom>
-        </p:spPr>
-        <p:txBody>
-          <a:bodyPr vert="horz" lIns="91440" tIns="45720" rIns="91440" bIns="45720" rtlCol="0">
-            <a:normAutofit/>
-          </a:bodyPr>
-          <a:lstStyle>
-            <a:lvl1pPr marL="342900" indent="-342900" algn="l" defTabSz="914400" rtl="0" eaLnBrk="1" latinLnBrk="0" hangingPunct="1">
-              <a:spcBef>
-                <a:spcPct val="20000"/>
-              </a:spcBef>
-              <a:buFont typeface="Arial" pitchFamily="34" charset="0"/>
-              <a:buChar char="•"/>
-              <a:defRPr sz="3200" kern="1200">
-                <a:solidFill>
-                  <a:schemeClr val="tx1"/>
-                </a:solidFill>
-                <a:latin typeface="+mn-lt"/>
-                <a:ea typeface="+mn-ea"/>
-                <a:cs typeface="+mn-cs"/>
-              </a:defRPr>
-            </a:lvl1pPr>
-            <a:lvl2pPr marL="742950" indent="-285750" algn="l" defTabSz="914400" rtl="0" eaLnBrk="1" latinLnBrk="0" hangingPunct="1">
-              <a:spcBef>
-                <a:spcPct val="20000"/>
-              </a:spcBef>
-              <a:buFont typeface="Arial" pitchFamily="34" charset="0"/>
-              <a:buChar char="–"/>
-              <a:defRPr sz="2800" kern="1200">
-                <a:solidFill>
-                  <a:schemeClr val="tx1"/>
-                </a:solidFill>
-                <a:latin typeface="+mn-lt"/>
-                <a:ea typeface="+mn-ea"/>
-                <a:cs typeface="+mn-cs"/>
-              </a:defRPr>
-            </a:lvl2pPr>
-            <a:lvl3pPr marL="1143000" indent="-228600" algn="l" defTabSz="914400" rtl="0" eaLnBrk="1" latinLnBrk="0" hangingPunct="1">
-              <a:spcBef>
-                <a:spcPct val="20000"/>
-              </a:spcBef>
-              <a:buFont typeface="Arial" pitchFamily="34" charset="0"/>
-              <a:buChar char="•"/>
-              <a:defRPr sz="2400" kern="1200">
-                <a:solidFill>
-                  <a:schemeClr val="tx1"/>
-                </a:solidFill>
-                <a:latin typeface="+mn-lt"/>
-                <a:ea typeface="+mn-ea"/>
-                <a:cs typeface="+mn-cs"/>
-              </a:defRPr>
-            </a:lvl3pPr>
-            <a:lvl4pPr marL="1600200" indent="-228600" algn="l" defTabSz="914400" rtl="0" eaLnBrk="1" latinLnBrk="0" hangingPunct="1">
-              <a:spcBef>
-                <a:spcPct val="20000"/>
-              </a:spcBef>
-              <a:buFont typeface="Arial" pitchFamily="34" charset="0"/>
-              <a:buChar char="–"/>
-              <a:defRPr sz="2000" kern="1200">
-                <a:solidFill>
-                  <a:schemeClr val="tx1"/>
-                </a:solidFill>
-                <a:latin typeface="+mn-lt"/>
-                <a:ea typeface="+mn-ea"/>
-                <a:cs typeface="+mn-cs"/>
-              </a:defRPr>
-            </a:lvl4pPr>
-            <a:lvl5pPr marL="2057400" indent="-228600" algn="l" defTabSz="914400" rtl="0" eaLnBrk="1" latinLnBrk="0" hangingPunct="1">
-              <a:spcBef>
-                <a:spcPct val="20000"/>
-              </a:spcBef>
-              <a:buFont typeface="Arial" pitchFamily="34" charset="0"/>
-              <a:buChar char="»"/>
-              <a:defRPr sz="2000" kern="1200">
-                <a:solidFill>
-                  <a:schemeClr val="tx1"/>
-                </a:solidFill>
-                <a:latin typeface="+mn-lt"/>
-                <a:ea typeface="+mn-ea"/>
-                <a:cs typeface="+mn-cs"/>
-              </a:defRPr>
-            </a:lvl5pPr>
-            <a:lvl6pPr marL="2514600" indent="-228600" algn="l" defTabSz="914400" rtl="0" eaLnBrk="1" latinLnBrk="0" hangingPunct="1">
-              <a:spcBef>
-                <a:spcPct val="20000"/>
-              </a:spcBef>
-              <a:buFont typeface="Arial" pitchFamily="34" charset="0"/>
-              <a:buChar char="•"/>
-              <a:defRPr sz="2000" kern="1200">
-                <a:solidFill>
-                  <a:schemeClr val="tx1"/>
-                </a:solidFill>
-                <a:latin typeface="+mn-lt"/>
-                <a:ea typeface="+mn-ea"/>
-                <a:cs typeface="+mn-cs"/>
-              </a:defRPr>
-            </a:lvl6pPr>
-            <a:lvl7pPr marL="2971800" indent="-228600" algn="l" defTabSz="914400" rtl="0" eaLnBrk="1" latinLnBrk="0" hangingPunct="1">
-              <a:spcBef>
-                <a:spcPct val="20000"/>
-              </a:spcBef>
-              <a:buFont typeface="Arial" pitchFamily="34" charset="0"/>
-              <a:buChar char="•"/>
-              <a:defRPr sz="2000" kern="1200">
-                <a:solidFill>
-                  <a:schemeClr val="tx1"/>
-                </a:solidFill>
-                <a:latin typeface="+mn-lt"/>
-                <a:ea typeface="+mn-ea"/>
-                <a:cs typeface="+mn-cs"/>
-              </a:defRPr>
-            </a:lvl7pPr>
-            <a:lvl8pPr marL="3429000" indent="-228600" algn="l" defTabSz="914400" rtl="0" eaLnBrk="1" latinLnBrk="0" hangingPunct="1">
-              <a:spcBef>
-                <a:spcPct val="20000"/>
-              </a:spcBef>
-              <a:buFont typeface="Arial" pitchFamily="34" charset="0"/>
-              <a:buChar char="•"/>
-              <a:defRPr sz="2000" kern="1200">
-                <a:solidFill>
-                  <a:schemeClr val="tx1"/>
-                </a:solidFill>
-                <a:latin typeface="+mn-lt"/>
-                <a:ea typeface="+mn-ea"/>
-                <a:cs typeface="+mn-cs"/>
-              </a:defRPr>
-            </a:lvl8pPr>
-            <a:lvl9pPr marL="3886200" indent="-228600" algn="l" defTabSz="914400" rtl="0" eaLnBrk="1" latinLnBrk="0" hangingPunct="1">
-              <a:spcBef>
-                <a:spcPct val="20000"/>
-              </a:spcBef>
-              <a:buFont typeface="Arial" pitchFamily="34" charset="0"/>
-              <a:buChar char="•"/>
-              <a:defRPr sz="2000" kern="1200">
-                <a:solidFill>
-                  <a:schemeClr val="tx1"/>
-                </a:solidFill>
-                <a:latin typeface="+mn-lt"/>
-                <a:ea typeface="+mn-ea"/>
-                <a:cs typeface="+mn-cs"/>
-              </a:defRPr>
-            </a:lvl9pPr>
-          </a:lstStyle>
-          <a:p>
-            <a:endParaRPr lang="en-US" dirty="0" smtClean="0"/>
-          </a:p>
-          <a:p>
-            <a:pPr marL="0" indent="0">
-              <a:buNone/>
-            </a:pPr>
-            <a:endParaRPr lang="en-US" dirty="0" smtClean="0"/>
-          </a:p>
-          <a:p>
-            <a:endParaRPr lang="en-US" dirty="0" smtClean="0"/>
-          </a:p>
-          <a:p>
-            <a:endParaRPr lang="en-US" dirty="0"/>
-          </a:p>
-        </p:txBody>
-      </p:sp>
-      <p:graphicFrame>
-        <p:nvGraphicFramePr>
-          <p:cNvPr id="9" name="Table 8"/>
-          <p:cNvGraphicFramePr>
-            <a:graphicFrameLocks noGrp="1"/>
-          </p:cNvGraphicFramePr>
-          <p:nvPr>
-            <p:extLst>
-              <p:ext uri="{D42A27DB-BD31-4B8C-83A1-F6EECF244321}">
-                <p14:modId xmlns:p14="http://schemas.microsoft.com/office/powerpoint/2010/main" val="239262729"/>
-              </p:ext>
-            </p:extLst>
-          </p:nvPr>
-        </p:nvGraphicFramePr>
-        <p:xfrm>
-          <a:off x="2667000" y="2932546"/>
-          <a:ext cx="3962400" cy="2636520"/>
-        </p:xfrm>
-        <a:graphic>
-          <a:graphicData uri="http://schemas.openxmlformats.org/drawingml/2006/table">
-            <a:tbl>
-              <a:tblPr/>
-              <a:tblGrid>
-                <a:gridCol w="3962400"/>
-              </a:tblGrid>
-              <a:tr h="533400">
-                <a:tc>
-                  <a:txBody>
-                    <a:bodyPr/>
-                    <a:lstStyle/>
-                    <a:p>
-                      <a:pPr algn="ctr"/>
-                      <a:r>
-                        <a:rPr lang="en-US" dirty="0" smtClean="0"/>
-                        <a:t>GAME OBJECT</a:t>
-                      </a:r>
-                      <a:endParaRPr lang="en-US" dirty="0"/>
-                    </a:p>
-                  </a:txBody>
-                  <a:tcPr>
-                    <a:lnL w="12700" cmpd="sng">
-                      <a:solidFill>
-                        <a:schemeClr val="tx1"/>
-                      </a:solidFill>
-                      <a:prstDash val="solid"/>
-                    </a:lnL>
-                    <a:lnR w="12700" cmpd="sng">
-                      <a:solidFill>
-                        <a:schemeClr val="tx1"/>
-                      </a:solidFill>
-                      <a:prstDash val="solid"/>
-                    </a:lnR>
-                    <a:lnT w="12700" cmpd="sng">
-                      <a:solidFill>
-                        <a:schemeClr val="tx1"/>
-                      </a:solidFill>
-                      <a:prstDash val="solid"/>
-                    </a:lnT>
-                    <a:lnB w="12700" cap="flat" cmpd="sng" algn="ctr">
-                      <a:solidFill>
-                        <a:schemeClr val="tx1"/>
-                      </a:solidFill>
-                      <a:prstDash val="solid"/>
-                      <a:round/>
-                      <a:headEnd type="none" w="med" len="med"/>
-                      <a:tailEnd type="none" w="med" len="med"/>
-                    </a:lnB>
-                  </a:tcPr>
-                </a:tc>
-              </a:tr>
-              <a:tr h="895927">
-                <a:tc>
-                  <a:txBody>
-                    <a:bodyPr/>
-                    <a:lstStyle/>
-                    <a:p>
-                      <a:r>
-                        <a:rPr lang="en-US" dirty="0" smtClean="0"/>
-                        <a:t>position</a:t>
-                      </a:r>
-                    </a:p>
-                    <a:p>
-                      <a:r>
-                        <a:rPr lang="en-US" dirty="0" smtClean="0"/>
-                        <a:t>sprite</a:t>
-                      </a:r>
-                    </a:p>
-                    <a:p>
-                      <a:r>
-                        <a:rPr lang="en-US" dirty="0" err="1" smtClean="0"/>
-                        <a:t>onUpdate</a:t>
-                      </a:r>
-                      <a:r>
-                        <a:rPr lang="en-US" baseline="0" dirty="0" err="1" smtClean="0"/>
-                        <a:t>Signal</a:t>
-                      </a:r>
-                      <a:endParaRPr lang="en-US" dirty="0"/>
-                    </a:p>
-                  </a:txBody>
-                  <a:tcPr>
-                    <a:lnL w="12700" cmpd="sng">
-                      <a:solidFill>
-                        <a:schemeClr val="tx1"/>
-                      </a:solidFill>
-                      <a:prstDash val="solid"/>
-                    </a:lnL>
-                    <a:lnR w="12700" cmpd="sng">
-                      <a:solidFill>
-                        <a:schemeClr val="tx1"/>
-                      </a:solidFill>
-                      <a:prstDash val="solid"/>
-                    </a:lnR>
-                    <a:lnT w="12700" cmpd="sng">
-                      <a:solidFill>
-                        <a:schemeClr val="tx1"/>
-                      </a:solidFill>
-                      <a:prstDash val="solid"/>
-                    </a:lnT>
-                    <a:lnB w="12700" cap="flat" cmpd="sng" algn="ctr">
-                      <a:solidFill>
-                        <a:schemeClr val="tx1"/>
-                      </a:solidFill>
-                      <a:prstDash val="solid"/>
-                      <a:round/>
-                      <a:headEnd type="none" w="med" len="med"/>
-                      <a:tailEnd type="none" w="med" len="med"/>
-                    </a:lnB>
-                  </a:tcPr>
-                </a:tc>
-              </a:tr>
-              <a:tr h="895927">
-                <a:tc>
-                  <a:txBody>
-                    <a:bodyPr/>
-                    <a:lstStyle/>
-                    <a:p>
-                      <a:r>
-                        <a:rPr lang="en-US" dirty="0" err="1" smtClean="0"/>
-                        <a:t>GameObject</a:t>
-                      </a:r>
-                      <a:endParaRPr lang="en-US" dirty="0" smtClean="0"/>
-                    </a:p>
-                    <a:p>
-                      <a:r>
-                        <a:rPr lang="en-US" dirty="0" smtClean="0"/>
-                        <a:t>Render</a:t>
-                      </a:r>
-                    </a:p>
-                    <a:p>
-                      <a:r>
-                        <a:rPr lang="en-US" dirty="0" err="1" smtClean="0"/>
-                        <a:t>GetSprite</a:t>
-                      </a:r>
-                      <a:endParaRPr lang="en-US" dirty="0" smtClean="0"/>
-                    </a:p>
-                    <a:p>
-                      <a:r>
-                        <a:rPr lang="en-US" dirty="0" err="1" smtClean="0"/>
-                        <a:t>SetSprite</a:t>
-                      </a:r>
-                      <a:endParaRPr lang="en-US" dirty="0"/>
-                    </a:p>
-                  </a:txBody>
-                  <a:tcPr>
-                    <a:lnL w="12700" cmpd="sng">
-                      <a:solidFill>
-                        <a:schemeClr val="tx1"/>
-                      </a:solidFill>
-                      <a:prstDash val="solid"/>
-                    </a:lnL>
-                    <a:lnR w="12700" cmpd="sng">
-                      <a:solidFill>
-                        <a:schemeClr val="tx1"/>
-                      </a:solidFill>
-                      <a:prstDash val="solid"/>
-                    </a:lnR>
-                    <a:lnT w="12700" cmpd="sng">
-                      <a:solidFill>
-                        <a:schemeClr val="tx1"/>
-                      </a:solidFill>
-                      <a:prstDash val="solid"/>
-                    </a:lnT>
-                    <a:lnB w="12700" cmpd="sng">
-                      <a:solidFill>
-                        <a:schemeClr val="tx1"/>
-                      </a:solidFill>
-                      <a:prstDash val="solid"/>
-                    </a:lnB>
-                  </a:tcPr>
-                </a:tc>
-              </a:tr>
-            </a:tbl>
-          </a:graphicData>
-        </a:graphic>
-      </p:graphicFrame>
-      <p:sp>
-        <p:nvSpPr>
-          <p:cNvPr id="10" name="TextBox 9"/>
-          <p:cNvSpPr txBox="1"/>
-          <p:nvPr/>
-        </p:nvSpPr>
-        <p:spPr>
-          <a:xfrm>
-            <a:off x="3733800" y="1871807"/>
-            <a:ext cx="1465529" cy="369332"/>
+        </p:nvPicPr>
+        <p:blipFill>
+          <a:blip r:embed="rId3" cstate="print">
+            <a:extLst>
+              <a:ext uri="{28A0092B-C50C-407E-A947-70E740481C1C}">
+                <a14:useLocalDpi xmlns:a14="http://schemas.microsoft.com/office/drawing/2010/main" val="0"/>
+              </a:ext>
+            </a:extLst>
+          </a:blip>
+          <a:srcRect/>
+          <a:stretch>
+            <a:fillRect/>
+          </a:stretch>
+        </p:blipFill>
+        <p:spPr bwMode="auto">
+          <a:xfrm>
+            <a:off x="7620000" y="331940"/>
+            <a:ext cx="1143000" cy="1420660"/>
           </a:xfrm>
           <a:prstGeom prst="rect">
             <a:avLst/>
           </a:prstGeom>
           <a:noFill/>
-        </p:spPr>
-        <p:txBody>
-          <a:bodyPr wrap="none" rtlCol="0">
-            <a:spAutoFit/>
-          </a:bodyPr>
-          <a:lstStyle/>
-          <a:p>
-            <a:r>
-              <a:rPr lang="en-US" dirty="0" smtClean="0"/>
-              <a:t>UML Diagram</a:t>
-            </a:r>
-            <a:endParaRPr lang="en-US" dirty="0"/>
-          </a:p>
-        </p:txBody>
-      </p:sp>
+          <a:extLst>
+            <a:ext uri="{909E8E84-426E-40DD-AFC4-6F175D3DCCD1}">
+              <a14:hiddenFill xmlns:a14="http://schemas.microsoft.com/office/drawing/2010/main">
+                <a:solidFill>
+                  <a:srgbClr val="FFFFFF"/>
+                </a:solidFill>
+              </a14:hiddenFill>
+            </a:ext>
+          </a:extLst>
+        </p:spPr>
+      </p:pic>
     </p:spTree>
     <p:extLst>
       <p:ext uri="{BB962C8B-B14F-4D97-AF65-F5344CB8AC3E}">
-        <p14:creationId xmlns:p14="http://schemas.microsoft.com/office/powerpoint/2010/main" val="2761245267"/>
+        <p14:creationId xmlns:p14="http://schemas.microsoft.com/office/powerpoint/2010/main" val="527548725"/>
       </p:ext>
     </p:extLst>
   </p:cSld>
@@ -5018,41 +4756,25 @@
       </p:grpSpPr>
       <p:sp>
         <p:nvSpPr>
-          <p:cNvPr id="4" name="Title 1"/>
-          <p:cNvSpPr txBox="1">
-            <a:spLocks/>
-          </p:cNvSpPr>
-          <p:nvPr/>
+          <p:cNvPr id="2" name="Title 1"/>
+          <p:cNvSpPr>
+            <a:spLocks noGrp="1"/>
+          </p:cNvSpPr>
+          <p:nvPr>
+            <p:ph type="ctrTitle"/>
+          </p:nvPr>
         </p:nvSpPr>
         <p:spPr>
           <a:xfrm>
             <a:off x="762000" y="152400"/>
             <a:ext cx="7772400" cy="1470025"/>
           </a:xfrm>
-          <a:prstGeom prst="rect">
-            <a:avLst/>
-          </a:prstGeom>
-        </p:spPr>
-        <p:txBody>
-          <a:bodyPr vert="horz" lIns="91440" tIns="45720" rIns="91440" bIns="45720" rtlCol="0" anchor="ctr">
+        </p:spPr>
+        <p:txBody>
+          <a:bodyPr>
             <a:normAutofit/>
           </a:bodyPr>
-          <a:lstStyle>
-            <a:lvl1pPr algn="ctr" defTabSz="914400" rtl="0" eaLnBrk="1" latinLnBrk="0" hangingPunct="1">
-              <a:spcBef>
-                <a:spcPct val="0"/>
-              </a:spcBef>
-              <a:buNone/>
-              <a:defRPr sz="4400" kern="1200">
-                <a:solidFill>
-                  <a:schemeClr val="tx1"/>
-                </a:solidFill>
-                <a:latin typeface="+mj-lt"/>
-                <a:ea typeface="+mj-ea"/>
-                <a:cs typeface="+mj-cs"/>
-              </a:defRPr>
-            </a:lvl1pPr>
-          </a:lstStyle>
+          <a:lstStyle/>
           <a:p>
             <a:r>
               <a:rPr lang="en-US" sz="4000" dirty="0" smtClean="0"/>
@@ -5062,9 +4784,65 @@
           </a:p>
         </p:txBody>
       </p:sp>
+      <p:sp>
+        <p:nvSpPr>
+          <p:cNvPr id="3" name="Subtitle 2"/>
+          <p:cNvSpPr>
+            <a:spLocks noGrp="1"/>
+          </p:cNvSpPr>
+          <p:nvPr>
+            <p:ph type="subTitle" idx="1"/>
+          </p:nvPr>
+        </p:nvSpPr>
+        <p:spPr>
+          <a:xfrm>
+            <a:off x="1447800" y="1600200"/>
+            <a:ext cx="6400800" cy="4648200"/>
+          </a:xfrm>
+        </p:spPr>
+        <p:txBody>
+          <a:bodyPr>
+            <a:normAutofit/>
+          </a:bodyPr>
+          <a:lstStyle/>
+          <a:p>
+            <a:r>
+              <a:rPr lang="en-US" dirty="0" smtClean="0">
+                <a:solidFill>
+                  <a:schemeClr val="tx1"/>
+                </a:solidFill>
+              </a:rPr>
+              <a:t>Team Project - Group 4</a:t>
+            </a:r>
+          </a:p>
+          <a:p>
+            <a:endParaRPr lang="en-US" dirty="0" smtClean="0">
+              <a:solidFill>
+                <a:schemeClr val="tx1"/>
+              </a:solidFill>
+            </a:endParaRPr>
+          </a:p>
+          <a:p>
+            <a:endParaRPr lang="en-US" sz="2800" dirty="0" smtClean="0">
+              <a:solidFill>
+                <a:schemeClr val="tx1"/>
+              </a:solidFill>
+            </a:endParaRPr>
+          </a:p>
+          <a:p>
+            <a:endParaRPr lang="en-US" dirty="0"/>
+          </a:p>
+          <a:p>
+            <a:endParaRPr lang="en-US" dirty="0" smtClean="0"/>
+          </a:p>
+          <a:p>
+            <a:endParaRPr lang="en-US" dirty="0"/>
+          </a:p>
+        </p:txBody>
+      </p:sp>
       <p:pic>
         <p:nvPicPr>
-          <p:cNvPr id="5" name="Picture 4"/>
+          <p:cNvPr id="4" name="Picture 3"/>
           <p:cNvPicPr>
             <a:picLocks noChangeAspect="1"/>
           </p:cNvPicPr>
@@ -5084,7 +4862,7 @@
         </p:blipFill>
         <p:spPr>
           <a:xfrm>
-            <a:off x="678008" y="533400"/>
+            <a:off x="381000" y="389771"/>
             <a:ext cx="1143000" cy="1439029"/>
           </a:xfrm>
           <a:prstGeom prst="rect">
@@ -5092,383 +4870,200 @@
           </a:prstGeom>
         </p:spPr>
       </p:pic>
-      <p:sp>
-        <p:nvSpPr>
-          <p:cNvPr id="6" name="Subtitle 2"/>
-          <p:cNvSpPr txBox="1">
-            <a:spLocks/>
-          </p:cNvSpPr>
+      <p:pic>
+        <p:nvPicPr>
+          <p:cNvPr id="5" name="Picture 2" descr="http://www.faerymysterium.com/uploads/9/1/7/6/9176783/oak-tree-light_6587529_orig.jpg"/>
+          <p:cNvPicPr>
+            <a:picLocks noChangeAspect="1" noChangeArrowheads="1"/>
+          </p:cNvPicPr>
           <p:nvPr/>
-        </p:nvSpPr>
-        <p:spPr>
-          <a:xfrm>
-            <a:off x="1447800" y="1600200"/>
-            <a:ext cx="6400800" cy="4648200"/>
-          </a:xfrm>
-          <a:prstGeom prst="rect">
-            <a:avLst/>
-          </a:prstGeom>
-        </p:spPr>
-        <p:txBody>
-          <a:bodyPr vert="horz" lIns="91440" tIns="45720" rIns="91440" bIns="45720" rtlCol="0">
-            <a:normAutofit/>
-          </a:bodyPr>
-          <a:lstStyle>
-            <a:lvl1pPr marL="342900" indent="-342900" algn="l" defTabSz="914400" rtl="0" eaLnBrk="1" latinLnBrk="0" hangingPunct="1">
-              <a:spcBef>
-                <a:spcPct val="20000"/>
-              </a:spcBef>
-              <a:buFont typeface="Arial" pitchFamily="34" charset="0"/>
-              <a:buChar char="•"/>
-              <a:defRPr sz="3200" kern="1200">
-                <a:solidFill>
-                  <a:schemeClr val="tx1"/>
-                </a:solidFill>
-                <a:latin typeface="+mn-lt"/>
-                <a:ea typeface="+mn-ea"/>
-                <a:cs typeface="+mn-cs"/>
-              </a:defRPr>
-            </a:lvl1pPr>
-            <a:lvl2pPr marL="742950" indent="-285750" algn="l" defTabSz="914400" rtl="0" eaLnBrk="1" latinLnBrk="0" hangingPunct="1">
-              <a:spcBef>
-                <a:spcPct val="20000"/>
-              </a:spcBef>
-              <a:buFont typeface="Arial" pitchFamily="34" charset="0"/>
-              <a:buChar char="–"/>
-              <a:defRPr sz="2800" kern="1200">
-                <a:solidFill>
-                  <a:schemeClr val="tx1"/>
-                </a:solidFill>
-                <a:latin typeface="+mn-lt"/>
-                <a:ea typeface="+mn-ea"/>
-                <a:cs typeface="+mn-cs"/>
-              </a:defRPr>
-            </a:lvl2pPr>
-            <a:lvl3pPr marL="1143000" indent="-228600" algn="l" defTabSz="914400" rtl="0" eaLnBrk="1" latinLnBrk="0" hangingPunct="1">
-              <a:spcBef>
-                <a:spcPct val="20000"/>
-              </a:spcBef>
-              <a:buFont typeface="Arial" pitchFamily="34" charset="0"/>
-              <a:buChar char="•"/>
-              <a:defRPr sz="2400" kern="1200">
-                <a:solidFill>
-                  <a:schemeClr val="tx1"/>
-                </a:solidFill>
-                <a:latin typeface="+mn-lt"/>
-                <a:ea typeface="+mn-ea"/>
-                <a:cs typeface="+mn-cs"/>
-              </a:defRPr>
-            </a:lvl3pPr>
-            <a:lvl4pPr marL="1600200" indent="-228600" algn="l" defTabSz="914400" rtl="0" eaLnBrk="1" latinLnBrk="0" hangingPunct="1">
-              <a:spcBef>
-                <a:spcPct val="20000"/>
-              </a:spcBef>
-              <a:buFont typeface="Arial" pitchFamily="34" charset="0"/>
-              <a:buChar char="–"/>
-              <a:defRPr sz="2000" kern="1200">
-                <a:solidFill>
-                  <a:schemeClr val="tx1"/>
-                </a:solidFill>
-                <a:latin typeface="+mn-lt"/>
-                <a:ea typeface="+mn-ea"/>
-                <a:cs typeface="+mn-cs"/>
-              </a:defRPr>
-            </a:lvl4pPr>
-            <a:lvl5pPr marL="2057400" indent="-228600" algn="l" defTabSz="914400" rtl="0" eaLnBrk="1" latinLnBrk="0" hangingPunct="1">
-              <a:spcBef>
-                <a:spcPct val="20000"/>
-              </a:spcBef>
-              <a:buFont typeface="Arial" pitchFamily="34" charset="0"/>
-              <a:buChar char="»"/>
-              <a:defRPr sz="2000" kern="1200">
-                <a:solidFill>
-                  <a:schemeClr val="tx1"/>
-                </a:solidFill>
-                <a:latin typeface="+mn-lt"/>
-                <a:ea typeface="+mn-ea"/>
-                <a:cs typeface="+mn-cs"/>
-              </a:defRPr>
-            </a:lvl5pPr>
-            <a:lvl6pPr marL="2514600" indent="-228600" algn="l" defTabSz="914400" rtl="0" eaLnBrk="1" latinLnBrk="0" hangingPunct="1">
-              <a:spcBef>
-                <a:spcPct val="20000"/>
-              </a:spcBef>
-              <a:buFont typeface="Arial" pitchFamily="34" charset="0"/>
-              <a:buChar char="•"/>
-              <a:defRPr sz="2000" kern="1200">
-                <a:solidFill>
-                  <a:schemeClr val="tx1"/>
-                </a:solidFill>
-                <a:latin typeface="+mn-lt"/>
-                <a:ea typeface="+mn-ea"/>
-                <a:cs typeface="+mn-cs"/>
-              </a:defRPr>
-            </a:lvl6pPr>
-            <a:lvl7pPr marL="2971800" indent="-228600" algn="l" defTabSz="914400" rtl="0" eaLnBrk="1" latinLnBrk="0" hangingPunct="1">
-              <a:spcBef>
-                <a:spcPct val="20000"/>
-              </a:spcBef>
-              <a:buFont typeface="Arial" pitchFamily="34" charset="0"/>
-              <a:buChar char="•"/>
-              <a:defRPr sz="2000" kern="1200">
-                <a:solidFill>
-                  <a:schemeClr val="tx1"/>
-                </a:solidFill>
-                <a:latin typeface="+mn-lt"/>
-                <a:ea typeface="+mn-ea"/>
-                <a:cs typeface="+mn-cs"/>
-              </a:defRPr>
-            </a:lvl7pPr>
-            <a:lvl8pPr marL="3429000" indent="-228600" algn="l" defTabSz="914400" rtl="0" eaLnBrk="1" latinLnBrk="0" hangingPunct="1">
-              <a:spcBef>
-                <a:spcPct val="20000"/>
-              </a:spcBef>
-              <a:buFont typeface="Arial" pitchFamily="34" charset="0"/>
-              <a:buChar char="•"/>
-              <a:defRPr sz="2000" kern="1200">
-                <a:solidFill>
-                  <a:schemeClr val="tx1"/>
-                </a:solidFill>
-                <a:latin typeface="+mn-lt"/>
-                <a:ea typeface="+mn-ea"/>
-                <a:cs typeface="+mn-cs"/>
-              </a:defRPr>
-            </a:lvl8pPr>
-            <a:lvl9pPr marL="3886200" indent="-228600" algn="l" defTabSz="914400" rtl="0" eaLnBrk="1" latinLnBrk="0" hangingPunct="1">
-              <a:spcBef>
-                <a:spcPct val="20000"/>
-              </a:spcBef>
-              <a:buFont typeface="Arial" pitchFamily="34" charset="0"/>
-              <a:buChar char="•"/>
-              <a:defRPr sz="2000" kern="1200">
-                <a:solidFill>
-                  <a:schemeClr val="tx1"/>
-                </a:solidFill>
-                <a:latin typeface="+mn-lt"/>
-                <a:ea typeface="+mn-ea"/>
-                <a:cs typeface="+mn-cs"/>
-              </a:defRPr>
-            </a:lvl9pPr>
-          </a:lstStyle>
-          <a:p>
-            <a:endParaRPr lang="en-US" dirty="0" smtClean="0"/>
-          </a:p>
-          <a:p>
-            <a:pPr marL="0" indent="0">
-              <a:buNone/>
-            </a:pPr>
-            <a:endParaRPr lang="en-US" dirty="0" smtClean="0"/>
-          </a:p>
-          <a:p>
-            <a:endParaRPr lang="en-US" dirty="0" smtClean="0"/>
-          </a:p>
-          <a:p>
-            <a:endParaRPr lang="en-US" dirty="0"/>
-          </a:p>
-        </p:txBody>
-      </p:sp>
-      <p:graphicFrame>
-        <p:nvGraphicFramePr>
-          <p:cNvPr id="9" name="Table 8"/>
-          <p:cNvGraphicFramePr>
-            <a:graphicFrameLocks noGrp="1"/>
-          </p:cNvGraphicFramePr>
-          <p:nvPr>
-            <p:extLst>
-              <p:ext uri="{D42A27DB-BD31-4B8C-83A1-F6EECF244321}">
-                <p14:modId xmlns:p14="http://schemas.microsoft.com/office/powerpoint/2010/main" val="2468536151"/>
-              </p:ext>
-            </p:extLst>
-          </p:nvPr>
-        </p:nvGraphicFramePr>
-        <p:xfrm>
-          <a:off x="2667000" y="2932546"/>
-          <a:ext cx="3962400" cy="2343727"/>
-        </p:xfrm>
-        <a:graphic>
-          <a:graphicData uri="http://schemas.openxmlformats.org/drawingml/2006/table">
-            <a:tbl>
-              <a:tblPr/>
-              <a:tblGrid>
-                <a:gridCol w="3962400"/>
-              </a:tblGrid>
-              <a:tr h="533400">
-                <a:tc>
-                  <a:txBody>
-                    <a:bodyPr/>
-                    <a:lstStyle/>
-                    <a:p>
-                      <a:pPr algn="ctr"/>
-                      <a:r>
-                        <a:rPr lang="en-US" dirty="0" smtClean="0"/>
-                        <a:t>PADDLE</a:t>
-                      </a:r>
-                      <a:endParaRPr lang="en-US" dirty="0"/>
-                    </a:p>
-                  </a:txBody>
-                  <a:tcPr>
-                    <a:lnL w="12700" cmpd="sng">
-                      <a:solidFill>
-                        <a:schemeClr val="tx1"/>
-                      </a:solidFill>
-                      <a:prstDash val="solid"/>
-                    </a:lnL>
-                    <a:lnR w="12700" cmpd="sng">
-                      <a:solidFill>
-                        <a:schemeClr val="tx1"/>
-                      </a:solidFill>
-                      <a:prstDash val="solid"/>
-                    </a:lnR>
-                    <a:lnT w="12700" cmpd="sng">
-                      <a:solidFill>
-                        <a:schemeClr val="tx1"/>
-                      </a:solidFill>
-                      <a:prstDash val="solid"/>
-                    </a:lnT>
-                    <a:lnB w="12700" cap="flat" cmpd="sng" algn="ctr">
-                      <a:solidFill>
-                        <a:schemeClr val="tx1"/>
-                      </a:solidFill>
-                      <a:prstDash val="solid"/>
-                      <a:round/>
-                      <a:headEnd type="none" w="med" len="med"/>
-                      <a:tailEnd type="none" w="med" len="med"/>
-                    </a:lnB>
-                  </a:tcPr>
-                </a:tc>
-              </a:tr>
-              <a:tr h="895927">
-                <a:tc>
-                  <a:txBody>
-                    <a:bodyPr/>
-                    <a:lstStyle/>
-                    <a:p>
-                      <a:endParaRPr lang="en-US" dirty="0"/>
-                    </a:p>
-                  </a:txBody>
-                  <a:tcPr>
-                    <a:lnL w="12700" cmpd="sng">
-                      <a:solidFill>
-                        <a:schemeClr val="tx1"/>
-                      </a:solidFill>
-                      <a:prstDash val="solid"/>
-                    </a:lnL>
-                    <a:lnR w="12700" cmpd="sng">
-                      <a:solidFill>
-                        <a:schemeClr val="tx1"/>
-                      </a:solidFill>
-                      <a:prstDash val="solid"/>
-                    </a:lnR>
-                    <a:lnT w="12700" cmpd="sng">
-                      <a:solidFill>
-                        <a:schemeClr val="tx1"/>
-                      </a:solidFill>
-                      <a:prstDash val="solid"/>
-                    </a:lnT>
-                    <a:lnB w="12700" cap="flat" cmpd="sng" algn="ctr">
-                      <a:solidFill>
-                        <a:schemeClr val="tx1"/>
-                      </a:solidFill>
-                      <a:prstDash val="solid"/>
-                      <a:round/>
-                      <a:headEnd type="none" w="med" len="med"/>
-                      <a:tailEnd type="none" w="med" len="med"/>
-                    </a:lnB>
-                  </a:tcPr>
-                </a:tc>
-              </a:tr>
-              <a:tr h="895927">
-                <a:tc>
-                  <a:txBody>
-                    <a:bodyPr/>
-                    <a:lstStyle/>
-                    <a:p>
-                      <a:r>
-                        <a:rPr lang="en-US" dirty="0" smtClean="0"/>
-                        <a:t>Paddle</a:t>
-                      </a:r>
-                    </a:p>
-                    <a:p>
-                      <a:r>
-                        <a:rPr lang="en-US" dirty="0" err="1" smtClean="0"/>
-                        <a:t>MoveUp</a:t>
-                      </a:r>
-                      <a:endParaRPr lang="en-US" dirty="0" smtClean="0"/>
-                    </a:p>
-                    <a:p>
-                      <a:r>
-                        <a:rPr lang="en-US" dirty="0" err="1" smtClean="0"/>
-                        <a:t>MoveDown</a:t>
-                      </a:r>
-                      <a:endParaRPr lang="en-US" dirty="0"/>
-                    </a:p>
-                  </a:txBody>
-                  <a:tcPr>
-                    <a:lnL w="12700" cmpd="sng">
-                      <a:solidFill>
-                        <a:schemeClr val="tx1"/>
-                      </a:solidFill>
-                      <a:prstDash val="solid"/>
-                    </a:lnL>
-                    <a:lnR w="12700" cmpd="sng">
-                      <a:solidFill>
-                        <a:schemeClr val="tx1"/>
-                      </a:solidFill>
-                      <a:prstDash val="solid"/>
-                    </a:lnR>
-                    <a:lnT w="12700" cmpd="sng">
-                      <a:solidFill>
-                        <a:schemeClr val="tx1"/>
-                      </a:solidFill>
-                      <a:prstDash val="solid"/>
-                    </a:lnT>
-                    <a:lnB w="12700" cmpd="sng">
-                      <a:solidFill>
-                        <a:schemeClr val="tx1"/>
-                      </a:solidFill>
-                      <a:prstDash val="solid"/>
-                    </a:lnB>
-                  </a:tcPr>
-                </a:tc>
-              </a:tr>
-            </a:tbl>
-          </a:graphicData>
-        </a:graphic>
-      </p:graphicFrame>
-      <p:sp>
-        <p:nvSpPr>
-          <p:cNvPr id="10" name="TextBox 9"/>
-          <p:cNvSpPr txBox="1"/>
-          <p:nvPr/>
-        </p:nvSpPr>
-        <p:spPr>
-          <a:xfrm>
-            <a:off x="3733800" y="1871807"/>
-            <a:ext cx="1465529" cy="369332"/>
+        </p:nvPicPr>
+        <p:blipFill>
+          <a:blip r:embed="rId3" cstate="print">
+            <a:extLst>
+              <a:ext uri="{28A0092B-C50C-407E-A947-70E740481C1C}">
+                <a14:useLocalDpi xmlns:a14="http://schemas.microsoft.com/office/drawing/2010/main" val="0"/>
+              </a:ext>
+            </a:extLst>
+          </a:blip>
+          <a:srcRect/>
+          <a:stretch>
+            <a:fillRect/>
+          </a:stretch>
+        </p:blipFill>
+        <p:spPr bwMode="auto">
+          <a:xfrm>
+            <a:off x="7620000" y="331940"/>
+            <a:ext cx="1143000" cy="1420660"/>
           </a:xfrm>
           <a:prstGeom prst="rect">
             <a:avLst/>
           </a:prstGeom>
           <a:noFill/>
-        </p:spPr>
-        <p:txBody>
-          <a:bodyPr wrap="none" rtlCol="0">
+          <a:extLst>
+            <a:ext uri="{909E8E84-426E-40DD-AFC4-6F175D3DCCD1}">
+              <a14:hiddenFill xmlns:a14="http://schemas.microsoft.com/office/drawing/2010/main">
+                <a:solidFill>
+                  <a:srgbClr val="FFFFFF"/>
+                </a:solidFill>
+              </a14:hiddenFill>
+            </a:ext>
+          </a:extLst>
+        </p:spPr>
+      </p:pic>
+      <p:pic>
+        <p:nvPicPr>
+          <p:cNvPr id="6" name="Picture 2" descr="C:\Users\Dan\Documents\JAVA Programming\Group Project\project_uml.png"/>
+          <p:cNvPicPr>
+            <a:picLocks noChangeAspect="1" noChangeArrowheads="1"/>
+          </p:cNvPicPr>
+          <p:nvPr/>
+        </p:nvPicPr>
+        <p:blipFill>
+          <a:blip r:embed="rId4" cstate="print">
+            <a:extLst>
+              <a:ext uri="{28A0092B-C50C-407E-A947-70E740481C1C}">
+                <a14:useLocalDpi xmlns:a14="http://schemas.microsoft.com/office/drawing/2010/main" val="0"/>
+              </a:ext>
+            </a:extLst>
+          </a:blip>
+          <a:srcRect/>
+          <a:stretch>
+            <a:fillRect/>
+          </a:stretch>
+        </p:blipFill>
+        <p:spPr bwMode="auto">
+          <a:xfrm>
+            <a:off x="3429000" y="3008594"/>
+            <a:ext cx="4747352" cy="3087406"/>
+          </a:xfrm>
+          <a:prstGeom prst="rect">
+            <a:avLst/>
+          </a:prstGeom>
+          <a:noFill/>
+          <a:extLst>
+            <a:ext uri="{909E8E84-426E-40DD-AFC4-6F175D3DCCD1}">
+              <a14:hiddenFill xmlns:a14="http://schemas.microsoft.com/office/drawing/2010/main">
+                <a:solidFill>
+                  <a:srgbClr val="FFFFFF"/>
+                </a:solidFill>
+              </a14:hiddenFill>
+            </a:ext>
+          </a:extLst>
+        </p:spPr>
+      </p:pic>
+      <p:pic>
+        <p:nvPicPr>
+          <p:cNvPr id="7" name="Picture 6"/>
+          <p:cNvPicPr>
+            <a:picLocks noChangeAspect="1"/>
+          </p:cNvPicPr>
+          <p:nvPr/>
+        </p:nvPicPr>
+        <p:blipFill>
+          <a:blip r:embed="rId5">
+            <a:extLst>
+              <a:ext uri="{28A0092B-C50C-407E-A947-70E740481C1C}">
+                <a14:useLocalDpi xmlns:a14="http://schemas.microsoft.com/office/drawing/2010/main" val="0"/>
+              </a:ext>
+            </a:extLst>
+          </a:blip>
+          <a:stretch>
+            <a:fillRect/>
+          </a:stretch>
+        </p:blipFill>
+        <p:spPr>
+          <a:xfrm>
+            <a:off x="990600" y="2590800"/>
+            <a:ext cx="2115605" cy="3656200"/>
+          </a:xfrm>
+          <a:prstGeom prst="rect">
+            <a:avLst/>
+          </a:prstGeom>
+        </p:spPr>
+      </p:pic>
+      <p:sp>
+        <p:nvSpPr>
+          <p:cNvPr id="8" name="TextBox 7"/>
+          <p:cNvSpPr txBox="1"/>
+          <p:nvPr/>
+        </p:nvSpPr>
+        <p:spPr>
+          <a:xfrm>
+            <a:off x="4648200" y="2407271"/>
+            <a:ext cx="2514600" cy="369332"/>
+          </a:xfrm>
+          <a:prstGeom prst="rect">
+            <a:avLst/>
+          </a:prstGeom>
+          <a:noFill/>
+        </p:spPr>
+        <p:txBody>
+          <a:bodyPr wrap="square" rtlCol="0">
             <a:spAutoFit/>
           </a:bodyPr>
           <a:lstStyle/>
           <a:p>
             <a:r>
               <a:rPr lang="en-US" dirty="0" smtClean="0"/>
-              <a:t>UML Diagram</a:t>
+              <a:t>UML DIAGRAM</a:t>
             </a:r>
             <a:endParaRPr lang="en-US" dirty="0"/>
+          </a:p>
+        </p:txBody>
+      </p:sp>
+      <p:sp>
+        <p:nvSpPr>
+          <p:cNvPr id="12" name="Up-Down Arrow 11"/>
+          <p:cNvSpPr/>
+          <p:nvPr/>
+        </p:nvSpPr>
+        <p:spPr>
+          <a:xfrm rot="6236271">
+            <a:off x="3982083" y="2265437"/>
+            <a:ext cx="160004" cy="1609034"/>
+          </a:xfrm>
+          <a:prstGeom prst="upDownArrow">
+            <a:avLst/>
+          </a:prstGeom>
+          <a:solidFill>
+            <a:schemeClr val="tx1"/>
+          </a:solidFill>
+          <a:ln>
+            <a:solidFill>
+              <a:schemeClr val="tx1"/>
+            </a:solidFill>
+          </a:ln>
+        </p:spPr>
+        <p:style>
+          <a:lnRef idx="2">
+            <a:schemeClr val="accent1">
+              <a:shade val="50000"/>
+            </a:schemeClr>
+          </a:lnRef>
+          <a:fillRef idx="1">
+            <a:schemeClr val="accent1"/>
+          </a:fillRef>
+          <a:effectRef idx="0">
+            <a:schemeClr val="accent1"/>
+          </a:effectRef>
+          <a:fontRef idx="minor">
+            <a:schemeClr val="lt1"/>
+          </a:fontRef>
+        </p:style>
+        <p:txBody>
+          <a:bodyPr rtlCol="0" anchor="ctr"/>
+          <a:lstStyle/>
+          <a:p>
+            <a:pPr algn="ctr"/>
+            <a:endParaRPr lang="en-US"/>
           </a:p>
         </p:txBody>
       </p:sp>
     </p:spTree>
     <p:extLst>
       <p:ext uri="{BB962C8B-B14F-4D97-AF65-F5344CB8AC3E}">
-        <p14:creationId xmlns:p14="http://schemas.microsoft.com/office/powerpoint/2010/main" val="2761245267"/>
+        <p14:creationId xmlns:p14="http://schemas.microsoft.com/office/powerpoint/2010/main" val="754064452"/>
       </p:ext>
     </p:extLst>
   </p:cSld>
@@ -5504,41 +5099,25 @@
       </p:grpSpPr>
       <p:sp>
         <p:nvSpPr>
-          <p:cNvPr id="4" name="Title 1"/>
-          <p:cNvSpPr txBox="1">
-            <a:spLocks/>
-          </p:cNvSpPr>
-          <p:nvPr/>
+          <p:cNvPr id="2" name="Title 1"/>
+          <p:cNvSpPr>
+            <a:spLocks noGrp="1"/>
+          </p:cNvSpPr>
+          <p:nvPr>
+            <p:ph type="ctrTitle"/>
+          </p:nvPr>
         </p:nvSpPr>
         <p:spPr>
           <a:xfrm>
             <a:off x="762000" y="152400"/>
             <a:ext cx="7772400" cy="1470025"/>
           </a:xfrm>
-          <a:prstGeom prst="rect">
-            <a:avLst/>
-          </a:prstGeom>
-        </p:spPr>
-        <p:txBody>
-          <a:bodyPr vert="horz" lIns="91440" tIns="45720" rIns="91440" bIns="45720" rtlCol="0" anchor="ctr">
+        </p:spPr>
+        <p:txBody>
+          <a:bodyPr>
             <a:normAutofit/>
           </a:bodyPr>
-          <a:lstStyle>
-            <a:lvl1pPr algn="ctr" defTabSz="914400" rtl="0" eaLnBrk="1" latinLnBrk="0" hangingPunct="1">
-              <a:spcBef>
-                <a:spcPct val="0"/>
-              </a:spcBef>
-              <a:buNone/>
-              <a:defRPr sz="4400" kern="1200">
-                <a:solidFill>
-                  <a:schemeClr val="tx1"/>
-                </a:solidFill>
-                <a:latin typeface="+mj-lt"/>
-                <a:ea typeface="+mj-ea"/>
-                <a:cs typeface="+mj-cs"/>
-              </a:defRPr>
-            </a:lvl1pPr>
-          </a:lstStyle>
+          <a:lstStyle/>
           <a:p>
             <a:r>
               <a:rPr lang="en-US" sz="4000" dirty="0" smtClean="0"/>
@@ -5548,9 +5127,137 @@
           </a:p>
         </p:txBody>
       </p:sp>
+      <p:sp>
+        <p:nvSpPr>
+          <p:cNvPr id="3" name="Subtitle 2"/>
+          <p:cNvSpPr>
+            <a:spLocks noGrp="1"/>
+          </p:cNvSpPr>
+          <p:nvPr>
+            <p:ph type="subTitle" idx="1"/>
+          </p:nvPr>
+        </p:nvSpPr>
+        <p:spPr>
+          <a:xfrm>
+            <a:off x="1447800" y="1600200"/>
+            <a:ext cx="6400800" cy="4648200"/>
+          </a:xfrm>
+        </p:spPr>
+        <p:txBody>
+          <a:bodyPr>
+            <a:normAutofit/>
+          </a:bodyPr>
+          <a:lstStyle/>
+          <a:p>
+            <a:r>
+              <a:rPr lang="en-US" dirty="0" smtClean="0">
+                <a:solidFill>
+                  <a:schemeClr val="tx1"/>
+                </a:solidFill>
+              </a:rPr>
+              <a:t>Team Project - Group 4</a:t>
+            </a:r>
+          </a:p>
+          <a:p>
+            <a:endParaRPr lang="en-US" sz="2800" dirty="0" smtClean="0">
+              <a:solidFill>
+                <a:schemeClr val="tx1"/>
+              </a:solidFill>
+            </a:endParaRPr>
+          </a:p>
+          <a:p>
+            <a:r>
+              <a:rPr lang="en-US" sz="2800" dirty="0" smtClean="0">
+                <a:solidFill>
+                  <a:schemeClr val="tx1"/>
+                </a:solidFill>
+              </a:rPr>
+              <a:t>Success and Achievements:</a:t>
+            </a:r>
+            <a:endParaRPr lang="en-US" sz="2800" dirty="0" smtClean="0">
+              <a:solidFill>
+                <a:schemeClr val="tx1"/>
+              </a:solidFill>
+            </a:endParaRPr>
+          </a:p>
+          <a:p>
+            <a:pPr algn="l"/>
+            <a:r>
+              <a:rPr lang="en-US" sz="2800" dirty="0" smtClean="0">
+                <a:solidFill>
+                  <a:schemeClr val="tx1"/>
+                </a:solidFill>
+              </a:rPr>
+              <a:t>	</a:t>
+            </a:r>
+          </a:p>
+          <a:p>
+            <a:pPr marL="457200" indent="-457200" algn="l">
+              <a:buFont typeface="Arial" pitchFamily="34" charset="0"/>
+              <a:buChar char="•"/>
+            </a:pPr>
+            <a:r>
+              <a:rPr lang="en-US" sz="2800" dirty="0" smtClean="0">
+                <a:solidFill>
+                  <a:schemeClr val="tx1"/>
+                </a:solidFill>
+              </a:rPr>
+              <a:t>Team-work and collaborative sharing</a:t>
+            </a:r>
+          </a:p>
+          <a:p>
+            <a:pPr marL="457200" indent="-457200" algn="l">
+              <a:buFont typeface="Arial" pitchFamily="34" charset="0"/>
+              <a:buChar char="•"/>
+            </a:pPr>
+            <a:r>
+              <a:rPr lang="en-US" sz="2800" dirty="0" smtClean="0">
+                <a:solidFill>
+                  <a:schemeClr val="tx1"/>
+                </a:solidFill>
+              </a:rPr>
+              <a:t>Just wait to you see the demonstration</a:t>
+            </a:r>
+          </a:p>
+          <a:p>
+            <a:pPr marL="457200" indent="-457200" algn="l">
+              <a:buFont typeface="Arial" pitchFamily="34" charset="0"/>
+              <a:buChar char="•"/>
+            </a:pPr>
+            <a:endParaRPr lang="en-US" sz="2800" dirty="0" smtClean="0">
+              <a:solidFill>
+                <a:schemeClr val="tx1"/>
+              </a:solidFill>
+            </a:endParaRPr>
+          </a:p>
+          <a:p>
+            <a:endParaRPr lang="en-US" sz="2800" dirty="0" smtClean="0">
+              <a:solidFill>
+                <a:schemeClr val="tx1"/>
+              </a:solidFill>
+            </a:endParaRPr>
+          </a:p>
+          <a:p>
+            <a:endParaRPr lang="en-US" sz="2800" dirty="0" smtClean="0">
+              <a:solidFill>
+                <a:schemeClr val="tx1"/>
+              </a:solidFill>
+            </a:endParaRPr>
+          </a:p>
+          <a:p>
+            <a:endParaRPr lang="en-US" dirty="0"/>
+          </a:p>
+          <a:p>
+            <a:endParaRPr lang="en-US" dirty="0" smtClean="0"/>
+          </a:p>
+          <a:p>
+            <a:endParaRPr lang="en-US" dirty="0"/>
+          </a:p>
+        </p:txBody>
+      </p:sp>
       <p:pic>
         <p:nvPicPr>
-          <p:cNvPr id="5" name="Picture 4"/>
+          <p:cNvPr id="4" name="Picture 3"/>
           <p:cNvPicPr>
             <a:picLocks noChangeAspect="1"/>
           </p:cNvPicPr>
@@ -5570,7 +5277,7 @@
         </p:blipFill>
         <p:spPr>
           <a:xfrm>
-            <a:off x="678008" y="533400"/>
+            <a:off x="381000" y="389771"/>
             <a:ext cx="1143000" cy="1439029"/>
           </a:xfrm>
           <a:prstGeom prst="rect">
@@ -5578,393 +5285,51 @@
           </a:prstGeom>
         </p:spPr>
       </p:pic>
-      <p:sp>
-        <p:nvSpPr>
-          <p:cNvPr id="6" name="Subtitle 2"/>
-          <p:cNvSpPr txBox="1">
-            <a:spLocks/>
-          </p:cNvSpPr>
+      <p:pic>
+        <p:nvPicPr>
+          <p:cNvPr id="5" name="Picture 2" descr="http://www.faerymysterium.com/uploads/9/1/7/6/9176783/oak-tree-light_6587529_orig.jpg"/>
+          <p:cNvPicPr>
+            <a:picLocks noChangeAspect="1" noChangeArrowheads="1"/>
+          </p:cNvPicPr>
           <p:nvPr/>
-        </p:nvSpPr>
-        <p:spPr>
-          <a:xfrm>
-            <a:off x="1447800" y="1600200"/>
-            <a:ext cx="6400800" cy="4648200"/>
-          </a:xfrm>
-          <a:prstGeom prst="rect">
-            <a:avLst/>
-          </a:prstGeom>
-        </p:spPr>
-        <p:txBody>
-          <a:bodyPr vert="horz" lIns="91440" tIns="45720" rIns="91440" bIns="45720" rtlCol="0">
-            <a:normAutofit/>
-          </a:bodyPr>
-          <a:lstStyle>
-            <a:lvl1pPr marL="342900" indent="-342900" algn="l" defTabSz="914400" rtl="0" eaLnBrk="1" latinLnBrk="0" hangingPunct="1">
-              <a:spcBef>
-                <a:spcPct val="20000"/>
-              </a:spcBef>
-              <a:buFont typeface="Arial" pitchFamily="34" charset="0"/>
-              <a:buChar char="•"/>
-              <a:defRPr sz="3200" kern="1200">
-                <a:solidFill>
-                  <a:schemeClr val="tx1"/>
-                </a:solidFill>
-                <a:latin typeface="+mn-lt"/>
-                <a:ea typeface="+mn-ea"/>
-                <a:cs typeface="+mn-cs"/>
-              </a:defRPr>
-            </a:lvl1pPr>
-            <a:lvl2pPr marL="742950" indent="-285750" algn="l" defTabSz="914400" rtl="0" eaLnBrk="1" latinLnBrk="0" hangingPunct="1">
-              <a:spcBef>
-                <a:spcPct val="20000"/>
-              </a:spcBef>
-              <a:buFont typeface="Arial" pitchFamily="34" charset="0"/>
-              <a:buChar char="–"/>
-              <a:defRPr sz="2800" kern="1200">
-                <a:solidFill>
-                  <a:schemeClr val="tx1"/>
-                </a:solidFill>
-                <a:latin typeface="+mn-lt"/>
-                <a:ea typeface="+mn-ea"/>
-                <a:cs typeface="+mn-cs"/>
-              </a:defRPr>
-            </a:lvl2pPr>
-            <a:lvl3pPr marL="1143000" indent="-228600" algn="l" defTabSz="914400" rtl="0" eaLnBrk="1" latinLnBrk="0" hangingPunct="1">
-              <a:spcBef>
-                <a:spcPct val="20000"/>
-              </a:spcBef>
-              <a:buFont typeface="Arial" pitchFamily="34" charset="0"/>
-              <a:buChar char="•"/>
-              <a:defRPr sz="2400" kern="1200">
-                <a:solidFill>
-                  <a:schemeClr val="tx1"/>
-                </a:solidFill>
-                <a:latin typeface="+mn-lt"/>
-                <a:ea typeface="+mn-ea"/>
-                <a:cs typeface="+mn-cs"/>
-              </a:defRPr>
-            </a:lvl3pPr>
-            <a:lvl4pPr marL="1600200" indent="-228600" algn="l" defTabSz="914400" rtl="0" eaLnBrk="1" latinLnBrk="0" hangingPunct="1">
-              <a:spcBef>
-                <a:spcPct val="20000"/>
-              </a:spcBef>
-              <a:buFont typeface="Arial" pitchFamily="34" charset="0"/>
-              <a:buChar char="–"/>
-              <a:defRPr sz="2000" kern="1200">
-                <a:solidFill>
-                  <a:schemeClr val="tx1"/>
-                </a:solidFill>
-                <a:latin typeface="+mn-lt"/>
-                <a:ea typeface="+mn-ea"/>
-                <a:cs typeface="+mn-cs"/>
-              </a:defRPr>
-            </a:lvl4pPr>
-            <a:lvl5pPr marL="2057400" indent="-228600" algn="l" defTabSz="914400" rtl="0" eaLnBrk="1" latinLnBrk="0" hangingPunct="1">
-              <a:spcBef>
-                <a:spcPct val="20000"/>
-              </a:spcBef>
-              <a:buFont typeface="Arial" pitchFamily="34" charset="0"/>
-              <a:buChar char="»"/>
-              <a:defRPr sz="2000" kern="1200">
-                <a:solidFill>
-                  <a:schemeClr val="tx1"/>
-                </a:solidFill>
-                <a:latin typeface="+mn-lt"/>
-                <a:ea typeface="+mn-ea"/>
-                <a:cs typeface="+mn-cs"/>
-              </a:defRPr>
-            </a:lvl5pPr>
-            <a:lvl6pPr marL="2514600" indent="-228600" algn="l" defTabSz="914400" rtl="0" eaLnBrk="1" latinLnBrk="0" hangingPunct="1">
-              <a:spcBef>
-                <a:spcPct val="20000"/>
-              </a:spcBef>
-              <a:buFont typeface="Arial" pitchFamily="34" charset="0"/>
-              <a:buChar char="•"/>
-              <a:defRPr sz="2000" kern="1200">
-                <a:solidFill>
-                  <a:schemeClr val="tx1"/>
-                </a:solidFill>
-                <a:latin typeface="+mn-lt"/>
-                <a:ea typeface="+mn-ea"/>
-                <a:cs typeface="+mn-cs"/>
-              </a:defRPr>
-            </a:lvl6pPr>
-            <a:lvl7pPr marL="2971800" indent="-228600" algn="l" defTabSz="914400" rtl="0" eaLnBrk="1" latinLnBrk="0" hangingPunct="1">
-              <a:spcBef>
-                <a:spcPct val="20000"/>
-              </a:spcBef>
-              <a:buFont typeface="Arial" pitchFamily="34" charset="0"/>
-              <a:buChar char="•"/>
-              <a:defRPr sz="2000" kern="1200">
-                <a:solidFill>
-                  <a:schemeClr val="tx1"/>
-                </a:solidFill>
-                <a:latin typeface="+mn-lt"/>
-                <a:ea typeface="+mn-ea"/>
-                <a:cs typeface="+mn-cs"/>
-              </a:defRPr>
-            </a:lvl7pPr>
-            <a:lvl8pPr marL="3429000" indent="-228600" algn="l" defTabSz="914400" rtl="0" eaLnBrk="1" latinLnBrk="0" hangingPunct="1">
-              <a:spcBef>
-                <a:spcPct val="20000"/>
-              </a:spcBef>
-              <a:buFont typeface="Arial" pitchFamily="34" charset="0"/>
-              <a:buChar char="•"/>
-              <a:defRPr sz="2000" kern="1200">
-                <a:solidFill>
-                  <a:schemeClr val="tx1"/>
-                </a:solidFill>
-                <a:latin typeface="+mn-lt"/>
-                <a:ea typeface="+mn-ea"/>
-                <a:cs typeface="+mn-cs"/>
-              </a:defRPr>
-            </a:lvl8pPr>
-            <a:lvl9pPr marL="3886200" indent="-228600" algn="l" defTabSz="914400" rtl="0" eaLnBrk="1" latinLnBrk="0" hangingPunct="1">
-              <a:spcBef>
-                <a:spcPct val="20000"/>
-              </a:spcBef>
-              <a:buFont typeface="Arial" pitchFamily="34" charset="0"/>
-              <a:buChar char="•"/>
-              <a:defRPr sz="2000" kern="1200">
-                <a:solidFill>
-                  <a:schemeClr val="tx1"/>
-                </a:solidFill>
-                <a:latin typeface="+mn-lt"/>
-                <a:ea typeface="+mn-ea"/>
-                <a:cs typeface="+mn-cs"/>
-              </a:defRPr>
-            </a:lvl9pPr>
-          </a:lstStyle>
-          <a:p>
-            <a:endParaRPr lang="en-US" dirty="0" smtClean="0"/>
-          </a:p>
-          <a:p>
-            <a:pPr marL="0" indent="0">
-              <a:buNone/>
-            </a:pPr>
-            <a:endParaRPr lang="en-US" dirty="0" smtClean="0"/>
-          </a:p>
-          <a:p>
-            <a:endParaRPr lang="en-US" dirty="0" smtClean="0"/>
-          </a:p>
-          <a:p>
-            <a:endParaRPr lang="en-US" dirty="0"/>
-          </a:p>
-        </p:txBody>
-      </p:sp>
-      <p:graphicFrame>
-        <p:nvGraphicFramePr>
-          <p:cNvPr id="9" name="Table 8"/>
-          <p:cNvGraphicFramePr>
-            <a:graphicFrameLocks noGrp="1"/>
-          </p:cNvGraphicFramePr>
-          <p:nvPr>
-            <p:extLst>
-              <p:ext uri="{D42A27DB-BD31-4B8C-83A1-F6EECF244321}">
-                <p14:modId xmlns:p14="http://schemas.microsoft.com/office/powerpoint/2010/main" val="1770618693"/>
-              </p:ext>
-            </p:extLst>
-          </p:nvPr>
-        </p:nvGraphicFramePr>
-        <p:xfrm>
-          <a:off x="2667000" y="2932546"/>
-          <a:ext cx="3962400" cy="2618047"/>
-        </p:xfrm>
-        <a:graphic>
-          <a:graphicData uri="http://schemas.openxmlformats.org/drawingml/2006/table">
-            <a:tbl>
-              <a:tblPr/>
-              <a:tblGrid>
-                <a:gridCol w="3962400"/>
-              </a:tblGrid>
-              <a:tr h="533400">
-                <a:tc>
-                  <a:txBody>
-                    <a:bodyPr/>
-                    <a:lstStyle/>
-                    <a:p>
-                      <a:pPr algn="ctr"/>
-                      <a:r>
-                        <a:rPr lang="en-US" dirty="0" smtClean="0"/>
-                        <a:t>SIGNAL</a:t>
-                      </a:r>
-                      <a:endParaRPr lang="en-US" dirty="0"/>
-                    </a:p>
-                  </a:txBody>
-                  <a:tcPr>
-                    <a:lnL w="12700" cmpd="sng">
-                      <a:solidFill>
-                        <a:schemeClr val="tx1"/>
-                      </a:solidFill>
-                      <a:prstDash val="solid"/>
-                    </a:lnL>
-                    <a:lnR w="12700" cmpd="sng">
-                      <a:solidFill>
-                        <a:schemeClr val="tx1"/>
-                      </a:solidFill>
-                      <a:prstDash val="solid"/>
-                    </a:lnR>
-                    <a:lnT w="12700" cmpd="sng">
-                      <a:solidFill>
-                        <a:schemeClr val="tx1"/>
-                      </a:solidFill>
-                      <a:prstDash val="solid"/>
-                    </a:lnT>
-                    <a:lnB w="12700" cap="flat" cmpd="sng" algn="ctr">
-                      <a:solidFill>
-                        <a:schemeClr val="tx1"/>
-                      </a:solidFill>
-                      <a:prstDash val="solid"/>
-                      <a:round/>
-                      <a:headEnd type="none" w="med" len="med"/>
-                      <a:tailEnd type="none" w="med" len="med"/>
-                    </a:lnB>
-                  </a:tcPr>
-                </a:tc>
-              </a:tr>
-              <a:tr h="895927">
-                <a:tc>
-                  <a:txBody>
-                    <a:bodyPr/>
-                    <a:lstStyle/>
-                    <a:p>
-                      <a:r>
-                        <a:rPr lang="en-US" dirty="0" smtClean="0"/>
-                        <a:t>Hooks</a:t>
-                      </a:r>
-                      <a:endParaRPr lang="en-US" dirty="0"/>
-                    </a:p>
-                  </a:txBody>
-                  <a:tcPr>
-                    <a:lnL w="12700" cmpd="sng">
-                      <a:solidFill>
-                        <a:schemeClr val="tx1"/>
-                      </a:solidFill>
-                      <a:prstDash val="solid"/>
-                    </a:lnL>
-                    <a:lnR w="12700" cmpd="sng">
-                      <a:solidFill>
-                        <a:schemeClr val="tx1"/>
-                      </a:solidFill>
-                      <a:prstDash val="solid"/>
-                    </a:lnR>
-                    <a:lnT w="12700" cmpd="sng">
-                      <a:solidFill>
-                        <a:schemeClr val="tx1"/>
-                      </a:solidFill>
-                      <a:prstDash val="solid"/>
-                    </a:lnT>
-                    <a:lnB w="12700" cap="flat" cmpd="sng" algn="ctr">
-                      <a:solidFill>
-                        <a:schemeClr val="tx1"/>
-                      </a:solidFill>
-                      <a:prstDash val="solid"/>
-                      <a:round/>
-                      <a:headEnd type="none" w="med" len="med"/>
-                      <a:tailEnd type="none" w="med" len="med"/>
-                    </a:lnB>
-                  </a:tcPr>
-                </a:tc>
-              </a:tr>
-              <a:tr h="895927">
-                <a:tc>
-                  <a:txBody>
-                    <a:bodyPr/>
-                    <a:lstStyle/>
-                    <a:p>
-                      <a:r>
-                        <a:rPr lang="en-US" dirty="0" smtClean="0"/>
-                        <a:t>Signal</a:t>
-                      </a:r>
-                    </a:p>
-                    <a:p>
-                      <a:r>
-                        <a:rPr lang="en-US" dirty="0" smtClean="0"/>
-                        <a:t>signal</a:t>
-                      </a:r>
-                    </a:p>
-                    <a:p>
-                      <a:r>
-                        <a:rPr lang="en-US" dirty="0" err="1" smtClean="0"/>
-                        <a:t>AddHook</a:t>
-                      </a:r>
-                      <a:endParaRPr lang="en-US" dirty="0" smtClean="0"/>
-                    </a:p>
-                    <a:p>
-                      <a:r>
-                        <a:rPr lang="en-US" dirty="0" smtClean="0"/>
-                        <a:t>Hook</a:t>
-                      </a:r>
-                      <a:endParaRPr lang="en-US" dirty="0"/>
-                    </a:p>
-                  </a:txBody>
-                  <a:tcPr>
-                    <a:lnL w="12700" cmpd="sng">
-                      <a:solidFill>
-                        <a:schemeClr val="tx1"/>
-                      </a:solidFill>
-                      <a:prstDash val="solid"/>
-                    </a:lnL>
-                    <a:lnR w="12700" cmpd="sng">
-                      <a:solidFill>
-                        <a:schemeClr val="tx1"/>
-                      </a:solidFill>
-                      <a:prstDash val="solid"/>
-                    </a:lnR>
-                    <a:lnT w="12700" cmpd="sng">
-                      <a:solidFill>
-                        <a:schemeClr val="tx1"/>
-                      </a:solidFill>
-                      <a:prstDash val="solid"/>
-                    </a:lnT>
-                    <a:lnB w="12700" cmpd="sng">
-                      <a:solidFill>
-                        <a:schemeClr val="tx1"/>
-                      </a:solidFill>
-                      <a:prstDash val="solid"/>
-                    </a:lnB>
-                  </a:tcPr>
-                </a:tc>
-              </a:tr>
-            </a:tbl>
-          </a:graphicData>
-        </a:graphic>
-      </p:graphicFrame>
-      <p:sp>
-        <p:nvSpPr>
-          <p:cNvPr id="10" name="TextBox 9"/>
-          <p:cNvSpPr txBox="1"/>
-          <p:nvPr/>
-        </p:nvSpPr>
-        <p:spPr>
-          <a:xfrm>
-            <a:off x="3733800" y="1871807"/>
-            <a:ext cx="1465529" cy="369332"/>
+        </p:nvPicPr>
+        <p:blipFill>
+          <a:blip r:embed="rId3" cstate="print">
+            <a:extLst>
+              <a:ext uri="{28A0092B-C50C-407E-A947-70E740481C1C}">
+                <a14:useLocalDpi xmlns:a14="http://schemas.microsoft.com/office/drawing/2010/main" val="0"/>
+              </a:ext>
+            </a:extLst>
+          </a:blip>
+          <a:srcRect/>
+          <a:stretch>
+            <a:fillRect/>
+          </a:stretch>
+        </p:blipFill>
+        <p:spPr bwMode="auto">
+          <a:xfrm>
+            <a:off x="7620000" y="331940"/>
+            <a:ext cx="1143000" cy="1420660"/>
           </a:xfrm>
           <a:prstGeom prst="rect">
             <a:avLst/>
           </a:prstGeom>
           <a:noFill/>
-        </p:spPr>
-        <p:txBody>
-          <a:bodyPr wrap="none" rtlCol="0">
-            <a:spAutoFit/>
-          </a:bodyPr>
-          <a:lstStyle/>
-          <a:p>
-            <a:r>
-              <a:rPr lang="en-US" dirty="0" smtClean="0"/>
-              <a:t>UML Diagram</a:t>
-            </a:r>
-            <a:endParaRPr lang="en-US" dirty="0"/>
-          </a:p>
-        </p:txBody>
-      </p:sp>
+          <a:extLst>
+            <a:ext uri="{909E8E84-426E-40DD-AFC4-6F175D3DCCD1}">
+              <a14:hiddenFill xmlns:a14="http://schemas.microsoft.com/office/drawing/2010/main">
+                <a:solidFill>
+                  <a:srgbClr val="FFFFFF"/>
+                </a:solidFill>
+              </a14:hiddenFill>
+            </a:ext>
+          </a:extLst>
+        </p:spPr>
+      </p:pic>
     </p:spTree>
     <p:extLst>
       <p:ext uri="{BB962C8B-B14F-4D97-AF65-F5344CB8AC3E}">
-        <p14:creationId xmlns:p14="http://schemas.microsoft.com/office/powerpoint/2010/main" val="2186137818"/>
+        <p14:creationId xmlns:p14="http://schemas.microsoft.com/office/powerpoint/2010/main" val="1479629129"/>
       </p:ext>
     </p:extLst>
   </p:cSld>
@@ -6249,203 +5614,6 @@
           </a:p>
         </p:txBody>
       </p:sp>
-      <p:graphicFrame>
-        <p:nvGraphicFramePr>
-          <p:cNvPr id="9" name="Table 8"/>
-          <p:cNvGraphicFramePr>
-            <a:graphicFrameLocks noGrp="1"/>
-          </p:cNvGraphicFramePr>
-          <p:nvPr>
-            <p:extLst>
-              <p:ext uri="{D42A27DB-BD31-4B8C-83A1-F6EECF244321}">
-                <p14:modId xmlns:p14="http://schemas.microsoft.com/office/powerpoint/2010/main" val="2774073969"/>
-              </p:ext>
-            </p:extLst>
-          </p:nvPr>
-        </p:nvGraphicFramePr>
-        <p:xfrm>
-          <a:off x="2667000" y="2932546"/>
-          <a:ext cx="3962400" cy="3166687"/>
-        </p:xfrm>
-        <a:graphic>
-          <a:graphicData uri="http://schemas.openxmlformats.org/drawingml/2006/table">
-            <a:tbl>
-              <a:tblPr/>
-              <a:tblGrid>
-                <a:gridCol w="3962400"/>
-              </a:tblGrid>
-              <a:tr h="533400">
-                <a:tc>
-                  <a:txBody>
-                    <a:bodyPr/>
-                    <a:lstStyle/>
-                    <a:p>
-                      <a:pPr algn="ctr"/>
-                      <a:r>
-                        <a:rPr lang="en-US" dirty="0" smtClean="0"/>
-                        <a:t>WINDOW</a:t>
-                      </a:r>
-                      <a:endParaRPr lang="en-US" dirty="0"/>
-                    </a:p>
-                  </a:txBody>
-                  <a:tcPr>
-                    <a:lnL w="12700" cmpd="sng">
-                      <a:solidFill>
-                        <a:schemeClr val="tx1"/>
-                      </a:solidFill>
-                      <a:prstDash val="solid"/>
-                    </a:lnL>
-                    <a:lnR w="12700" cmpd="sng">
-                      <a:solidFill>
-                        <a:schemeClr val="tx1"/>
-                      </a:solidFill>
-                      <a:prstDash val="solid"/>
-                    </a:lnR>
-                    <a:lnT w="12700" cmpd="sng">
-                      <a:solidFill>
-                        <a:schemeClr val="tx1"/>
-                      </a:solidFill>
-                      <a:prstDash val="solid"/>
-                    </a:lnT>
-                    <a:lnB w="12700" cap="flat" cmpd="sng" algn="ctr">
-                      <a:solidFill>
-                        <a:schemeClr val="tx1"/>
-                      </a:solidFill>
-                      <a:prstDash val="solid"/>
-                      <a:round/>
-                      <a:headEnd type="none" w="med" len="med"/>
-                      <a:tailEnd type="none" w="med" len="med"/>
-                    </a:lnB>
-                  </a:tcPr>
-                </a:tc>
-              </a:tr>
-              <a:tr h="895927">
-                <a:tc>
-                  <a:txBody>
-                    <a:bodyPr/>
-                    <a:lstStyle/>
-                    <a:p>
-                      <a:r>
-                        <a:rPr lang="en-US" dirty="0" smtClean="0"/>
-                        <a:t>keyboard</a:t>
-                      </a:r>
-                    </a:p>
-                    <a:p>
-                      <a:r>
-                        <a:rPr lang="en-US" dirty="0" err="1" smtClean="0"/>
-                        <a:t>mainPanel</a:t>
-                      </a:r>
-                      <a:endParaRPr lang="en-US" dirty="0"/>
-                    </a:p>
-                  </a:txBody>
-                  <a:tcPr>
-                    <a:lnL w="12700" cmpd="sng">
-                      <a:solidFill>
-                        <a:schemeClr val="tx1"/>
-                      </a:solidFill>
-                      <a:prstDash val="solid"/>
-                    </a:lnL>
-                    <a:lnR w="12700" cmpd="sng">
-                      <a:solidFill>
-                        <a:schemeClr val="tx1"/>
-                      </a:solidFill>
-                      <a:prstDash val="solid"/>
-                    </a:lnR>
-                    <a:lnT w="12700" cmpd="sng">
-                      <a:solidFill>
-                        <a:schemeClr val="tx1"/>
-                      </a:solidFill>
-                      <a:prstDash val="solid"/>
-                    </a:lnT>
-                    <a:lnB w="12700" cap="flat" cmpd="sng" algn="ctr">
-                      <a:solidFill>
-                        <a:schemeClr val="tx1"/>
-                      </a:solidFill>
-                      <a:prstDash val="solid"/>
-                      <a:round/>
-                      <a:headEnd type="none" w="med" len="med"/>
-                      <a:tailEnd type="none" w="med" len="med"/>
-                    </a:lnB>
-                  </a:tcPr>
-                </a:tc>
-              </a:tr>
-              <a:tr h="895927">
-                <a:tc>
-                  <a:txBody>
-                    <a:bodyPr/>
-                    <a:lstStyle/>
-                    <a:p>
-                      <a:r>
-                        <a:rPr lang="en-US" dirty="0" smtClean="0"/>
-                        <a:t>Window</a:t>
-                      </a:r>
-                    </a:p>
-                    <a:p>
-                      <a:r>
-                        <a:rPr lang="en-US" dirty="0" smtClean="0"/>
-                        <a:t>Paint</a:t>
-                      </a:r>
-                    </a:p>
-                    <a:p>
-                      <a:r>
-                        <a:rPr lang="en-US" dirty="0" smtClean="0"/>
-                        <a:t>Keyboard</a:t>
-                      </a:r>
-                    </a:p>
-                    <a:p>
-                      <a:r>
-                        <a:rPr lang="en-US" dirty="0" err="1" smtClean="0"/>
-                        <a:t>keyTyped</a:t>
-                      </a:r>
-                      <a:endParaRPr lang="en-US" dirty="0" smtClean="0"/>
-                    </a:p>
-                    <a:p>
-                      <a:r>
-                        <a:rPr lang="en-US" dirty="0" err="1" smtClean="0"/>
-                        <a:t>keyPressed</a:t>
-                      </a:r>
-                      <a:endParaRPr lang="en-US" dirty="0" smtClean="0"/>
-                    </a:p>
-                    <a:p>
-                      <a:r>
-                        <a:rPr lang="en-US" dirty="0" err="1" smtClean="0"/>
-                        <a:t>keyReleased</a:t>
-                      </a:r>
-                      <a:endParaRPr lang="en-US" dirty="0"/>
-                    </a:p>
-                  </a:txBody>
-                  <a:tcPr>
-                    <a:lnL w="12700" cmpd="sng">
-                      <a:solidFill>
-                        <a:schemeClr val="tx1"/>
-                      </a:solidFill>
-                      <a:prstDash val="solid"/>
-                    </a:lnL>
-                    <a:lnR w="12700" cmpd="sng">
-                      <a:solidFill>
-                        <a:schemeClr val="tx1"/>
-                      </a:solidFill>
-                      <a:prstDash val="solid"/>
-                    </a:lnR>
-                    <a:lnT w="12700" cmpd="sng">
-                      <a:solidFill>
-                        <a:schemeClr val="tx1"/>
-                      </a:solidFill>
-                      <a:prstDash val="solid"/>
-                    </a:lnT>
-                    <a:lnB w="12700" cmpd="sng">
-                      <a:solidFill>
-                        <a:schemeClr val="tx1"/>
-                      </a:solidFill>
-                      <a:prstDash val="solid"/>
-                    </a:lnB>
-                  </a:tcPr>
-                </a:tc>
-              </a:tr>
-            </a:tbl>
-          </a:graphicData>
-        </a:graphic>
-      </p:graphicFrame>
       <p:sp>
         <p:nvSpPr>
           <p:cNvPr id="10" name="TextBox 9"/>
@@ -6454,7 +5622,7 @@
         </p:nvSpPr>
         <p:spPr>
           <a:xfrm>
-            <a:off x="3733800" y="1871807"/>
+            <a:off x="3733800" y="1230868"/>
             <a:ext cx="1465529" cy="369332"/>
           </a:xfrm>
           <a:prstGeom prst="rect">
@@ -6476,10 +5644,262 @@
           </a:p>
         </p:txBody>
       </p:sp>
+      <p:pic>
+        <p:nvPicPr>
+          <p:cNvPr id="11" name="Picture 2" descr="http://www.faerymysterium.com/uploads/9/1/7/6/9176783/oak-tree-light_6587529_orig.jpg"/>
+          <p:cNvPicPr>
+            <a:picLocks noChangeAspect="1" noChangeArrowheads="1"/>
+          </p:cNvPicPr>
+          <p:nvPr/>
+        </p:nvPicPr>
+        <p:blipFill>
+          <a:blip r:embed="rId3" cstate="print">
+            <a:extLst>
+              <a:ext uri="{28A0092B-C50C-407E-A947-70E740481C1C}">
+                <a14:useLocalDpi xmlns:a14="http://schemas.microsoft.com/office/drawing/2010/main" val="0"/>
+              </a:ext>
+            </a:extLst>
+          </a:blip>
+          <a:srcRect/>
+          <a:stretch>
+            <a:fillRect/>
+          </a:stretch>
+        </p:blipFill>
+        <p:spPr bwMode="auto">
+          <a:xfrm>
+            <a:off x="7620000" y="331940"/>
+            <a:ext cx="1143000" cy="1420660"/>
+          </a:xfrm>
+          <a:prstGeom prst="rect">
+            <a:avLst/>
+          </a:prstGeom>
+          <a:noFill/>
+          <a:extLst>
+            <a:ext uri="{909E8E84-426E-40DD-AFC4-6F175D3DCCD1}">
+              <a14:hiddenFill xmlns:a14="http://schemas.microsoft.com/office/drawing/2010/main">
+                <a:solidFill>
+                  <a:srgbClr val="FFFFFF"/>
+                </a:solidFill>
+              </a14:hiddenFill>
+            </a:ext>
+          </a:extLst>
+        </p:spPr>
+      </p:pic>
+      <p:sp>
+        <p:nvSpPr>
+          <p:cNvPr id="13" name="Subtitle 2"/>
+          <p:cNvSpPr txBox="1">
+            <a:spLocks/>
+          </p:cNvSpPr>
+          <p:nvPr/>
+        </p:nvSpPr>
+        <p:spPr>
+          <a:xfrm>
+            <a:off x="1600200" y="1752600"/>
+            <a:ext cx="6400800" cy="4648200"/>
+          </a:xfrm>
+          <a:prstGeom prst="rect">
+            <a:avLst/>
+          </a:prstGeom>
+        </p:spPr>
+        <p:txBody>
+          <a:bodyPr vert="horz" lIns="91440" tIns="45720" rIns="91440" bIns="45720" rtlCol="0">
+            <a:normAutofit/>
+          </a:bodyPr>
+          <a:lstStyle>
+            <a:lvl1pPr marL="342900" indent="-342900" algn="l" defTabSz="914400" rtl="0" eaLnBrk="1" latinLnBrk="0" hangingPunct="1">
+              <a:spcBef>
+                <a:spcPct val="20000"/>
+              </a:spcBef>
+              <a:buFont typeface="Arial" pitchFamily="34" charset="0"/>
+              <a:buChar char="•"/>
+              <a:defRPr sz="3200" kern="1200">
+                <a:solidFill>
+                  <a:schemeClr val="tx1"/>
+                </a:solidFill>
+                <a:latin typeface="+mn-lt"/>
+                <a:ea typeface="+mn-ea"/>
+                <a:cs typeface="+mn-cs"/>
+              </a:defRPr>
+            </a:lvl1pPr>
+            <a:lvl2pPr marL="742950" indent="-285750" algn="l" defTabSz="914400" rtl="0" eaLnBrk="1" latinLnBrk="0" hangingPunct="1">
+              <a:spcBef>
+                <a:spcPct val="20000"/>
+              </a:spcBef>
+              <a:buFont typeface="Arial" pitchFamily="34" charset="0"/>
+              <a:buChar char="–"/>
+              <a:defRPr sz="2800" kern="1200">
+                <a:solidFill>
+                  <a:schemeClr val="tx1"/>
+                </a:solidFill>
+                <a:latin typeface="+mn-lt"/>
+                <a:ea typeface="+mn-ea"/>
+                <a:cs typeface="+mn-cs"/>
+              </a:defRPr>
+            </a:lvl2pPr>
+            <a:lvl3pPr marL="1143000" indent="-228600" algn="l" defTabSz="914400" rtl="0" eaLnBrk="1" latinLnBrk="0" hangingPunct="1">
+              <a:spcBef>
+                <a:spcPct val="20000"/>
+              </a:spcBef>
+              <a:buFont typeface="Arial" pitchFamily="34" charset="0"/>
+              <a:buChar char="•"/>
+              <a:defRPr sz="2400" kern="1200">
+                <a:solidFill>
+                  <a:schemeClr val="tx1"/>
+                </a:solidFill>
+                <a:latin typeface="+mn-lt"/>
+                <a:ea typeface="+mn-ea"/>
+                <a:cs typeface="+mn-cs"/>
+              </a:defRPr>
+            </a:lvl3pPr>
+            <a:lvl4pPr marL="1600200" indent="-228600" algn="l" defTabSz="914400" rtl="0" eaLnBrk="1" latinLnBrk="0" hangingPunct="1">
+              <a:spcBef>
+                <a:spcPct val="20000"/>
+              </a:spcBef>
+              <a:buFont typeface="Arial" pitchFamily="34" charset="0"/>
+              <a:buChar char="–"/>
+              <a:defRPr sz="2000" kern="1200">
+                <a:solidFill>
+                  <a:schemeClr val="tx1"/>
+                </a:solidFill>
+                <a:latin typeface="+mn-lt"/>
+                <a:ea typeface="+mn-ea"/>
+                <a:cs typeface="+mn-cs"/>
+              </a:defRPr>
+            </a:lvl4pPr>
+            <a:lvl5pPr marL="2057400" indent="-228600" algn="l" defTabSz="914400" rtl="0" eaLnBrk="1" latinLnBrk="0" hangingPunct="1">
+              <a:spcBef>
+                <a:spcPct val="20000"/>
+              </a:spcBef>
+              <a:buFont typeface="Arial" pitchFamily="34" charset="0"/>
+              <a:buChar char="»"/>
+              <a:defRPr sz="2000" kern="1200">
+                <a:solidFill>
+                  <a:schemeClr val="tx1"/>
+                </a:solidFill>
+                <a:latin typeface="+mn-lt"/>
+                <a:ea typeface="+mn-ea"/>
+                <a:cs typeface="+mn-cs"/>
+              </a:defRPr>
+            </a:lvl5pPr>
+            <a:lvl6pPr marL="2514600" indent="-228600" algn="l" defTabSz="914400" rtl="0" eaLnBrk="1" latinLnBrk="0" hangingPunct="1">
+              <a:spcBef>
+                <a:spcPct val="20000"/>
+              </a:spcBef>
+              <a:buFont typeface="Arial" pitchFamily="34" charset="0"/>
+              <a:buChar char="•"/>
+              <a:defRPr sz="2000" kern="1200">
+                <a:solidFill>
+                  <a:schemeClr val="tx1"/>
+                </a:solidFill>
+                <a:latin typeface="+mn-lt"/>
+                <a:ea typeface="+mn-ea"/>
+                <a:cs typeface="+mn-cs"/>
+              </a:defRPr>
+            </a:lvl6pPr>
+            <a:lvl7pPr marL="2971800" indent="-228600" algn="l" defTabSz="914400" rtl="0" eaLnBrk="1" latinLnBrk="0" hangingPunct="1">
+              <a:spcBef>
+                <a:spcPct val="20000"/>
+              </a:spcBef>
+              <a:buFont typeface="Arial" pitchFamily="34" charset="0"/>
+              <a:buChar char="•"/>
+              <a:defRPr sz="2000" kern="1200">
+                <a:solidFill>
+                  <a:schemeClr val="tx1"/>
+                </a:solidFill>
+                <a:latin typeface="+mn-lt"/>
+                <a:ea typeface="+mn-ea"/>
+                <a:cs typeface="+mn-cs"/>
+              </a:defRPr>
+            </a:lvl7pPr>
+            <a:lvl8pPr marL="3429000" indent="-228600" algn="l" defTabSz="914400" rtl="0" eaLnBrk="1" latinLnBrk="0" hangingPunct="1">
+              <a:spcBef>
+                <a:spcPct val="20000"/>
+              </a:spcBef>
+              <a:buFont typeface="Arial" pitchFamily="34" charset="0"/>
+              <a:buChar char="•"/>
+              <a:defRPr sz="2000" kern="1200">
+                <a:solidFill>
+                  <a:schemeClr val="tx1"/>
+                </a:solidFill>
+                <a:latin typeface="+mn-lt"/>
+                <a:ea typeface="+mn-ea"/>
+                <a:cs typeface="+mn-cs"/>
+              </a:defRPr>
+            </a:lvl8pPr>
+            <a:lvl9pPr marL="3886200" indent="-228600" algn="l" defTabSz="914400" rtl="0" eaLnBrk="1" latinLnBrk="0" hangingPunct="1">
+              <a:spcBef>
+                <a:spcPct val="20000"/>
+              </a:spcBef>
+              <a:buFont typeface="Arial" pitchFamily="34" charset="0"/>
+              <a:buChar char="•"/>
+              <a:defRPr sz="2000" kern="1200">
+                <a:solidFill>
+                  <a:schemeClr val="tx1"/>
+                </a:solidFill>
+                <a:latin typeface="+mn-lt"/>
+                <a:ea typeface="+mn-ea"/>
+                <a:cs typeface="+mn-cs"/>
+              </a:defRPr>
+            </a:lvl9pPr>
+          </a:lstStyle>
+          <a:p>
+            <a:pPr marL="0" indent="0" algn="ctr">
+              <a:buNone/>
+            </a:pPr>
+            <a:r>
+              <a:rPr lang="en-US" dirty="0" smtClean="0"/>
+              <a:t>Team Project - Group 4</a:t>
+            </a:r>
+          </a:p>
+          <a:p>
+            <a:pPr marL="0" indent="0" algn="ctr">
+              <a:buNone/>
+            </a:pPr>
+            <a:endParaRPr lang="en-US" sz="2800" dirty="0" smtClean="0"/>
+          </a:p>
+          <a:p>
+            <a:pPr marL="0" indent="0" algn="ctr">
+              <a:buNone/>
+            </a:pPr>
+            <a:r>
+              <a:rPr lang="en-US" sz="2800" dirty="0" smtClean="0"/>
+              <a:t>Lessons Learned:</a:t>
+            </a:r>
+          </a:p>
+          <a:p>
+            <a:endParaRPr lang="en-US" sz="2800" dirty="0" smtClean="0"/>
+          </a:p>
+          <a:p>
+            <a:r>
+              <a:rPr lang="en-US" sz="2800" dirty="0" smtClean="0"/>
+              <a:t>Start earlier </a:t>
+            </a:r>
+          </a:p>
+          <a:p>
+            <a:r>
+              <a:rPr lang="en-US" sz="2800" dirty="0" smtClean="0"/>
+              <a:t>Work as a group to define classes and methods</a:t>
+            </a:r>
+          </a:p>
+          <a:p>
+            <a:endParaRPr lang="en-US" sz="2800" dirty="0" smtClean="0"/>
+          </a:p>
+          <a:p>
+            <a:endParaRPr lang="en-US" dirty="0" smtClean="0"/>
+          </a:p>
+          <a:p>
+            <a:endParaRPr lang="en-US" dirty="0" smtClean="0"/>
+          </a:p>
+          <a:p>
+            <a:endParaRPr lang="en-US" dirty="0"/>
+          </a:p>
+        </p:txBody>
+      </p:sp>
     </p:spTree>
     <p:extLst>
       <p:ext uri="{BB962C8B-B14F-4D97-AF65-F5344CB8AC3E}">
-        <p14:creationId xmlns:p14="http://schemas.microsoft.com/office/powerpoint/2010/main" val="2232005435"/>
+        <p14:creationId xmlns:p14="http://schemas.microsoft.com/office/powerpoint/2010/main" val="823839205"/>
       </p:ext>
     </p:extLst>
   </p:cSld>
@@ -6556,7 +5976,7 @@
         <p:spPr>
           <a:xfrm>
             <a:off x="1447800" y="1600200"/>
-            <a:ext cx="6400800" cy="4648200"/>
+            <a:ext cx="6400800" cy="4876800"/>
           </a:xfrm>
         </p:spPr>
         <p:txBody>
@@ -6565,85 +5985,116 @@
           </a:bodyPr>
           <a:lstStyle/>
           <a:p>
-            <a:r>
-              <a:rPr lang="en-US" dirty="0" smtClean="0">
-                <a:solidFill>
-                  <a:schemeClr val="tx1"/>
-                </a:solidFill>
-              </a:rPr>
-              <a:t>Team Project - Group 4</a:t>
-            </a:r>
-          </a:p>
-          <a:p>
-            <a:endParaRPr lang="en-US" sz="2800" dirty="0" smtClean="0">
+            <a:endParaRPr lang="en-US" dirty="0" smtClean="0">
               <a:solidFill>
                 <a:schemeClr val="tx1"/>
               </a:solidFill>
             </a:endParaRPr>
           </a:p>
           <a:p>
-            <a:r>
-              <a:rPr lang="en-US" sz="2800" dirty="0" smtClean="0">
-                <a:solidFill>
-                  <a:schemeClr val="tx1"/>
-                </a:solidFill>
-              </a:rPr>
-              <a:t>Outcome:</a:t>
-            </a:r>
-          </a:p>
-          <a:p>
-            <a:pPr algn="l"/>
-            <a:r>
-              <a:rPr lang="en-US" sz="2800" dirty="0" smtClean="0">
-                <a:solidFill>
-                  <a:schemeClr val="tx1"/>
-                </a:solidFill>
-              </a:rPr>
-              <a:t>	</a:t>
-            </a:r>
-          </a:p>
-          <a:p>
-            <a:pPr marL="457200" indent="-457200" algn="l">
-              <a:buFont typeface="Arial" pitchFamily="34" charset="0"/>
-              <a:buChar char="•"/>
-            </a:pPr>
-            <a:r>
-              <a:rPr lang="en-US" sz="2800" dirty="0" smtClean="0">
-                <a:solidFill>
-                  <a:schemeClr val="tx1"/>
-                </a:solidFill>
-              </a:rPr>
-              <a:t>A panel with two images of paddles</a:t>
-            </a:r>
-          </a:p>
-          <a:p>
-            <a:pPr algn="l"/>
-            <a:r>
-              <a:rPr lang="en-US" sz="2800" dirty="0">
-                <a:solidFill>
-                  <a:schemeClr val="tx1"/>
-                </a:solidFill>
-              </a:rPr>
-              <a:t> 	</a:t>
-            </a:r>
-            <a:r>
-              <a:rPr lang="en-US" sz="2800" dirty="0" smtClean="0">
-                <a:solidFill>
-                  <a:schemeClr val="tx1"/>
-                </a:solidFill>
-              </a:rPr>
-              <a:t>-yeah…. It was a pipe dream!</a:t>
-            </a:r>
-          </a:p>
-          <a:p>
-            <a:endParaRPr lang="en-US" sz="2800" dirty="0" smtClean="0">
+            <a:endParaRPr lang="en-US" sz="2000" dirty="0">
               <a:solidFill>
                 <a:schemeClr val="tx1"/>
               </a:solidFill>
             </a:endParaRPr>
           </a:p>
           <a:p>
-            <a:endParaRPr lang="en-US" sz="2800" dirty="0" smtClean="0">
+            <a:r>
+              <a:rPr lang="en-US" sz="2400" dirty="0" smtClean="0">
+                <a:solidFill>
+                  <a:schemeClr val="tx1"/>
+                </a:solidFill>
+              </a:rPr>
+              <a:t>Special </a:t>
+            </a:r>
+            <a:r>
+              <a:rPr lang="en-US" sz="2400" dirty="0" smtClean="0">
+                <a:solidFill>
+                  <a:schemeClr val="tx1"/>
+                </a:solidFill>
+              </a:rPr>
+              <a:t>thanks to:</a:t>
+            </a:r>
+          </a:p>
+          <a:p>
+            <a:pPr algn="l"/>
+            <a:r>
+              <a:rPr lang="en-US" sz="2400" dirty="0" smtClean="0">
+                <a:solidFill>
+                  <a:schemeClr val="tx1"/>
+                </a:solidFill>
+              </a:rPr>
+              <a:t>	</a:t>
+            </a:r>
+            <a:r>
+              <a:rPr lang="en-US" sz="2400" dirty="0">
+                <a:solidFill>
+                  <a:schemeClr val="tx1"/>
+                </a:solidFill>
+              </a:rPr>
+              <a:t>	</a:t>
+            </a:r>
+          </a:p>
+          <a:p>
+            <a:pPr algn="l"/>
+            <a:endParaRPr lang="en-US" sz="2400" dirty="0" smtClean="0">
+              <a:solidFill>
+                <a:schemeClr val="tx1"/>
+              </a:solidFill>
+            </a:endParaRPr>
+          </a:p>
+          <a:p>
+            <a:pPr algn="l"/>
+            <a:endParaRPr lang="en-US" sz="2400" dirty="0" smtClean="0">
+              <a:solidFill>
+                <a:schemeClr val="tx1"/>
+              </a:solidFill>
+            </a:endParaRPr>
+          </a:p>
+          <a:p>
+            <a:pPr algn="l"/>
+            <a:r>
+              <a:rPr lang="en-US" sz="2400" dirty="0">
+                <a:solidFill>
+                  <a:schemeClr val="tx1"/>
+                </a:solidFill>
+              </a:rPr>
+              <a:t>	</a:t>
+            </a:r>
+            <a:r>
+              <a:rPr lang="en-US" sz="2400" dirty="0" smtClean="0">
+                <a:solidFill>
+                  <a:schemeClr val="tx1"/>
+                </a:solidFill>
+              </a:rPr>
+              <a:t>	</a:t>
+            </a:r>
+          </a:p>
+          <a:p>
+            <a:r>
+              <a:rPr lang="en-US" sz="2400" dirty="0" smtClean="0">
+                <a:solidFill>
+                  <a:schemeClr val="tx1"/>
+                </a:solidFill>
+              </a:rPr>
+              <a:t>Professor </a:t>
+            </a:r>
+            <a:r>
+              <a:rPr lang="en-US" sz="2400" dirty="0" err="1" smtClean="0">
+                <a:solidFill>
+                  <a:schemeClr val="tx1"/>
+                </a:solidFill>
+              </a:rPr>
+              <a:t>Meerdink</a:t>
+            </a:r>
+            <a:endParaRPr lang="en-US" sz="2400" dirty="0" smtClean="0">
+              <a:solidFill>
+                <a:schemeClr val="tx1"/>
+              </a:solidFill>
+            </a:endParaRPr>
+          </a:p>
+          <a:p>
+            <a:endParaRPr lang="en-US" sz="2800" dirty="0">
               <a:solidFill>
                 <a:schemeClr val="tx1"/>
               </a:solidFill>
@@ -6682,18 +6133,200 @@
         </p:blipFill>
         <p:spPr>
           <a:xfrm>
-            <a:off x="678008" y="533400"/>
+            <a:off x="381000" y="389771"/>
             <a:ext cx="1143000" cy="1439029"/>
           </a:xfrm>
           <a:prstGeom prst="rect">
             <a:avLst/>
           </a:prstGeom>
+        </p:spPr>
+      </p:pic>
+      <p:pic>
+        <p:nvPicPr>
+          <p:cNvPr id="5" name="Picture 4"/>
+          <p:cNvPicPr>
+            <a:picLocks noChangeAspect="1"/>
+          </p:cNvPicPr>
+          <p:nvPr/>
+        </p:nvPicPr>
+        <p:blipFill>
+          <a:blip r:embed="rId3">
+            <a:extLst>
+              <a:ext uri="{28A0092B-C50C-407E-A947-70E740481C1C}">
+                <a14:useLocalDpi xmlns:a14="http://schemas.microsoft.com/office/drawing/2010/main" val="0"/>
+              </a:ext>
+            </a:extLst>
+          </a:blip>
+          <a:stretch>
+            <a:fillRect/>
+          </a:stretch>
+        </p:blipFill>
+        <p:spPr>
+          <a:xfrm>
+            <a:off x="3635679" y="2945704"/>
+            <a:ext cx="1857375" cy="1857375"/>
+          </a:xfrm>
+          <a:prstGeom prst="rect">
+            <a:avLst/>
+          </a:prstGeom>
+        </p:spPr>
+      </p:pic>
+      <p:sp>
+        <p:nvSpPr>
+          <p:cNvPr id="6" name="Rectangle 5"/>
+          <p:cNvSpPr/>
+          <p:nvPr/>
+        </p:nvSpPr>
+        <p:spPr>
+          <a:xfrm>
+            <a:off x="2307594" y="1563469"/>
+            <a:ext cx="4572000" cy="707886"/>
+          </a:xfrm>
+          <a:prstGeom prst="rect">
+            <a:avLst/>
+          </a:prstGeom>
+        </p:spPr>
+        <p:txBody>
+          <a:bodyPr>
+            <a:spAutoFit/>
+          </a:bodyPr>
+          <a:lstStyle/>
+          <a:p>
+            <a:r>
+              <a:rPr lang="en-US" sz="2000" dirty="0"/>
+              <a:t>The </a:t>
+            </a:r>
+            <a:r>
+              <a:rPr lang="en-US" sz="2000" dirty="0" smtClean="0"/>
+              <a:t>greatest </a:t>
+            </a:r>
+            <a:r>
+              <a:rPr lang="en-US" sz="2000" dirty="0"/>
+              <a:t>oak was once a little nut who held its ground</a:t>
+            </a:r>
+            <a:r>
+              <a:rPr lang="en-US" sz="2000" dirty="0" smtClean="0"/>
+              <a:t>....… -Author Unknown.</a:t>
+            </a:r>
+            <a:endParaRPr lang="en-US" sz="2000" dirty="0"/>
+          </a:p>
+        </p:txBody>
+      </p:sp>
+      <p:sp>
+        <p:nvSpPr>
+          <p:cNvPr id="7" name="Rectangle 6"/>
+          <p:cNvSpPr/>
+          <p:nvPr/>
+        </p:nvSpPr>
+        <p:spPr>
+          <a:xfrm>
+            <a:off x="4191000" y="5543490"/>
+            <a:ext cx="4572000" cy="400110"/>
+          </a:xfrm>
+          <a:prstGeom prst="rect">
+            <a:avLst/>
+          </a:prstGeom>
+        </p:spPr>
+        <p:txBody>
+          <a:bodyPr>
+            <a:spAutoFit/>
+          </a:bodyPr>
+          <a:lstStyle/>
+          <a:p>
+            <a:r>
+              <a:rPr lang="en-US" sz="2000" dirty="0" smtClean="0"/>
+              <a:t>-Team Acorn</a:t>
+            </a:r>
+            <a:endParaRPr lang="en-US" sz="2000" dirty="0"/>
+          </a:p>
+        </p:txBody>
+      </p:sp>
+      <p:pic>
+        <p:nvPicPr>
+          <p:cNvPr id="8" name="Picture 4" descr="http://yukna.free.fr/anglais/gruffalo/acorn.jpg"/>
+          <p:cNvPicPr>
+            <a:picLocks noChangeAspect="1" noChangeArrowheads="1"/>
+          </p:cNvPicPr>
+          <p:nvPr/>
+        </p:nvPicPr>
+        <p:blipFill>
+          <a:blip r:embed="rId4" cstate="print">
+            <a:extLst>
+              <a:ext uri="{28A0092B-C50C-407E-A947-70E740481C1C}">
+                <a14:useLocalDpi xmlns:a14="http://schemas.microsoft.com/office/drawing/2010/main" val="0"/>
+              </a:ext>
+            </a:extLst>
+          </a:blip>
+          <a:srcRect/>
+          <a:stretch>
+            <a:fillRect/>
+          </a:stretch>
+        </p:blipFill>
+        <p:spPr bwMode="auto">
+          <a:xfrm>
+            <a:off x="3325115" y="5411438"/>
+            <a:ext cx="826167" cy="760762"/>
+          </a:xfrm>
+          <a:prstGeom prst="rect">
+            <a:avLst/>
+          </a:prstGeom>
+          <a:noFill/>
+          <a:extLst>
+            <a:ext uri="{909E8E84-426E-40DD-AFC4-6F175D3DCCD1}">
+              <a14:hiddenFill xmlns:a14="http://schemas.microsoft.com/office/drawing/2010/main">
+                <a:solidFill>
+                  <a:srgbClr val="FFFFFF"/>
+                </a:solidFill>
+              </a14:hiddenFill>
+            </a:ext>
+          </a:extLst>
+        </p:spPr>
+      </p:pic>
+      <p:pic>
+        <p:nvPicPr>
+          <p:cNvPr id="9" name="Picture 2" descr="http://www.faerymysterium.com/uploads/9/1/7/6/9176783/oak-tree-light_6587529_orig.jpg"/>
+          <p:cNvPicPr>
+            <a:picLocks noChangeAspect="1" noChangeArrowheads="1"/>
+          </p:cNvPicPr>
+          <p:nvPr/>
+        </p:nvPicPr>
+        <p:blipFill>
+          <a:blip r:embed="rId5" cstate="print">
+            <a:extLst>
+              <a:ext uri="{28A0092B-C50C-407E-A947-70E740481C1C}">
+                <a14:useLocalDpi xmlns:a14="http://schemas.microsoft.com/office/drawing/2010/main" val="0"/>
+              </a:ext>
+            </a:extLst>
+          </a:blip>
+          <a:srcRect/>
+          <a:stretch>
+            <a:fillRect/>
+          </a:stretch>
+        </p:blipFill>
+        <p:spPr bwMode="auto">
+          <a:xfrm>
+            <a:off x="7620000" y="331940"/>
+            <a:ext cx="1143000" cy="1420660"/>
+          </a:xfrm>
+          <a:prstGeom prst="rect">
+            <a:avLst/>
+          </a:prstGeom>
+          <a:noFill/>
+          <a:extLst>
+            <a:ext uri="{909E8E84-426E-40DD-AFC4-6F175D3DCCD1}">
+              <a14:hiddenFill xmlns:a14="http://schemas.microsoft.com/office/drawing/2010/main">
+                <a:solidFill>
+                  <a:srgbClr val="FFFFFF"/>
+                </a:solidFill>
+              </a14:hiddenFill>
+            </a:ext>
+          </a:extLst>
         </p:spPr>
       </p:pic>
     </p:spTree>
     <p:extLst>
       <p:ext uri="{BB962C8B-B14F-4D97-AF65-F5344CB8AC3E}">
-        <p14:creationId xmlns:p14="http://schemas.microsoft.com/office/powerpoint/2010/main" val="3790514974"/>
+        <p14:creationId xmlns:p14="http://schemas.microsoft.com/office/powerpoint/2010/main" val="3086271375"/>
       </p:ext>
     </p:extLst>
   </p:cSld>

</xml_diff>

<commit_message>
Added @jataca 's Updated JOptionPane and @Dan2012 's updated power point
</commit_message>
<xml_diff>
--- a/JAVA Group Project Presentation.pptx
+++ b/JAVA Group Project Presentation.pptx
@@ -16,6 +16,7 @@
     <p:sldId id="266" r:id="rId10"/>
     <p:sldId id="273" r:id="rId11"/>
     <p:sldId id="271" r:id="rId12"/>
+    <p:sldId id="274" r:id="rId13"/>
   </p:sldIdLst>
   <p:sldSz cx="9144000" cy="6858000" type="screen4x3"/>
   <p:notesSz cx="6858000" cy="9144000"/>
@@ -298,7 +299,7 @@
           <a:p>
             <a:fld id="{28BC0DC7-8EA0-4CB7-893B-35824988B42E}" type="datetimeFigureOut">
               <a:rPr lang="en-US" smtClean="0"/>
-              <a:t>12/9/2012</a:t>
+              <a:t>12/10/2012</a:t>
             </a:fld>
             <a:endParaRPr lang="en-US" dirty="0"/>
           </a:p>
@@ -468,7 +469,7 @@
           <a:p>
             <a:fld id="{28BC0DC7-8EA0-4CB7-893B-35824988B42E}" type="datetimeFigureOut">
               <a:rPr lang="en-US" smtClean="0"/>
-              <a:t>12/9/2012</a:t>
+              <a:t>12/10/2012</a:t>
             </a:fld>
             <a:endParaRPr lang="en-US" dirty="0"/>
           </a:p>
@@ -648,7 +649,7 @@
           <a:p>
             <a:fld id="{28BC0DC7-8EA0-4CB7-893B-35824988B42E}" type="datetimeFigureOut">
               <a:rPr lang="en-US" smtClean="0"/>
-              <a:t>12/9/2012</a:t>
+              <a:t>12/10/2012</a:t>
             </a:fld>
             <a:endParaRPr lang="en-US" dirty="0"/>
           </a:p>
@@ -818,7 +819,7 @@
           <a:p>
             <a:fld id="{28BC0DC7-8EA0-4CB7-893B-35824988B42E}" type="datetimeFigureOut">
               <a:rPr lang="en-US" smtClean="0"/>
-              <a:t>12/9/2012</a:t>
+              <a:t>12/10/2012</a:t>
             </a:fld>
             <a:endParaRPr lang="en-US" dirty="0"/>
           </a:p>
@@ -1064,7 +1065,7 @@
           <a:p>
             <a:fld id="{28BC0DC7-8EA0-4CB7-893B-35824988B42E}" type="datetimeFigureOut">
               <a:rPr lang="en-US" smtClean="0"/>
-              <a:t>12/9/2012</a:t>
+              <a:t>12/10/2012</a:t>
             </a:fld>
             <a:endParaRPr lang="en-US" dirty="0"/>
           </a:p>
@@ -1352,7 +1353,7 @@
           <a:p>
             <a:fld id="{28BC0DC7-8EA0-4CB7-893B-35824988B42E}" type="datetimeFigureOut">
               <a:rPr lang="en-US" smtClean="0"/>
-              <a:t>12/9/2012</a:t>
+              <a:t>12/10/2012</a:t>
             </a:fld>
             <a:endParaRPr lang="en-US" dirty="0"/>
           </a:p>
@@ -1774,7 +1775,7 @@
           <a:p>
             <a:fld id="{28BC0DC7-8EA0-4CB7-893B-35824988B42E}" type="datetimeFigureOut">
               <a:rPr lang="en-US" smtClean="0"/>
-              <a:t>12/9/2012</a:t>
+              <a:t>12/10/2012</a:t>
             </a:fld>
             <a:endParaRPr lang="en-US" dirty="0"/>
           </a:p>
@@ -1892,7 +1893,7 @@
           <a:p>
             <a:fld id="{28BC0DC7-8EA0-4CB7-893B-35824988B42E}" type="datetimeFigureOut">
               <a:rPr lang="en-US" smtClean="0"/>
-              <a:t>12/9/2012</a:t>
+              <a:t>12/10/2012</a:t>
             </a:fld>
             <a:endParaRPr lang="en-US" dirty="0"/>
           </a:p>
@@ -1987,7 +1988,7 @@
           <a:p>
             <a:fld id="{28BC0DC7-8EA0-4CB7-893B-35824988B42E}" type="datetimeFigureOut">
               <a:rPr lang="en-US" smtClean="0"/>
-              <a:t>12/9/2012</a:t>
+              <a:t>12/10/2012</a:t>
             </a:fld>
             <a:endParaRPr lang="en-US" dirty="0"/>
           </a:p>
@@ -2264,7 +2265,7 @@
           <a:p>
             <a:fld id="{28BC0DC7-8EA0-4CB7-893B-35824988B42E}" type="datetimeFigureOut">
               <a:rPr lang="en-US" smtClean="0"/>
-              <a:t>12/9/2012</a:t>
+              <a:t>12/10/2012</a:t>
             </a:fld>
             <a:endParaRPr lang="en-US" dirty="0"/>
           </a:p>
@@ -2517,7 +2518,7 @@
           <a:p>
             <a:fld id="{28BC0DC7-8EA0-4CB7-893B-35824988B42E}" type="datetimeFigureOut">
               <a:rPr lang="en-US" smtClean="0"/>
-              <a:t>12/9/2012</a:t>
+              <a:t>12/10/2012</a:t>
             </a:fld>
             <a:endParaRPr lang="en-US" dirty="0"/>
           </a:p>
@@ -2730,7 +2731,7 @@
           <a:p>
             <a:fld id="{28BC0DC7-8EA0-4CB7-893B-35824988B42E}" type="datetimeFigureOut">
               <a:rPr lang="en-US" smtClean="0"/>
-              <a:t>12/9/2012</a:t>
+              <a:t>12/10/2012</a:t>
             </a:fld>
             <a:endParaRPr lang="en-US" dirty="0"/>
           </a:p>
@@ -3375,13 +3376,8 @@
           <a:p>
             <a:r>
               <a:rPr lang="en-US" sz="2000" dirty="0" smtClean="0"/>
-              <a:t>Master Programmer: Samuel </a:t>
-            </a:r>
-            <a:r>
-              <a:rPr lang="en-US" sz="2000" dirty="0" err="1" smtClean="0"/>
-              <a:t>Hubb</a:t>
-            </a:r>
-            <a:endParaRPr lang="en-US" sz="2000" dirty="0" smtClean="0"/>
+              <a:t>Master Programmer: Samuel Hug</a:t>
+            </a:r>
           </a:p>
           <a:p>
             <a:r>
@@ -4048,6 +4044,36 @@
           </p:txBody>
         </p:sp>
       </p:grpSp>
+      <p:pic>
+        <p:nvPicPr>
+          <p:cNvPr id="5" name="Picture 4"/>
+          <p:cNvPicPr>
+            <a:picLocks noChangeAspect="1"/>
+          </p:cNvPicPr>
+          <p:nvPr/>
+        </p:nvPicPr>
+        <p:blipFill>
+          <a:blip r:embed="rId12">
+            <a:extLst>
+              <a:ext uri="{28A0092B-C50C-407E-A947-70E740481C1C}">
+                <a14:useLocalDpi xmlns:a14="http://schemas.microsoft.com/office/drawing/2010/main" val="0"/>
+              </a:ext>
+            </a:extLst>
+          </a:blip>
+          <a:stretch>
+            <a:fillRect/>
+          </a:stretch>
+        </p:blipFill>
+        <p:spPr>
+          <a:xfrm>
+            <a:off x="634651" y="3470482"/>
+            <a:ext cx="2112811" cy="927741"/>
+          </a:xfrm>
+          <a:prstGeom prst="rect">
+            <a:avLst/>
+          </a:prstGeom>
+        </p:spPr>
+      </p:pic>
     </p:spTree>
     <p:extLst>
       <p:ext uri="{BB962C8B-B14F-4D97-AF65-F5344CB8AC3E}">
@@ -4373,7 +4399,7 @@
         </p:nvSpPr>
         <p:spPr>
           <a:xfrm>
-            <a:off x="762000" y="2800605"/>
+            <a:off x="762000" y="3043535"/>
             <a:ext cx="681661" cy="461665"/>
           </a:xfrm>
           <a:prstGeom prst="rect">
@@ -4459,7 +4485,7 @@
                   <a:schemeClr val="bg1"/>
                 </a:solidFill>
               </a:rPr>
-              <a:t>K</a:t>
+              <a:t>X</a:t>
             </a:r>
             <a:r>
               <a:rPr lang="en-US" sz="1200" dirty="0" smtClean="0">
@@ -4515,7 +4541,7 @@
                   <a:schemeClr val="bg1"/>
                 </a:solidFill>
               </a:rPr>
-              <a:t>   (A, </a:t>
+              <a:t>   (9, </a:t>
             </a:r>
             <a:r>
               <a:rPr lang="en-US" sz="1200" dirty="0">
@@ -4523,7 +4549,7 @@
                   <a:schemeClr val="bg1"/>
                 </a:solidFill>
               </a:rPr>
-              <a:t>Z</a:t>
+              <a:t>0</a:t>
             </a:r>
             <a:r>
               <a:rPr lang="en-US" sz="1200" dirty="0" smtClean="0">
@@ -4683,7 +4709,7 @@
                   <a:schemeClr val="bg1"/>
                 </a:solidFill>
               </a:rPr>
-              <a:t>K</a:t>
+              <a:t>X</a:t>
             </a:r>
             <a:r>
               <a:rPr lang="en-US" sz="1200" dirty="0" smtClean="0">
@@ -4739,23 +4765,7 @@
                   <a:schemeClr val="bg1"/>
                 </a:solidFill>
               </a:rPr>
-              <a:t>   (A, </a:t>
-            </a:r>
-            <a:r>
-              <a:rPr lang="en-US" sz="1200" dirty="0">
-                <a:solidFill>
-                  <a:schemeClr val="bg1"/>
-                </a:solidFill>
-              </a:rPr>
-              <a:t>Z</a:t>
-            </a:r>
-            <a:r>
-              <a:rPr lang="en-US" sz="1200" dirty="0" smtClean="0">
-                <a:solidFill>
-                  <a:schemeClr val="bg1"/>
-                </a:solidFill>
-              </a:rPr>
-              <a:t>)</a:t>
+              <a:t>   (9, 0)</a:t>
             </a:r>
             <a:endParaRPr lang="en-US" sz="1200" dirty="0">
               <a:solidFill>
@@ -8763,38 +8773,17 @@
                   <a:schemeClr val="bg1"/>
                 </a:solidFill>
               </a:rPr>
-              <a:t>Player </a:t>
-            </a:r>
+              <a:t>Player 5</a:t>
+            </a:r>
+          </a:p>
+          <a:p>
             <a:r>
               <a:rPr lang="en-US" sz="1200" dirty="0" smtClean="0">
                 <a:solidFill>
                   <a:schemeClr val="bg1"/>
                 </a:solidFill>
               </a:rPr>
-              <a:t>5</a:t>
-            </a:r>
-            <a:endParaRPr lang="en-US" sz="1200" dirty="0" smtClean="0">
-              <a:solidFill>
-                <a:schemeClr val="bg1"/>
-              </a:solidFill>
-            </a:endParaRPr>
-          </a:p>
-          <a:p>
-            <a:r>
-              <a:rPr lang="en-US" sz="1200" dirty="0" smtClean="0">
-                <a:solidFill>
-                  <a:schemeClr val="bg1"/>
-                </a:solidFill>
-              </a:rPr>
-              <a:t>   </a:t>
-            </a:r>
-            <a:r>
-              <a:rPr lang="en-US" sz="1200" dirty="0" smtClean="0">
-                <a:solidFill>
-                  <a:schemeClr val="bg1"/>
-                </a:solidFill>
-              </a:rPr>
-              <a:t>(Q, </a:t>
+              <a:t>   (Q, </a:t>
             </a:r>
             <a:r>
               <a:rPr lang="en-US" sz="1200" dirty="0">
@@ -8906,23 +8895,7 @@
                   <a:schemeClr val="bg1"/>
                 </a:solidFill>
               </a:rPr>
-              <a:t>   (A, </a:t>
-            </a:r>
-            <a:r>
-              <a:rPr lang="en-US" sz="1200" dirty="0">
-                <a:solidFill>
-                  <a:schemeClr val="bg1"/>
-                </a:solidFill>
-              </a:rPr>
-              <a:t>Z</a:t>
-            </a:r>
-            <a:r>
-              <a:rPr lang="en-US" sz="1200" dirty="0" smtClean="0">
-                <a:solidFill>
-                  <a:schemeClr val="bg1"/>
-                </a:solidFill>
-              </a:rPr>
-              <a:t>)</a:t>
+              <a:t>   (9, 0)</a:t>
             </a:r>
             <a:endParaRPr lang="en-US" sz="1200" dirty="0">
               <a:solidFill>
@@ -8978,7 +8951,7 @@
                   <a:schemeClr val="bg1"/>
                 </a:solidFill>
               </a:rPr>
-              <a:t>K</a:t>
+              <a:t>X</a:t>
             </a:r>
             <a:r>
               <a:rPr lang="en-US" sz="1200" dirty="0" smtClean="0">
@@ -9130,23 +9103,7 @@
                   <a:schemeClr val="bg1"/>
                 </a:solidFill>
               </a:rPr>
-              <a:t>   (A, </a:t>
-            </a:r>
-            <a:r>
-              <a:rPr lang="en-US" sz="1000" dirty="0">
-                <a:solidFill>
-                  <a:schemeClr val="bg1"/>
-                </a:solidFill>
-              </a:rPr>
-              <a:t>Z</a:t>
-            </a:r>
-            <a:r>
-              <a:rPr lang="en-US" sz="1000" dirty="0" smtClean="0">
-                <a:solidFill>
-                  <a:schemeClr val="bg1"/>
-                </a:solidFill>
-              </a:rPr>
-              <a:t>)</a:t>
+              <a:t>   (9, 0)</a:t>
             </a:r>
             <a:endParaRPr lang="en-US" sz="1000" dirty="0">
               <a:solidFill>
@@ -9202,7 +9159,7 @@
                   <a:schemeClr val="bg1"/>
                 </a:solidFill>
               </a:rPr>
-              <a:t>K</a:t>
+              <a:t>X</a:t>
             </a:r>
             <a:r>
               <a:rPr lang="en-US" sz="1000" dirty="0" smtClean="0">
@@ -9365,7 +9322,7 @@
                   <a:schemeClr val="bg1"/>
                 </a:solidFill>
               </a:rPr>
-              <a:t>(Q, W)</a:t>
+              <a:t>(O, P)</a:t>
             </a:r>
             <a:endParaRPr lang="en-US" sz="1200" dirty="0">
               <a:solidFill>
@@ -9461,23 +9418,7 @@
                   <a:schemeClr val="bg1"/>
                 </a:solidFill>
               </a:rPr>
-              <a:t>   (A, </a:t>
-            </a:r>
-            <a:r>
-              <a:rPr lang="en-US" sz="1000" dirty="0">
-                <a:solidFill>
-                  <a:schemeClr val="bg1"/>
-                </a:solidFill>
-              </a:rPr>
-              <a:t>Z</a:t>
-            </a:r>
-            <a:r>
-              <a:rPr lang="en-US" sz="1000" dirty="0" smtClean="0">
-                <a:solidFill>
-                  <a:schemeClr val="bg1"/>
-                </a:solidFill>
-              </a:rPr>
-              <a:t>)</a:t>
+              <a:t>   (9, 0)</a:t>
             </a:r>
             <a:endParaRPr lang="en-US" sz="1000" dirty="0">
               <a:solidFill>
@@ -9533,7 +9474,7 @@
                   <a:schemeClr val="bg1"/>
                 </a:solidFill>
               </a:rPr>
-              <a:t>K</a:t>
+              <a:t>X</a:t>
             </a:r>
             <a:r>
               <a:rPr lang="en-US" sz="1000" dirty="0" smtClean="0">
@@ -9847,38 +9788,17 @@
                   <a:schemeClr val="bg1"/>
                 </a:solidFill>
               </a:rPr>
-              <a:t>Player </a:t>
-            </a:r>
+              <a:t>Player 8</a:t>
+            </a:r>
+          </a:p>
+          <a:p>
             <a:r>
               <a:rPr lang="en-US" sz="1000" dirty="0" smtClean="0">
                 <a:solidFill>
                   <a:schemeClr val="bg1"/>
                 </a:solidFill>
               </a:rPr>
-              <a:t>8</a:t>
-            </a:r>
-            <a:endParaRPr lang="en-US" sz="1000" dirty="0" smtClean="0">
-              <a:solidFill>
-                <a:schemeClr val="bg1"/>
-              </a:solidFill>
-            </a:endParaRPr>
-          </a:p>
-          <a:p>
-            <a:r>
-              <a:rPr lang="en-US" sz="1000" dirty="0" smtClean="0">
-                <a:solidFill>
-                  <a:schemeClr val="bg1"/>
-                </a:solidFill>
-              </a:rPr>
-              <a:t>   </a:t>
-            </a:r>
-            <a:r>
-              <a:rPr lang="en-US" sz="1000" dirty="0" smtClean="0">
-                <a:solidFill>
-                  <a:schemeClr val="bg1"/>
-                </a:solidFill>
-              </a:rPr>
-              <a:t>(K, L)</a:t>
+              <a:t>   (K, L)</a:t>
             </a:r>
             <a:endParaRPr lang="en-US" sz="1000" dirty="0">
               <a:solidFill>
@@ -9926,23 +9846,7 @@
                   <a:schemeClr val="bg1"/>
                 </a:solidFill>
               </a:rPr>
-              <a:t>   (A, </a:t>
-            </a:r>
-            <a:r>
-              <a:rPr lang="en-US" sz="1000" dirty="0">
-                <a:solidFill>
-                  <a:schemeClr val="bg1"/>
-                </a:solidFill>
-              </a:rPr>
-              <a:t>Z</a:t>
-            </a:r>
-            <a:r>
-              <a:rPr lang="en-US" sz="1000" dirty="0" smtClean="0">
-                <a:solidFill>
-                  <a:schemeClr val="bg1"/>
-                </a:solidFill>
-              </a:rPr>
-              <a:t>)</a:t>
+              <a:t>   (9, 0)</a:t>
             </a:r>
             <a:endParaRPr lang="en-US" sz="1000" dirty="0">
               <a:solidFill>
@@ -9998,7 +9902,7 @@
                   <a:schemeClr val="bg1"/>
                 </a:solidFill>
               </a:rPr>
-              <a:t>K</a:t>
+              <a:t>X</a:t>
             </a:r>
             <a:r>
               <a:rPr lang="en-US" sz="1000" dirty="0" smtClean="0">
@@ -10240,6 +10144,363 @@
     <p:extLst>
       <p:ext uri="{BB962C8B-B14F-4D97-AF65-F5344CB8AC3E}">
         <p14:creationId xmlns:p14="http://schemas.microsoft.com/office/powerpoint/2010/main" val="2857207236"/>
+      </p:ext>
+    </p:extLst>
+  </p:cSld>
+  <p:clrMapOvr>
+    <a:masterClrMapping/>
+  </p:clrMapOvr>
+  <p:timing>
+    <p:tnLst>
+      <p:par>
+        <p:cTn id="1" dur="indefinite" restart="never" nodeType="tmRoot"/>
+      </p:par>
+    </p:tnLst>
+  </p:timing>
+</p:sld>
+</file>
+
+<file path=ppt/slides/slide12.xml><?xml version="1.0" encoding="utf-8"?>
+<p:sld xmlns:a="http://schemas.openxmlformats.org/drawingml/2006/main" xmlns:r="http://schemas.openxmlformats.org/officeDocument/2006/relationships" xmlns:p="http://schemas.openxmlformats.org/presentationml/2006/main">
+  <p:cSld>
+    <p:spTree>
+      <p:nvGrpSpPr>
+        <p:cNvPr id="1" name=""/>
+        <p:cNvGrpSpPr/>
+        <p:nvPr/>
+      </p:nvGrpSpPr>
+      <p:grpSpPr>
+        <a:xfrm>
+          <a:off x="0" y="0"/>
+          <a:ext cx="0" cy="0"/>
+          <a:chOff x="0" y="0"/>
+          <a:chExt cx="0" cy="0"/>
+        </a:xfrm>
+      </p:grpSpPr>
+      <p:sp>
+        <p:nvSpPr>
+          <p:cNvPr id="2" name="Title 1"/>
+          <p:cNvSpPr>
+            <a:spLocks noGrp="1"/>
+          </p:cNvSpPr>
+          <p:nvPr>
+            <p:ph type="ctrTitle"/>
+          </p:nvPr>
+        </p:nvSpPr>
+        <p:spPr>
+          <a:xfrm>
+            <a:off x="762000" y="152400"/>
+            <a:ext cx="7772400" cy="1470025"/>
+          </a:xfrm>
+        </p:spPr>
+        <p:txBody>
+          <a:bodyPr>
+            <a:normAutofit/>
+          </a:bodyPr>
+          <a:lstStyle/>
+          <a:p>
+            <a:r>
+              <a:rPr lang="en-US" sz="4000" dirty="0" smtClean="0"/>
+              <a:t>TCC CS 142B Fall 2012</a:t>
+            </a:r>
+            <a:endParaRPr lang="en-US" sz="4000" dirty="0"/>
+          </a:p>
+        </p:txBody>
+      </p:sp>
+      <p:sp>
+        <p:nvSpPr>
+          <p:cNvPr id="3" name="Subtitle 2"/>
+          <p:cNvSpPr>
+            <a:spLocks noGrp="1"/>
+          </p:cNvSpPr>
+          <p:nvPr>
+            <p:ph type="subTitle" idx="1"/>
+          </p:nvPr>
+        </p:nvSpPr>
+        <p:spPr>
+          <a:xfrm>
+            <a:off x="1447800" y="1600200"/>
+            <a:ext cx="6400800" cy="4876800"/>
+          </a:xfrm>
+        </p:spPr>
+        <p:txBody>
+          <a:bodyPr>
+            <a:normAutofit/>
+          </a:bodyPr>
+          <a:lstStyle/>
+          <a:p>
+            <a:endParaRPr lang="en-US" dirty="0" smtClean="0">
+              <a:solidFill>
+                <a:schemeClr val="tx1"/>
+              </a:solidFill>
+            </a:endParaRPr>
+          </a:p>
+          <a:p>
+            <a:endParaRPr lang="en-US" sz="2000" dirty="0">
+              <a:solidFill>
+                <a:schemeClr val="tx1"/>
+              </a:solidFill>
+            </a:endParaRPr>
+          </a:p>
+          <a:p>
+            <a:r>
+              <a:rPr lang="en-US" sz="2400" dirty="0" smtClean="0">
+                <a:solidFill>
+                  <a:schemeClr val="tx1"/>
+                </a:solidFill>
+              </a:rPr>
+              <a:t>Please feel free to download a free (for now) Beta </a:t>
+            </a:r>
+          </a:p>
+          <a:p>
+            <a:r>
+              <a:rPr lang="en-US" sz="2400" dirty="0" smtClean="0">
+                <a:solidFill>
+                  <a:schemeClr val="tx1"/>
+                </a:solidFill>
+              </a:rPr>
+              <a:t>Version of </a:t>
+            </a:r>
+            <a:r>
+              <a:rPr lang="en-US" sz="2400" dirty="0" err="1" smtClean="0">
+                <a:solidFill>
+                  <a:schemeClr val="tx1"/>
+                </a:solidFill>
+              </a:rPr>
+              <a:t>PlethoraOfPong</a:t>
+            </a:r>
+            <a:r>
+              <a:rPr lang="en-US" sz="2400" dirty="0" smtClean="0">
+                <a:solidFill>
+                  <a:schemeClr val="tx1"/>
+                </a:solidFill>
+              </a:rPr>
+              <a:t> version 1.02 at the </a:t>
+            </a:r>
+          </a:p>
+          <a:p>
+            <a:endParaRPr lang="en-US" sz="2400" dirty="0">
+              <a:solidFill>
+                <a:schemeClr val="tx1"/>
+              </a:solidFill>
+            </a:endParaRPr>
+          </a:p>
+          <a:p>
+            <a:r>
+              <a:rPr lang="en-US" sz="2400" dirty="0" smtClean="0">
+                <a:solidFill>
+                  <a:schemeClr val="tx1"/>
+                </a:solidFill>
+              </a:rPr>
+              <a:t>following site:</a:t>
+            </a:r>
+          </a:p>
+          <a:p>
+            <a:endParaRPr lang="en-US" sz="2400" dirty="0">
+              <a:solidFill>
+                <a:schemeClr val="tx1"/>
+              </a:solidFill>
+            </a:endParaRPr>
+          </a:p>
+          <a:p>
+            <a:r>
+              <a:rPr lang="en-US" sz="2000" dirty="0">
+                <a:solidFill>
+                  <a:schemeClr val="tx1"/>
+                </a:solidFill>
+              </a:rPr>
+              <a:t>https://github.com/samuelhug/cs_142_final_project</a:t>
+            </a:r>
+            <a:endParaRPr lang="en-US" sz="2000" dirty="0" smtClean="0">
+              <a:solidFill>
+                <a:schemeClr val="tx1"/>
+              </a:solidFill>
+            </a:endParaRPr>
+          </a:p>
+          <a:p>
+            <a:endParaRPr lang="en-US" sz="2400" dirty="0" smtClean="0">
+              <a:solidFill>
+                <a:schemeClr val="tx1"/>
+              </a:solidFill>
+            </a:endParaRPr>
+          </a:p>
+          <a:p>
+            <a:pPr algn="l"/>
+            <a:r>
+              <a:rPr lang="en-US" sz="2400" dirty="0" smtClean="0">
+                <a:solidFill>
+                  <a:schemeClr val="tx1"/>
+                </a:solidFill>
+              </a:rPr>
+              <a:t>	</a:t>
+            </a:r>
+            <a:r>
+              <a:rPr lang="en-US" sz="2400" dirty="0">
+                <a:solidFill>
+                  <a:schemeClr val="tx1"/>
+                </a:solidFill>
+              </a:rPr>
+              <a:t>	</a:t>
+            </a:r>
+          </a:p>
+          <a:p>
+            <a:pPr algn="l"/>
+            <a:endParaRPr lang="en-US" sz="2400" dirty="0" smtClean="0">
+              <a:solidFill>
+                <a:schemeClr val="tx1"/>
+              </a:solidFill>
+            </a:endParaRPr>
+          </a:p>
+          <a:p>
+            <a:endParaRPr lang="en-US" dirty="0"/>
+          </a:p>
+        </p:txBody>
+      </p:sp>
+      <p:pic>
+        <p:nvPicPr>
+          <p:cNvPr id="4" name="Picture 3"/>
+          <p:cNvPicPr>
+            <a:picLocks noChangeAspect="1"/>
+          </p:cNvPicPr>
+          <p:nvPr/>
+        </p:nvPicPr>
+        <p:blipFill>
+          <a:blip r:embed="rId2" cstate="print">
+            <a:extLst>
+              <a:ext uri="{28A0092B-C50C-407E-A947-70E740481C1C}">
+                <a14:useLocalDpi xmlns:a14="http://schemas.microsoft.com/office/drawing/2010/main" val="0"/>
+              </a:ext>
+            </a:extLst>
+          </a:blip>
+          <a:stretch>
+            <a:fillRect/>
+          </a:stretch>
+        </p:blipFill>
+        <p:spPr>
+          <a:xfrm>
+            <a:off x="381000" y="389771"/>
+            <a:ext cx="1143000" cy="1439029"/>
+          </a:xfrm>
+          <a:prstGeom prst="rect">
+            <a:avLst/>
+          </a:prstGeom>
+        </p:spPr>
+      </p:pic>
+      <p:sp>
+        <p:nvSpPr>
+          <p:cNvPr id="7" name="Rectangle 6"/>
+          <p:cNvSpPr/>
+          <p:nvPr/>
+        </p:nvSpPr>
+        <p:spPr>
+          <a:xfrm>
+            <a:off x="4495800" y="5528474"/>
+            <a:ext cx="4572000" cy="400110"/>
+          </a:xfrm>
+          <a:prstGeom prst="rect">
+            <a:avLst/>
+          </a:prstGeom>
+        </p:spPr>
+        <p:txBody>
+          <a:bodyPr>
+            <a:spAutoFit/>
+          </a:bodyPr>
+          <a:lstStyle/>
+          <a:p>
+            <a:r>
+              <a:rPr lang="en-US" sz="2000" dirty="0" smtClean="0"/>
+              <a:t>-Team Acorn</a:t>
+            </a:r>
+            <a:endParaRPr lang="en-US" sz="2000" dirty="0"/>
+          </a:p>
+        </p:txBody>
+      </p:sp>
+      <p:pic>
+        <p:nvPicPr>
+          <p:cNvPr id="8" name="Picture 4" descr="http://yukna.free.fr/anglais/gruffalo/acorn.jpg"/>
+          <p:cNvPicPr>
+            <a:picLocks noChangeAspect="1" noChangeArrowheads="1"/>
+          </p:cNvPicPr>
+          <p:nvPr/>
+        </p:nvPicPr>
+        <p:blipFill>
+          <a:blip r:embed="rId3" cstate="print">
+            <a:extLst>
+              <a:ext uri="{28A0092B-C50C-407E-A947-70E740481C1C}">
+                <a14:useLocalDpi xmlns:a14="http://schemas.microsoft.com/office/drawing/2010/main" val="0"/>
+              </a:ext>
+            </a:extLst>
+          </a:blip>
+          <a:srcRect/>
+          <a:stretch>
+            <a:fillRect/>
+          </a:stretch>
+        </p:blipFill>
+        <p:spPr bwMode="auto">
+          <a:xfrm>
+            <a:off x="3810000" y="5348148"/>
+            <a:ext cx="826167" cy="760762"/>
+          </a:xfrm>
+          <a:prstGeom prst="rect">
+            <a:avLst/>
+          </a:prstGeom>
+          <a:noFill/>
+          <a:extLst>
+            <a:ext uri="{909E8E84-426E-40DD-AFC4-6F175D3DCCD1}">
+              <a14:hiddenFill xmlns:a14="http://schemas.microsoft.com/office/drawing/2010/main">
+                <a:solidFill>
+                  <a:srgbClr val="FFFFFF"/>
+                </a:solidFill>
+              </a14:hiddenFill>
+            </a:ext>
+          </a:extLst>
+        </p:spPr>
+      </p:pic>
+      <p:pic>
+        <p:nvPicPr>
+          <p:cNvPr id="9" name="Picture 2" descr="http://www.faerymysterium.com/uploads/9/1/7/6/9176783/oak-tree-light_6587529_orig.jpg"/>
+          <p:cNvPicPr>
+            <a:picLocks noChangeAspect="1" noChangeArrowheads="1"/>
+          </p:cNvPicPr>
+          <p:nvPr/>
+        </p:nvPicPr>
+        <p:blipFill>
+          <a:blip r:embed="rId4" cstate="print">
+            <a:extLst>
+              <a:ext uri="{28A0092B-C50C-407E-A947-70E740481C1C}">
+                <a14:useLocalDpi xmlns:a14="http://schemas.microsoft.com/office/drawing/2010/main" val="0"/>
+              </a:ext>
+            </a:extLst>
+          </a:blip>
+          <a:srcRect/>
+          <a:stretch>
+            <a:fillRect/>
+          </a:stretch>
+        </p:blipFill>
+        <p:spPr bwMode="auto">
+          <a:xfrm>
+            <a:off x="7620000" y="331940"/>
+            <a:ext cx="1143000" cy="1420660"/>
+          </a:xfrm>
+          <a:prstGeom prst="rect">
+            <a:avLst/>
+          </a:prstGeom>
+          <a:noFill/>
+          <a:extLst>
+            <a:ext uri="{909E8E84-426E-40DD-AFC4-6F175D3DCCD1}">
+              <a14:hiddenFill xmlns:a14="http://schemas.microsoft.com/office/drawing/2010/main">
+                <a:solidFill>
+                  <a:srgbClr val="FFFFFF"/>
+                </a:solidFill>
+              </a14:hiddenFill>
+            </a:ext>
+          </a:extLst>
+        </p:spPr>
+      </p:pic>
+    </p:spTree>
+    <p:extLst>
+      <p:ext uri="{BB962C8B-B14F-4D97-AF65-F5344CB8AC3E}">
+        <p14:creationId xmlns:p14="http://schemas.microsoft.com/office/powerpoint/2010/main" val="795234229"/>
       </p:ext>
     </p:extLst>
   </p:cSld>
@@ -11822,7 +12083,7 @@
         </p:spPr>
         <p:txBody>
           <a:bodyPr>
-            <a:normAutofit/>
+            <a:normAutofit lnSpcReduction="10000"/>
           </a:bodyPr>
           <a:lstStyle/>
           <a:p>
@@ -11874,8 +12135,80 @@
                   <a:schemeClr val="tx1"/>
                 </a:solidFill>
               </a:rPr>
+              <a:t>Multi-player pong game that works</a:t>
+            </a:r>
+          </a:p>
+          <a:p>
+            <a:pPr marL="457200" indent="-457200" algn="l">
+              <a:buFont typeface="Arial" pitchFamily="34" charset="0"/>
+              <a:buChar char="•"/>
+            </a:pPr>
+            <a:r>
+              <a:rPr lang="en-US" sz="2800" dirty="0" smtClean="0">
+                <a:solidFill>
+                  <a:schemeClr val="tx1"/>
+                </a:solidFill>
+              </a:rPr>
               <a:t>Team-work and collaborative sharing</a:t>
             </a:r>
+          </a:p>
+          <a:p>
+            <a:pPr marL="457200" indent="-457200" algn="l">
+              <a:buFont typeface="Arial" pitchFamily="34" charset="0"/>
+              <a:buChar char="•"/>
+            </a:pPr>
+            <a:r>
+              <a:rPr lang="en-US" sz="2800" dirty="0" smtClean="0">
+                <a:solidFill>
+                  <a:schemeClr val="tx1"/>
+                </a:solidFill>
+              </a:rPr>
+              <a:t>Hardware setup</a:t>
+            </a:r>
+          </a:p>
+          <a:p>
+            <a:pPr marL="457200" indent="-457200" algn="l">
+              <a:buFont typeface="Arial" pitchFamily="34" charset="0"/>
+              <a:buChar char="•"/>
+            </a:pPr>
+            <a:r>
+              <a:rPr lang="en-US" sz="2800" dirty="0" smtClean="0">
+                <a:solidFill>
+                  <a:schemeClr val="tx1"/>
+                </a:solidFill>
+              </a:rPr>
+              <a:t>Collision detection</a:t>
+            </a:r>
+          </a:p>
+          <a:p>
+            <a:pPr marL="457200" indent="-457200" algn="l">
+              <a:buFont typeface="Arial" pitchFamily="34" charset="0"/>
+              <a:buChar char="•"/>
+            </a:pPr>
+            <a:r>
+              <a:rPr lang="en-US" sz="2800" dirty="0" smtClean="0">
+                <a:solidFill>
+                  <a:schemeClr val="tx1"/>
+                </a:solidFill>
+              </a:rPr>
+              <a:t>Multiple balls and GUI interface</a:t>
+            </a:r>
+            <a:endParaRPr lang="en-US" sz="2400" dirty="0" smtClean="0">
+              <a:solidFill>
+                <a:schemeClr val="tx1"/>
+              </a:solidFill>
+            </a:endParaRPr>
+          </a:p>
+          <a:p>
+            <a:pPr marL="457200" indent="-457200" algn="l">
+              <a:buFont typeface="Arial" pitchFamily="34" charset="0"/>
+              <a:buChar char="•"/>
+            </a:pPr>
+            <a:endParaRPr lang="en-US" sz="2800" dirty="0" smtClean="0">
+              <a:solidFill>
+                <a:schemeClr val="tx1"/>
+              </a:solidFill>
+            </a:endParaRPr>
           </a:p>
           <a:p>
             <a:pPr algn="l"/>
@@ -12545,8 +12878,28 @@
           <a:p>
             <a:r>
               <a:rPr lang="en-US" sz="2800" dirty="0" smtClean="0"/>
-              <a:t>Define classes and methods as a group</a:t>
-            </a:r>
+              <a:t>Define classes and methods as a </a:t>
+            </a:r>
+            <a:r>
+              <a:rPr lang="en-US" sz="2800" dirty="0" smtClean="0"/>
+              <a:t>group</a:t>
+            </a:r>
+          </a:p>
+          <a:p>
+            <a:r>
+              <a:rPr lang="en-US" sz="2800" dirty="0" smtClean="0"/>
+              <a:t>Use source control software</a:t>
+            </a:r>
+          </a:p>
+          <a:p>
+            <a:r>
+              <a:rPr lang="en-US" sz="2800" dirty="0" smtClean="0"/>
+              <a:t>Understand source control software</a:t>
+            </a:r>
+            <a:endParaRPr lang="en-US" sz="2800" dirty="0" smtClean="0"/>
+          </a:p>
+          <a:p>
+            <a:endParaRPr lang="en-US" sz="2800" dirty="0" smtClean="0"/>
           </a:p>
           <a:p>
             <a:endParaRPr lang="en-US" sz="2800" dirty="0" smtClean="0"/>

</xml_diff>